<commit_message>
Aggiornamento flussi alternativi Admin
</commit_message>
<xml_diff>
--- a/docs/analisi/Template use case/Template Use Case - Gestione DB.pptx
+++ b/docs/analisi/Template use case/Template Use Case - Gestione DB.pptx
@@ -109,7 +109,7 @@
   </p:defaultTextStyle>
   <p:extLst>
     <p:ext uri="{EFAFB233-063F-42B5-8137-9DF3F51BA10A}">
-      <p15:sldGuideLst xmlns:p15="http://schemas.microsoft.com/office/powerpoint/2012/main">
+      <p15:sldGuideLst xmlns:p15="http://schemas.microsoft.com/office/powerpoint/2012/main" xmlns="">
         <p15:guide id="1" orient="horz" pos="2160">
           <p15:clr>
             <a:srgbClr val="A4A3A4"/>
@@ -302,7 +302,7 @@
           <p:cNvPr id="2" name="Titolo 1">
             <a:extLst>
               <a:ext uri="{FF2B5EF4-FFF2-40B4-BE49-F238E27FC236}">
-                <a16:creationId xmlns:a16="http://schemas.microsoft.com/office/drawing/2014/main" id="{CFBF2858-9FF9-49F6-9325-A5B5D4185723}"/>
+                <a16:creationId xmlns:a16="http://schemas.microsoft.com/office/drawing/2014/main" xmlns="" id="{CFBF2858-9FF9-49F6-9325-A5B5D4185723}"/>
               </a:ext>
             </a:extLst>
           </p:cNvPr>
@@ -339,7 +339,7 @@
           <p:cNvPr id="3" name="Sottotitolo 2">
             <a:extLst>
               <a:ext uri="{FF2B5EF4-FFF2-40B4-BE49-F238E27FC236}">
-                <a16:creationId xmlns:a16="http://schemas.microsoft.com/office/drawing/2014/main" id="{4B21D84B-ED35-4CD0-B889-7022650B2578}"/>
+                <a16:creationId xmlns:a16="http://schemas.microsoft.com/office/drawing/2014/main" xmlns="" id="{4B21D84B-ED35-4CD0-B889-7022650B2578}"/>
               </a:ext>
             </a:extLst>
           </p:cNvPr>
@@ -409,7 +409,7 @@
           <p:cNvPr id="4" name="Segnaposto data 3">
             <a:extLst>
               <a:ext uri="{FF2B5EF4-FFF2-40B4-BE49-F238E27FC236}">
-                <a16:creationId xmlns:a16="http://schemas.microsoft.com/office/drawing/2014/main" id="{E66C651E-1356-4A58-BA17-ECFD882A1A0D}"/>
+                <a16:creationId xmlns:a16="http://schemas.microsoft.com/office/drawing/2014/main" xmlns="" id="{E66C651E-1356-4A58-BA17-ECFD882A1A0D}"/>
               </a:ext>
             </a:extLst>
           </p:cNvPr>
@@ -427,7 +427,7 @@
           <a:p>
             <a:fld id="{F7D71F90-2C6D-44F6-A1F9-0B80B911F8CA}" type="datetimeFigureOut">
               <a:rPr lang="it-IT" smtClean="0"/>
-              <a:t>13/12/2019</a:t>
+              <a:t>16/12/2019</a:t>
             </a:fld>
             <a:endParaRPr lang="it-IT"/>
           </a:p>
@@ -438,7 +438,7 @@
           <p:cNvPr id="5" name="Segnaposto piè di pagina 4">
             <a:extLst>
               <a:ext uri="{FF2B5EF4-FFF2-40B4-BE49-F238E27FC236}">
-                <a16:creationId xmlns:a16="http://schemas.microsoft.com/office/drawing/2014/main" id="{74328D79-8461-43BC-84DA-249AF43BC14A}"/>
+                <a16:creationId xmlns:a16="http://schemas.microsoft.com/office/drawing/2014/main" xmlns="" id="{74328D79-8461-43BC-84DA-249AF43BC14A}"/>
               </a:ext>
             </a:extLst>
           </p:cNvPr>
@@ -463,7 +463,7 @@
           <p:cNvPr id="6" name="Segnaposto numero diapositiva 5">
             <a:extLst>
               <a:ext uri="{FF2B5EF4-FFF2-40B4-BE49-F238E27FC236}">
-                <a16:creationId xmlns:a16="http://schemas.microsoft.com/office/drawing/2014/main" id="{816387D6-94E6-47FE-871A-C8EF03F29BDB}"/>
+                <a16:creationId xmlns:a16="http://schemas.microsoft.com/office/drawing/2014/main" xmlns="" id="{816387D6-94E6-47FE-871A-C8EF03F29BDB}"/>
               </a:ext>
             </a:extLst>
           </p:cNvPr>
@@ -522,7 +522,7 @@
           <p:cNvPr id="2" name="Titolo 1">
             <a:extLst>
               <a:ext uri="{FF2B5EF4-FFF2-40B4-BE49-F238E27FC236}">
-                <a16:creationId xmlns:a16="http://schemas.microsoft.com/office/drawing/2014/main" id="{F59AC4B1-2C56-4BBF-A05F-D9500F78FEB9}"/>
+                <a16:creationId xmlns:a16="http://schemas.microsoft.com/office/drawing/2014/main" xmlns="" id="{F59AC4B1-2C56-4BBF-A05F-D9500F78FEB9}"/>
               </a:ext>
             </a:extLst>
           </p:cNvPr>
@@ -550,7 +550,7 @@
           <p:cNvPr id="3" name="Segnaposto testo verticale 2">
             <a:extLst>
               <a:ext uri="{FF2B5EF4-FFF2-40B4-BE49-F238E27FC236}">
-                <a16:creationId xmlns:a16="http://schemas.microsoft.com/office/drawing/2014/main" id="{90389E8C-63A3-42AB-93CD-0F8792454FCC}"/>
+                <a16:creationId xmlns:a16="http://schemas.microsoft.com/office/drawing/2014/main" xmlns="" id="{90389E8C-63A3-42AB-93CD-0F8792454FCC}"/>
               </a:ext>
             </a:extLst>
           </p:cNvPr>
@@ -607,7 +607,7 @@
           <p:cNvPr id="4" name="Segnaposto data 3">
             <a:extLst>
               <a:ext uri="{FF2B5EF4-FFF2-40B4-BE49-F238E27FC236}">
-                <a16:creationId xmlns:a16="http://schemas.microsoft.com/office/drawing/2014/main" id="{254FADA6-B05E-4B35-A06A-2022D2DBEC26}"/>
+                <a16:creationId xmlns:a16="http://schemas.microsoft.com/office/drawing/2014/main" xmlns="" id="{254FADA6-B05E-4B35-A06A-2022D2DBEC26}"/>
               </a:ext>
             </a:extLst>
           </p:cNvPr>
@@ -625,7 +625,7 @@
           <a:p>
             <a:fld id="{F7D71F90-2C6D-44F6-A1F9-0B80B911F8CA}" type="datetimeFigureOut">
               <a:rPr lang="it-IT" smtClean="0"/>
-              <a:t>13/12/2019</a:t>
+              <a:t>16/12/2019</a:t>
             </a:fld>
             <a:endParaRPr lang="it-IT"/>
           </a:p>
@@ -636,7 +636,7 @@
           <p:cNvPr id="5" name="Segnaposto piè di pagina 4">
             <a:extLst>
               <a:ext uri="{FF2B5EF4-FFF2-40B4-BE49-F238E27FC236}">
-                <a16:creationId xmlns:a16="http://schemas.microsoft.com/office/drawing/2014/main" id="{0631869E-DF6C-4226-B729-2123308FE398}"/>
+                <a16:creationId xmlns:a16="http://schemas.microsoft.com/office/drawing/2014/main" xmlns="" id="{0631869E-DF6C-4226-B729-2123308FE398}"/>
               </a:ext>
             </a:extLst>
           </p:cNvPr>
@@ -661,7 +661,7 @@
           <p:cNvPr id="6" name="Segnaposto numero diapositiva 5">
             <a:extLst>
               <a:ext uri="{FF2B5EF4-FFF2-40B4-BE49-F238E27FC236}">
-                <a16:creationId xmlns:a16="http://schemas.microsoft.com/office/drawing/2014/main" id="{5EBEEC90-B83C-4DEE-937E-C7EC1D025508}"/>
+                <a16:creationId xmlns:a16="http://schemas.microsoft.com/office/drawing/2014/main" xmlns="" id="{5EBEEC90-B83C-4DEE-937E-C7EC1D025508}"/>
               </a:ext>
             </a:extLst>
           </p:cNvPr>
@@ -720,7 +720,7 @@
           <p:cNvPr id="2" name="Titolo verticale 1">
             <a:extLst>
               <a:ext uri="{FF2B5EF4-FFF2-40B4-BE49-F238E27FC236}">
-                <a16:creationId xmlns:a16="http://schemas.microsoft.com/office/drawing/2014/main" id="{30E33601-4D9B-4E96-B3C3-AB65F0C81F37}"/>
+                <a16:creationId xmlns:a16="http://schemas.microsoft.com/office/drawing/2014/main" xmlns="" id="{30E33601-4D9B-4E96-B3C3-AB65F0C81F37}"/>
               </a:ext>
             </a:extLst>
           </p:cNvPr>
@@ -753,7 +753,7 @@
           <p:cNvPr id="3" name="Segnaposto testo verticale 2">
             <a:extLst>
               <a:ext uri="{FF2B5EF4-FFF2-40B4-BE49-F238E27FC236}">
-                <a16:creationId xmlns:a16="http://schemas.microsoft.com/office/drawing/2014/main" id="{FEDAA464-5CD2-4C93-83F5-E13251F55648}"/>
+                <a16:creationId xmlns:a16="http://schemas.microsoft.com/office/drawing/2014/main" xmlns="" id="{FEDAA464-5CD2-4C93-83F5-E13251F55648}"/>
               </a:ext>
             </a:extLst>
           </p:cNvPr>
@@ -815,7 +815,7 @@
           <p:cNvPr id="4" name="Segnaposto data 3">
             <a:extLst>
               <a:ext uri="{FF2B5EF4-FFF2-40B4-BE49-F238E27FC236}">
-                <a16:creationId xmlns:a16="http://schemas.microsoft.com/office/drawing/2014/main" id="{F61719B4-CD99-4540-BEA4-8B7884B7C59C}"/>
+                <a16:creationId xmlns:a16="http://schemas.microsoft.com/office/drawing/2014/main" xmlns="" id="{F61719B4-CD99-4540-BEA4-8B7884B7C59C}"/>
               </a:ext>
             </a:extLst>
           </p:cNvPr>
@@ -833,7 +833,7 @@
           <a:p>
             <a:fld id="{F7D71F90-2C6D-44F6-A1F9-0B80B911F8CA}" type="datetimeFigureOut">
               <a:rPr lang="it-IT" smtClean="0"/>
-              <a:t>13/12/2019</a:t>
+              <a:t>16/12/2019</a:t>
             </a:fld>
             <a:endParaRPr lang="it-IT"/>
           </a:p>
@@ -844,7 +844,7 @@
           <p:cNvPr id="5" name="Segnaposto piè di pagina 4">
             <a:extLst>
               <a:ext uri="{FF2B5EF4-FFF2-40B4-BE49-F238E27FC236}">
-                <a16:creationId xmlns:a16="http://schemas.microsoft.com/office/drawing/2014/main" id="{30F0B4A5-E6FA-4C78-86A7-F528FA130059}"/>
+                <a16:creationId xmlns:a16="http://schemas.microsoft.com/office/drawing/2014/main" xmlns="" id="{30F0B4A5-E6FA-4C78-86A7-F528FA130059}"/>
               </a:ext>
             </a:extLst>
           </p:cNvPr>
@@ -869,7 +869,7 @@
           <p:cNvPr id="6" name="Segnaposto numero diapositiva 5">
             <a:extLst>
               <a:ext uri="{FF2B5EF4-FFF2-40B4-BE49-F238E27FC236}">
-                <a16:creationId xmlns:a16="http://schemas.microsoft.com/office/drawing/2014/main" id="{442BF533-5946-4F10-92FC-3CD5053CF4D8}"/>
+                <a16:creationId xmlns:a16="http://schemas.microsoft.com/office/drawing/2014/main" xmlns="" id="{442BF533-5946-4F10-92FC-3CD5053CF4D8}"/>
               </a:ext>
             </a:extLst>
           </p:cNvPr>
@@ -928,7 +928,7 @@
           <p:cNvPr id="2" name="Titolo 1">
             <a:extLst>
               <a:ext uri="{FF2B5EF4-FFF2-40B4-BE49-F238E27FC236}">
-                <a16:creationId xmlns:a16="http://schemas.microsoft.com/office/drawing/2014/main" id="{8D324EC4-C5F5-4344-815B-63064E440846}"/>
+                <a16:creationId xmlns:a16="http://schemas.microsoft.com/office/drawing/2014/main" xmlns="" id="{8D324EC4-C5F5-4344-815B-63064E440846}"/>
               </a:ext>
             </a:extLst>
           </p:cNvPr>
@@ -956,7 +956,7 @@
           <p:cNvPr id="3" name="Segnaposto contenuto 2">
             <a:extLst>
               <a:ext uri="{FF2B5EF4-FFF2-40B4-BE49-F238E27FC236}">
-                <a16:creationId xmlns:a16="http://schemas.microsoft.com/office/drawing/2014/main" id="{55775342-FE66-4A01-9E0A-B6DFF50813CF}"/>
+                <a16:creationId xmlns:a16="http://schemas.microsoft.com/office/drawing/2014/main" xmlns="" id="{55775342-FE66-4A01-9E0A-B6DFF50813CF}"/>
               </a:ext>
             </a:extLst>
           </p:cNvPr>
@@ -1013,7 +1013,7 @@
           <p:cNvPr id="4" name="Segnaposto data 3">
             <a:extLst>
               <a:ext uri="{FF2B5EF4-FFF2-40B4-BE49-F238E27FC236}">
-                <a16:creationId xmlns:a16="http://schemas.microsoft.com/office/drawing/2014/main" id="{397A9FE5-70AC-44CE-914B-A1E1953D424A}"/>
+                <a16:creationId xmlns:a16="http://schemas.microsoft.com/office/drawing/2014/main" xmlns="" id="{397A9FE5-70AC-44CE-914B-A1E1953D424A}"/>
               </a:ext>
             </a:extLst>
           </p:cNvPr>
@@ -1031,7 +1031,7 @@
           <a:p>
             <a:fld id="{F7D71F90-2C6D-44F6-A1F9-0B80B911F8CA}" type="datetimeFigureOut">
               <a:rPr lang="it-IT" smtClean="0"/>
-              <a:t>13/12/2019</a:t>
+              <a:t>16/12/2019</a:t>
             </a:fld>
             <a:endParaRPr lang="it-IT"/>
           </a:p>
@@ -1042,7 +1042,7 @@
           <p:cNvPr id="5" name="Segnaposto piè di pagina 4">
             <a:extLst>
               <a:ext uri="{FF2B5EF4-FFF2-40B4-BE49-F238E27FC236}">
-                <a16:creationId xmlns:a16="http://schemas.microsoft.com/office/drawing/2014/main" id="{955E82A6-47E5-4A43-8C14-EB032BC59D50}"/>
+                <a16:creationId xmlns:a16="http://schemas.microsoft.com/office/drawing/2014/main" xmlns="" id="{955E82A6-47E5-4A43-8C14-EB032BC59D50}"/>
               </a:ext>
             </a:extLst>
           </p:cNvPr>
@@ -1067,7 +1067,7 @@
           <p:cNvPr id="6" name="Segnaposto numero diapositiva 5">
             <a:extLst>
               <a:ext uri="{FF2B5EF4-FFF2-40B4-BE49-F238E27FC236}">
-                <a16:creationId xmlns:a16="http://schemas.microsoft.com/office/drawing/2014/main" id="{58E8D349-F894-470A-B25E-2196ABC42040}"/>
+                <a16:creationId xmlns:a16="http://schemas.microsoft.com/office/drawing/2014/main" xmlns="" id="{58E8D349-F894-470A-B25E-2196ABC42040}"/>
               </a:ext>
             </a:extLst>
           </p:cNvPr>
@@ -1126,7 +1126,7 @@
           <p:cNvPr id="2" name="Titolo 1">
             <a:extLst>
               <a:ext uri="{FF2B5EF4-FFF2-40B4-BE49-F238E27FC236}">
-                <a16:creationId xmlns:a16="http://schemas.microsoft.com/office/drawing/2014/main" id="{FF8A343A-BEE9-48C2-8F08-6D02BD514F3F}"/>
+                <a16:creationId xmlns:a16="http://schemas.microsoft.com/office/drawing/2014/main" xmlns="" id="{FF8A343A-BEE9-48C2-8F08-6D02BD514F3F}"/>
               </a:ext>
             </a:extLst>
           </p:cNvPr>
@@ -1163,7 +1163,7 @@
           <p:cNvPr id="3" name="Segnaposto testo 2">
             <a:extLst>
               <a:ext uri="{FF2B5EF4-FFF2-40B4-BE49-F238E27FC236}">
-                <a16:creationId xmlns:a16="http://schemas.microsoft.com/office/drawing/2014/main" id="{0909A412-AD76-4989-B06E-E33E0F00580E}"/>
+                <a16:creationId xmlns:a16="http://schemas.microsoft.com/office/drawing/2014/main" xmlns="" id="{0909A412-AD76-4989-B06E-E33E0F00580E}"/>
               </a:ext>
             </a:extLst>
           </p:cNvPr>
@@ -1288,7 +1288,7 @@
           <p:cNvPr id="4" name="Segnaposto data 3">
             <a:extLst>
               <a:ext uri="{FF2B5EF4-FFF2-40B4-BE49-F238E27FC236}">
-                <a16:creationId xmlns:a16="http://schemas.microsoft.com/office/drawing/2014/main" id="{16318882-43E1-4C25-B100-9FE081333575}"/>
+                <a16:creationId xmlns:a16="http://schemas.microsoft.com/office/drawing/2014/main" xmlns="" id="{16318882-43E1-4C25-B100-9FE081333575}"/>
               </a:ext>
             </a:extLst>
           </p:cNvPr>
@@ -1306,7 +1306,7 @@
           <a:p>
             <a:fld id="{F7D71F90-2C6D-44F6-A1F9-0B80B911F8CA}" type="datetimeFigureOut">
               <a:rPr lang="it-IT" smtClean="0"/>
-              <a:t>13/12/2019</a:t>
+              <a:t>16/12/2019</a:t>
             </a:fld>
             <a:endParaRPr lang="it-IT"/>
           </a:p>
@@ -1317,7 +1317,7 @@
           <p:cNvPr id="5" name="Segnaposto piè di pagina 4">
             <a:extLst>
               <a:ext uri="{FF2B5EF4-FFF2-40B4-BE49-F238E27FC236}">
-                <a16:creationId xmlns:a16="http://schemas.microsoft.com/office/drawing/2014/main" id="{C6C78431-C23D-4359-9F41-506C478EC2A0}"/>
+                <a16:creationId xmlns:a16="http://schemas.microsoft.com/office/drawing/2014/main" xmlns="" id="{C6C78431-C23D-4359-9F41-506C478EC2A0}"/>
               </a:ext>
             </a:extLst>
           </p:cNvPr>
@@ -1342,7 +1342,7 @@
           <p:cNvPr id="6" name="Segnaposto numero diapositiva 5">
             <a:extLst>
               <a:ext uri="{FF2B5EF4-FFF2-40B4-BE49-F238E27FC236}">
-                <a16:creationId xmlns:a16="http://schemas.microsoft.com/office/drawing/2014/main" id="{DCF015C2-4C12-42A4-9944-4B1FE7A7FFB1}"/>
+                <a16:creationId xmlns:a16="http://schemas.microsoft.com/office/drawing/2014/main" xmlns="" id="{DCF015C2-4C12-42A4-9944-4B1FE7A7FFB1}"/>
               </a:ext>
             </a:extLst>
           </p:cNvPr>
@@ -1401,7 +1401,7 @@
           <p:cNvPr id="2" name="Titolo 1">
             <a:extLst>
               <a:ext uri="{FF2B5EF4-FFF2-40B4-BE49-F238E27FC236}">
-                <a16:creationId xmlns:a16="http://schemas.microsoft.com/office/drawing/2014/main" id="{7650FD1C-41AC-4FD0-8AF4-B2BFB5ECBDC7}"/>
+                <a16:creationId xmlns:a16="http://schemas.microsoft.com/office/drawing/2014/main" xmlns="" id="{7650FD1C-41AC-4FD0-8AF4-B2BFB5ECBDC7}"/>
               </a:ext>
             </a:extLst>
           </p:cNvPr>
@@ -1429,7 +1429,7 @@
           <p:cNvPr id="3" name="Segnaposto contenuto 2">
             <a:extLst>
               <a:ext uri="{FF2B5EF4-FFF2-40B4-BE49-F238E27FC236}">
-                <a16:creationId xmlns:a16="http://schemas.microsoft.com/office/drawing/2014/main" id="{DD16E77D-6E44-4E42-B7EA-AA87E0A9DBF9}"/>
+                <a16:creationId xmlns:a16="http://schemas.microsoft.com/office/drawing/2014/main" xmlns="" id="{DD16E77D-6E44-4E42-B7EA-AA87E0A9DBF9}"/>
               </a:ext>
             </a:extLst>
           </p:cNvPr>
@@ -1491,7 +1491,7 @@
           <p:cNvPr id="4" name="Segnaposto contenuto 3">
             <a:extLst>
               <a:ext uri="{FF2B5EF4-FFF2-40B4-BE49-F238E27FC236}">
-                <a16:creationId xmlns:a16="http://schemas.microsoft.com/office/drawing/2014/main" id="{844F8AF1-BDF4-4BB6-AA12-D9E74887B7AA}"/>
+                <a16:creationId xmlns:a16="http://schemas.microsoft.com/office/drawing/2014/main" xmlns="" id="{844F8AF1-BDF4-4BB6-AA12-D9E74887B7AA}"/>
               </a:ext>
             </a:extLst>
           </p:cNvPr>
@@ -1553,7 +1553,7 @@
           <p:cNvPr id="5" name="Segnaposto data 4">
             <a:extLst>
               <a:ext uri="{FF2B5EF4-FFF2-40B4-BE49-F238E27FC236}">
-                <a16:creationId xmlns:a16="http://schemas.microsoft.com/office/drawing/2014/main" id="{64E49264-4D9E-4F69-ADBE-5FCE7E088F87}"/>
+                <a16:creationId xmlns:a16="http://schemas.microsoft.com/office/drawing/2014/main" xmlns="" id="{64E49264-4D9E-4F69-ADBE-5FCE7E088F87}"/>
               </a:ext>
             </a:extLst>
           </p:cNvPr>
@@ -1571,7 +1571,7 @@
           <a:p>
             <a:fld id="{F7D71F90-2C6D-44F6-A1F9-0B80B911F8CA}" type="datetimeFigureOut">
               <a:rPr lang="it-IT" smtClean="0"/>
-              <a:t>13/12/2019</a:t>
+              <a:t>16/12/2019</a:t>
             </a:fld>
             <a:endParaRPr lang="it-IT"/>
           </a:p>
@@ -1582,7 +1582,7 @@
           <p:cNvPr id="6" name="Segnaposto piè di pagina 5">
             <a:extLst>
               <a:ext uri="{FF2B5EF4-FFF2-40B4-BE49-F238E27FC236}">
-                <a16:creationId xmlns:a16="http://schemas.microsoft.com/office/drawing/2014/main" id="{6BD94B07-3F97-448F-A14A-F799F51B318D}"/>
+                <a16:creationId xmlns:a16="http://schemas.microsoft.com/office/drawing/2014/main" xmlns="" id="{6BD94B07-3F97-448F-A14A-F799F51B318D}"/>
               </a:ext>
             </a:extLst>
           </p:cNvPr>
@@ -1607,7 +1607,7 @@
           <p:cNvPr id="7" name="Segnaposto numero diapositiva 6">
             <a:extLst>
               <a:ext uri="{FF2B5EF4-FFF2-40B4-BE49-F238E27FC236}">
-                <a16:creationId xmlns:a16="http://schemas.microsoft.com/office/drawing/2014/main" id="{B0CD1917-F8A2-456F-82E6-C095438948B0}"/>
+                <a16:creationId xmlns:a16="http://schemas.microsoft.com/office/drawing/2014/main" xmlns="" id="{B0CD1917-F8A2-456F-82E6-C095438948B0}"/>
               </a:ext>
             </a:extLst>
           </p:cNvPr>
@@ -1666,7 +1666,7 @@
           <p:cNvPr id="2" name="Titolo 1">
             <a:extLst>
               <a:ext uri="{FF2B5EF4-FFF2-40B4-BE49-F238E27FC236}">
-                <a16:creationId xmlns:a16="http://schemas.microsoft.com/office/drawing/2014/main" id="{B58BF815-104D-4049-9B9F-5BEFA614935C}"/>
+                <a16:creationId xmlns:a16="http://schemas.microsoft.com/office/drawing/2014/main" xmlns="" id="{B58BF815-104D-4049-9B9F-5BEFA614935C}"/>
               </a:ext>
             </a:extLst>
           </p:cNvPr>
@@ -1699,7 +1699,7 @@
           <p:cNvPr id="3" name="Segnaposto testo 2">
             <a:extLst>
               <a:ext uri="{FF2B5EF4-FFF2-40B4-BE49-F238E27FC236}">
-                <a16:creationId xmlns:a16="http://schemas.microsoft.com/office/drawing/2014/main" id="{CAE85FF7-9C0E-4DB9-A6AB-9133F631A4B3}"/>
+                <a16:creationId xmlns:a16="http://schemas.microsoft.com/office/drawing/2014/main" xmlns="" id="{CAE85FF7-9C0E-4DB9-A6AB-9133F631A4B3}"/>
               </a:ext>
             </a:extLst>
           </p:cNvPr>
@@ -1770,7 +1770,7 @@
           <p:cNvPr id="4" name="Segnaposto contenuto 3">
             <a:extLst>
               <a:ext uri="{FF2B5EF4-FFF2-40B4-BE49-F238E27FC236}">
-                <a16:creationId xmlns:a16="http://schemas.microsoft.com/office/drawing/2014/main" id="{31A1FF07-A483-4CBC-B502-D2040A241C59}"/>
+                <a16:creationId xmlns:a16="http://schemas.microsoft.com/office/drawing/2014/main" xmlns="" id="{31A1FF07-A483-4CBC-B502-D2040A241C59}"/>
               </a:ext>
             </a:extLst>
           </p:cNvPr>
@@ -1832,7 +1832,7 @@
           <p:cNvPr id="5" name="Segnaposto testo 4">
             <a:extLst>
               <a:ext uri="{FF2B5EF4-FFF2-40B4-BE49-F238E27FC236}">
-                <a16:creationId xmlns:a16="http://schemas.microsoft.com/office/drawing/2014/main" id="{30D9E67F-0023-4AD8-8149-34BD4C055D4E}"/>
+                <a16:creationId xmlns:a16="http://schemas.microsoft.com/office/drawing/2014/main" xmlns="" id="{30D9E67F-0023-4AD8-8149-34BD4C055D4E}"/>
               </a:ext>
             </a:extLst>
           </p:cNvPr>
@@ -1903,7 +1903,7 @@
           <p:cNvPr id="6" name="Segnaposto contenuto 5">
             <a:extLst>
               <a:ext uri="{FF2B5EF4-FFF2-40B4-BE49-F238E27FC236}">
-                <a16:creationId xmlns:a16="http://schemas.microsoft.com/office/drawing/2014/main" id="{23831668-98C0-4979-87D7-959474A9085E}"/>
+                <a16:creationId xmlns:a16="http://schemas.microsoft.com/office/drawing/2014/main" xmlns="" id="{23831668-98C0-4979-87D7-959474A9085E}"/>
               </a:ext>
             </a:extLst>
           </p:cNvPr>
@@ -1965,7 +1965,7 @@
           <p:cNvPr id="7" name="Segnaposto data 6">
             <a:extLst>
               <a:ext uri="{FF2B5EF4-FFF2-40B4-BE49-F238E27FC236}">
-                <a16:creationId xmlns:a16="http://schemas.microsoft.com/office/drawing/2014/main" id="{91B922F5-7D11-4052-AF29-AA3B75B06734}"/>
+                <a16:creationId xmlns:a16="http://schemas.microsoft.com/office/drawing/2014/main" xmlns="" id="{91B922F5-7D11-4052-AF29-AA3B75B06734}"/>
               </a:ext>
             </a:extLst>
           </p:cNvPr>
@@ -1983,7 +1983,7 @@
           <a:p>
             <a:fld id="{F7D71F90-2C6D-44F6-A1F9-0B80B911F8CA}" type="datetimeFigureOut">
               <a:rPr lang="it-IT" smtClean="0"/>
-              <a:t>13/12/2019</a:t>
+              <a:t>16/12/2019</a:t>
             </a:fld>
             <a:endParaRPr lang="it-IT"/>
           </a:p>
@@ -1994,7 +1994,7 @@
           <p:cNvPr id="8" name="Segnaposto piè di pagina 7">
             <a:extLst>
               <a:ext uri="{FF2B5EF4-FFF2-40B4-BE49-F238E27FC236}">
-                <a16:creationId xmlns:a16="http://schemas.microsoft.com/office/drawing/2014/main" id="{6EA02A2F-7388-4F42-A4C6-2A7660ED38E4}"/>
+                <a16:creationId xmlns:a16="http://schemas.microsoft.com/office/drawing/2014/main" xmlns="" id="{6EA02A2F-7388-4F42-A4C6-2A7660ED38E4}"/>
               </a:ext>
             </a:extLst>
           </p:cNvPr>
@@ -2019,7 +2019,7 @@
           <p:cNvPr id="9" name="Segnaposto numero diapositiva 8">
             <a:extLst>
               <a:ext uri="{FF2B5EF4-FFF2-40B4-BE49-F238E27FC236}">
-                <a16:creationId xmlns:a16="http://schemas.microsoft.com/office/drawing/2014/main" id="{CB48DB9B-4650-4AD2-89EF-29E9A37B5E48}"/>
+                <a16:creationId xmlns:a16="http://schemas.microsoft.com/office/drawing/2014/main" xmlns="" id="{CB48DB9B-4650-4AD2-89EF-29E9A37B5E48}"/>
               </a:ext>
             </a:extLst>
           </p:cNvPr>
@@ -2078,7 +2078,7 @@
           <p:cNvPr id="2" name="Titolo 1">
             <a:extLst>
               <a:ext uri="{FF2B5EF4-FFF2-40B4-BE49-F238E27FC236}">
-                <a16:creationId xmlns:a16="http://schemas.microsoft.com/office/drawing/2014/main" id="{7FEFC453-E380-4034-875E-863F49914714}"/>
+                <a16:creationId xmlns:a16="http://schemas.microsoft.com/office/drawing/2014/main" xmlns="" id="{7FEFC453-E380-4034-875E-863F49914714}"/>
               </a:ext>
             </a:extLst>
           </p:cNvPr>
@@ -2106,7 +2106,7 @@
           <p:cNvPr id="3" name="Segnaposto data 2">
             <a:extLst>
               <a:ext uri="{FF2B5EF4-FFF2-40B4-BE49-F238E27FC236}">
-                <a16:creationId xmlns:a16="http://schemas.microsoft.com/office/drawing/2014/main" id="{5BC16F08-373A-43EF-8FBC-2D846E43D6B9}"/>
+                <a16:creationId xmlns:a16="http://schemas.microsoft.com/office/drawing/2014/main" xmlns="" id="{5BC16F08-373A-43EF-8FBC-2D846E43D6B9}"/>
               </a:ext>
             </a:extLst>
           </p:cNvPr>
@@ -2124,7 +2124,7 @@
           <a:p>
             <a:fld id="{F7D71F90-2C6D-44F6-A1F9-0B80B911F8CA}" type="datetimeFigureOut">
               <a:rPr lang="it-IT" smtClean="0"/>
-              <a:t>13/12/2019</a:t>
+              <a:t>16/12/2019</a:t>
             </a:fld>
             <a:endParaRPr lang="it-IT"/>
           </a:p>
@@ -2135,7 +2135,7 @@
           <p:cNvPr id="4" name="Segnaposto piè di pagina 3">
             <a:extLst>
               <a:ext uri="{FF2B5EF4-FFF2-40B4-BE49-F238E27FC236}">
-                <a16:creationId xmlns:a16="http://schemas.microsoft.com/office/drawing/2014/main" id="{2A78CDAE-3535-434E-BF92-560FEDD6C387}"/>
+                <a16:creationId xmlns:a16="http://schemas.microsoft.com/office/drawing/2014/main" xmlns="" id="{2A78CDAE-3535-434E-BF92-560FEDD6C387}"/>
               </a:ext>
             </a:extLst>
           </p:cNvPr>
@@ -2160,7 +2160,7 @@
           <p:cNvPr id="5" name="Segnaposto numero diapositiva 4">
             <a:extLst>
               <a:ext uri="{FF2B5EF4-FFF2-40B4-BE49-F238E27FC236}">
-                <a16:creationId xmlns:a16="http://schemas.microsoft.com/office/drawing/2014/main" id="{FAD2588D-B079-4FE5-B454-629CF3E310A3}"/>
+                <a16:creationId xmlns:a16="http://schemas.microsoft.com/office/drawing/2014/main" xmlns="" id="{FAD2588D-B079-4FE5-B454-629CF3E310A3}"/>
               </a:ext>
             </a:extLst>
           </p:cNvPr>
@@ -2219,7 +2219,7 @@
           <p:cNvPr id="2" name="Segnaposto data 1">
             <a:extLst>
               <a:ext uri="{FF2B5EF4-FFF2-40B4-BE49-F238E27FC236}">
-                <a16:creationId xmlns:a16="http://schemas.microsoft.com/office/drawing/2014/main" id="{D9E26DD7-8914-4A23-85B9-0C03B3ACA40C}"/>
+                <a16:creationId xmlns:a16="http://schemas.microsoft.com/office/drawing/2014/main" xmlns="" id="{D9E26DD7-8914-4A23-85B9-0C03B3ACA40C}"/>
               </a:ext>
             </a:extLst>
           </p:cNvPr>
@@ -2237,7 +2237,7 @@
           <a:p>
             <a:fld id="{F7D71F90-2C6D-44F6-A1F9-0B80B911F8CA}" type="datetimeFigureOut">
               <a:rPr lang="it-IT" smtClean="0"/>
-              <a:t>13/12/2019</a:t>
+              <a:t>16/12/2019</a:t>
             </a:fld>
             <a:endParaRPr lang="it-IT"/>
           </a:p>
@@ -2248,7 +2248,7 @@
           <p:cNvPr id="3" name="Segnaposto piè di pagina 2">
             <a:extLst>
               <a:ext uri="{FF2B5EF4-FFF2-40B4-BE49-F238E27FC236}">
-                <a16:creationId xmlns:a16="http://schemas.microsoft.com/office/drawing/2014/main" id="{992E87C0-E01E-4B5D-B829-69CEB0DB0D77}"/>
+                <a16:creationId xmlns:a16="http://schemas.microsoft.com/office/drawing/2014/main" xmlns="" id="{992E87C0-E01E-4B5D-B829-69CEB0DB0D77}"/>
               </a:ext>
             </a:extLst>
           </p:cNvPr>
@@ -2273,7 +2273,7 @@
           <p:cNvPr id="4" name="Segnaposto numero diapositiva 3">
             <a:extLst>
               <a:ext uri="{FF2B5EF4-FFF2-40B4-BE49-F238E27FC236}">
-                <a16:creationId xmlns:a16="http://schemas.microsoft.com/office/drawing/2014/main" id="{F7867DD9-A762-457F-A406-B864D98AA788}"/>
+                <a16:creationId xmlns:a16="http://schemas.microsoft.com/office/drawing/2014/main" xmlns="" id="{F7867DD9-A762-457F-A406-B864D98AA788}"/>
               </a:ext>
             </a:extLst>
           </p:cNvPr>
@@ -2332,7 +2332,7 @@
           <p:cNvPr id="2" name="Titolo 1">
             <a:extLst>
               <a:ext uri="{FF2B5EF4-FFF2-40B4-BE49-F238E27FC236}">
-                <a16:creationId xmlns:a16="http://schemas.microsoft.com/office/drawing/2014/main" id="{76124E57-2EC1-4A69-8B20-E15B6D22940F}"/>
+                <a16:creationId xmlns:a16="http://schemas.microsoft.com/office/drawing/2014/main" xmlns="" id="{76124E57-2EC1-4A69-8B20-E15B6D22940F}"/>
               </a:ext>
             </a:extLst>
           </p:cNvPr>
@@ -2369,7 +2369,7 @@
           <p:cNvPr id="3" name="Segnaposto contenuto 2">
             <a:extLst>
               <a:ext uri="{FF2B5EF4-FFF2-40B4-BE49-F238E27FC236}">
-                <a16:creationId xmlns:a16="http://schemas.microsoft.com/office/drawing/2014/main" id="{734D8066-1E08-4CE8-983F-9BBA87274CC7}"/>
+                <a16:creationId xmlns:a16="http://schemas.microsoft.com/office/drawing/2014/main" xmlns="" id="{734D8066-1E08-4CE8-983F-9BBA87274CC7}"/>
               </a:ext>
             </a:extLst>
           </p:cNvPr>
@@ -2459,7 +2459,7 @@
           <p:cNvPr id="4" name="Segnaposto testo 3">
             <a:extLst>
               <a:ext uri="{FF2B5EF4-FFF2-40B4-BE49-F238E27FC236}">
-                <a16:creationId xmlns:a16="http://schemas.microsoft.com/office/drawing/2014/main" id="{F3FA6396-D906-40C8-AE24-510E2F78C7FE}"/>
+                <a16:creationId xmlns:a16="http://schemas.microsoft.com/office/drawing/2014/main" xmlns="" id="{F3FA6396-D906-40C8-AE24-510E2F78C7FE}"/>
               </a:ext>
             </a:extLst>
           </p:cNvPr>
@@ -2530,7 +2530,7 @@
           <p:cNvPr id="5" name="Segnaposto data 4">
             <a:extLst>
               <a:ext uri="{FF2B5EF4-FFF2-40B4-BE49-F238E27FC236}">
-                <a16:creationId xmlns:a16="http://schemas.microsoft.com/office/drawing/2014/main" id="{BAA5942A-3BCE-4482-8A5C-CD97772E8976}"/>
+                <a16:creationId xmlns:a16="http://schemas.microsoft.com/office/drawing/2014/main" xmlns="" id="{BAA5942A-3BCE-4482-8A5C-CD97772E8976}"/>
               </a:ext>
             </a:extLst>
           </p:cNvPr>
@@ -2548,7 +2548,7 @@
           <a:p>
             <a:fld id="{F7D71F90-2C6D-44F6-A1F9-0B80B911F8CA}" type="datetimeFigureOut">
               <a:rPr lang="it-IT" smtClean="0"/>
-              <a:t>13/12/2019</a:t>
+              <a:t>16/12/2019</a:t>
             </a:fld>
             <a:endParaRPr lang="it-IT"/>
           </a:p>
@@ -2559,7 +2559,7 @@
           <p:cNvPr id="6" name="Segnaposto piè di pagina 5">
             <a:extLst>
               <a:ext uri="{FF2B5EF4-FFF2-40B4-BE49-F238E27FC236}">
-                <a16:creationId xmlns:a16="http://schemas.microsoft.com/office/drawing/2014/main" id="{99420126-9AFA-4777-BFF5-366C09F8B32E}"/>
+                <a16:creationId xmlns:a16="http://schemas.microsoft.com/office/drawing/2014/main" xmlns="" id="{99420126-9AFA-4777-BFF5-366C09F8B32E}"/>
               </a:ext>
             </a:extLst>
           </p:cNvPr>
@@ -2584,7 +2584,7 @@
           <p:cNvPr id="7" name="Segnaposto numero diapositiva 6">
             <a:extLst>
               <a:ext uri="{FF2B5EF4-FFF2-40B4-BE49-F238E27FC236}">
-                <a16:creationId xmlns:a16="http://schemas.microsoft.com/office/drawing/2014/main" id="{87996299-B8B2-4606-A686-94BC7B31D834}"/>
+                <a16:creationId xmlns:a16="http://schemas.microsoft.com/office/drawing/2014/main" xmlns="" id="{87996299-B8B2-4606-A686-94BC7B31D834}"/>
               </a:ext>
             </a:extLst>
           </p:cNvPr>
@@ -2643,7 +2643,7 @@
           <p:cNvPr id="2" name="Titolo 1">
             <a:extLst>
               <a:ext uri="{FF2B5EF4-FFF2-40B4-BE49-F238E27FC236}">
-                <a16:creationId xmlns:a16="http://schemas.microsoft.com/office/drawing/2014/main" id="{B966293D-979C-4064-9F2B-6124C51E68FE}"/>
+                <a16:creationId xmlns:a16="http://schemas.microsoft.com/office/drawing/2014/main" xmlns="" id="{B966293D-979C-4064-9F2B-6124C51E68FE}"/>
               </a:ext>
             </a:extLst>
           </p:cNvPr>
@@ -2680,7 +2680,7 @@
           <p:cNvPr id="3" name="Segnaposto immagine 2">
             <a:extLst>
               <a:ext uri="{FF2B5EF4-FFF2-40B4-BE49-F238E27FC236}">
-                <a16:creationId xmlns:a16="http://schemas.microsoft.com/office/drawing/2014/main" id="{6A8C2EA0-142A-454E-BAAB-7C4485D60299}"/>
+                <a16:creationId xmlns:a16="http://schemas.microsoft.com/office/drawing/2014/main" xmlns="" id="{6A8C2EA0-142A-454E-BAAB-7C4485D60299}"/>
               </a:ext>
             </a:extLst>
           </p:cNvPr>
@@ -2747,7 +2747,7 @@
           <p:cNvPr id="4" name="Segnaposto testo 3">
             <a:extLst>
               <a:ext uri="{FF2B5EF4-FFF2-40B4-BE49-F238E27FC236}">
-                <a16:creationId xmlns:a16="http://schemas.microsoft.com/office/drawing/2014/main" id="{41AB84A7-19D9-44FE-8513-77CAF35AA7C2}"/>
+                <a16:creationId xmlns:a16="http://schemas.microsoft.com/office/drawing/2014/main" xmlns="" id="{41AB84A7-19D9-44FE-8513-77CAF35AA7C2}"/>
               </a:ext>
             </a:extLst>
           </p:cNvPr>
@@ -2818,7 +2818,7 @@
           <p:cNvPr id="5" name="Segnaposto data 4">
             <a:extLst>
               <a:ext uri="{FF2B5EF4-FFF2-40B4-BE49-F238E27FC236}">
-                <a16:creationId xmlns:a16="http://schemas.microsoft.com/office/drawing/2014/main" id="{8BE837FD-91EA-47CC-A6A0-F23A450D108C}"/>
+                <a16:creationId xmlns:a16="http://schemas.microsoft.com/office/drawing/2014/main" xmlns="" id="{8BE837FD-91EA-47CC-A6A0-F23A450D108C}"/>
               </a:ext>
             </a:extLst>
           </p:cNvPr>
@@ -2836,7 +2836,7 @@
           <a:p>
             <a:fld id="{F7D71F90-2C6D-44F6-A1F9-0B80B911F8CA}" type="datetimeFigureOut">
               <a:rPr lang="it-IT" smtClean="0"/>
-              <a:t>13/12/2019</a:t>
+              <a:t>16/12/2019</a:t>
             </a:fld>
             <a:endParaRPr lang="it-IT"/>
           </a:p>
@@ -2847,7 +2847,7 @@
           <p:cNvPr id="6" name="Segnaposto piè di pagina 5">
             <a:extLst>
               <a:ext uri="{FF2B5EF4-FFF2-40B4-BE49-F238E27FC236}">
-                <a16:creationId xmlns:a16="http://schemas.microsoft.com/office/drawing/2014/main" id="{81B3C88D-C08B-4A45-BF0D-04C3264EB32A}"/>
+                <a16:creationId xmlns:a16="http://schemas.microsoft.com/office/drawing/2014/main" xmlns="" id="{81B3C88D-C08B-4A45-BF0D-04C3264EB32A}"/>
               </a:ext>
             </a:extLst>
           </p:cNvPr>
@@ -2872,7 +2872,7 @@
           <p:cNvPr id="7" name="Segnaposto numero diapositiva 6">
             <a:extLst>
               <a:ext uri="{FF2B5EF4-FFF2-40B4-BE49-F238E27FC236}">
-                <a16:creationId xmlns:a16="http://schemas.microsoft.com/office/drawing/2014/main" id="{C35DA505-C2B5-4A20-A0ED-32D6B7B4CE44}"/>
+                <a16:creationId xmlns:a16="http://schemas.microsoft.com/office/drawing/2014/main" xmlns="" id="{C35DA505-C2B5-4A20-A0ED-32D6B7B4CE44}"/>
               </a:ext>
             </a:extLst>
           </p:cNvPr>
@@ -2936,7 +2936,7 @@
           <p:cNvPr id="2" name="Segnaposto titolo 1">
             <a:extLst>
               <a:ext uri="{FF2B5EF4-FFF2-40B4-BE49-F238E27FC236}">
-                <a16:creationId xmlns:a16="http://schemas.microsoft.com/office/drawing/2014/main" id="{4B1D921F-2C48-4285-A8BD-792591D929C6}"/>
+                <a16:creationId xmlns:a16="http://schemas.microsoft.com/office/drawing/2014/main" xmlns="" id="{4B1D921F-2C48-4285-A8BD-792591D929C6}"/>
               </a:ext>
             </a:extLst>
           </p:cNvPr>
@@ -2974,7 +2974,7 @@
           <p:cNvPr id="3" name="Segnaposto testo 2">
             <a:extLst>
               <a:ext uri="{FF2B5EF4-FFF2-40B4-BE49-F238E27FC236}">
-                <a16:creationId xmlns:a16="http://schemas.microsoft.com/office/drawing/2014/main" id="{518CFD04-AD80-4442-9D20-77C3C390CCFF}"/>
+                <a16:creationId xmlns:a16="http://schemas.microsoft.com/office/drawing/2014/main" xmlns="" id="{518CFD04-AD80-4442-9D20-77C3C390CCFF}"/>
               </a:ext>
             </a:extLst>
           </p:cNvPr>
@@ -3041,7 +3041,7 @@
           <p:cNvPr id="4" name="Segnaposto data 3">
             <a:extLst>
               <a:ext uri="{FF2B5EF4-FFF2-40B4-BE49-F238E27FC236}">
-                <a16:creationId xmlns:a16="http://schemas.microsoft.com/office/drawing/2014/main" id="{2D1ACE57-994B-471D-A0C5-61CE109C7E59}"/>
+                <a16:creationId xmlns:a16="http://schemas.microsoft.com/office/drawing/2014/main" xmlns="" id="{2D1ACE57-994B-471D-A0C5-61CE109C7E59}"/>
               </a:ext>
             </a:extLst>
           </p:cNvPr>
@@ -3077,7 +3077,7 @@
           <a:p>
             <a:fld id="{F7D71F90-2C6D-44F6-A1F9-0B80B911F8CA}" type="datetimeFigureOut">
               <a:rPr lang="it-IT" smtClean="0"/>
-              <a:t>13/12/2019</a:t>
+              <a:t>16/12/2019</a:t>
             </a:fld>
             <a:endParaRPr lang="it-IT"/>
           </a:p>
@@ -3088,7 +3088,7 @@
           <p:cNvPr id="5" name="Segnaposto piè di pagina 4">
             <a:extLst>
               <a:ext uri="{FF2B5EF4-FFF2-40B4-BE49-F238E27FC236}">
-                <a16:creationId xmlns:a16="http://schemas.microsoft.com/office/drawing/2014/main" id="{311C4A1E-1E5A-4141-9735-E37F71E2C7B0}"/>
+                <a16:creationId xmlns:a16="http://schemas.microsoft.com/office/drawing/2014/main" xmlns="" id="{311C4A1E-1E5A-4141-9735-E37F71E2C7B0}"/>
               </a:ext>
             </a:extLst>
           </p:cNvPr>
@@ -3131,7 +3131,7 @@
           <p:cNvPr id="6" name="Segnaposto numero diapositiva 5">
             <a:extLst>
               <a:ext uri="{FF2B5EF4-FFF2-40B4-BE49-F238E27FC236}">
-                <a16:creationId xmlns:a16="http://schemas.microsoft.com/office/drawing/2014/main" id="{5C64D511-420E-43E5-BCD4-81BC958B8929}"/>
+                <a16:creationId xmlns:a16="http://schemas.microsoft.com/office/drawing/2014/main" xmlns="" id="{5C64D511-420E-43E5-BCD4-81BC958B8929}"/>
               </a:ext>
             </a:extLst>
           </p:cNvPr>
@@ -3507,10 +3507,10 @@
           <p:cNvPr id="8" name="Rectangle 7">
             <a:extLst>
               <a:ext uri="{FF2B5EF4-FFF2-40B4-BE49-F238E27FC236}">
-                <a16:creationId xmlns:a16="http://schemas.microsoft.com/office/drawing/2014/main" id="{23962611-DFD5-4092-AAFD-559E3DFCE2C9}"/>
+                <a16:creationId xmlns:a16="http://schemas.microsoft.com/office/drawing/2014/main" xmlns="" id="{23962611-DFD5-4092-AAFD-559E3DFCE2C9}"/>
               </a:ext>
               <a:ext uri="{C183D7F6-B498-43B3-948B-1728B52AA6E4}">
-                <adec:decorative xmlns:adec="http://schemas.microsoft.com/office/drawing/2017/decorative" val="1"/>
+                <adec:decorative xmlns:adec="http://schemas.microsoft.com/office/drawing/2017/decorative" xmlns="" val="1"/>
               </a:ext>
             </a:extLst>
           </p:cNvPr>
@@ -3520,7 +3520,7 @@
           <p:nvPr>
             <p:extLst>
               <p:ext uri="{386F3935-93C4-4BCD-93E2-E3B085C9AB24}">
-                <p16:designElem xmlns:p16="http://schemas.microsoft.com/office/powerpoint/2015/main" val="1"/>
+                <p16:designElem xmlns:p16="http://schemas.microsoft.com/office/powerpoint/2015/main" xmlns="" val="1"/>
               </p:ext>
             </p:extLst>
           </p:nvPr>
@@ -3592,10 +3592,10 @@
           <p:cNvPr id="10" name="Picture 9">
             <a:extLst>
               <a:ext uri="{FF2B5EF4-FFF2-40B4-BE49-F238E27FC236}">
-                <a16:creationId xmlns:a16="http://schemas.microsoft.com/office/drawing/2014/main" id="{2270F1FA-0425-408F-9861-80BF5AFB276D}"/>
+                <a16:creationId xmlns:a16="http://schemas.microsoft.com/office/drawing/2014/main" xmlns="" id="{2270F1FA-0425-408F-9861-80BF5AFB276D}"/>
               </a:ext>
               <a:ext uri="{C183D7F6-B498-43B3-948B-1728B52AA6E4}">
-                <adec:decorative xmlns:adec="http://schemas.microsoft.com/office/drawing/2017/decorative" val="1"/>
+                <adec:decorative xmlns:adec="http://schemas.microsoft.com/office/drawing/2017/decorative" xmlns="" val="1"/>
               </a:ext>
             </a:extLst>
           </p:cNvPr>
@@ -3605,7 +3605,7 @@
           <p:nvPr>
             <p:extLst>
               <p:ext uri="{386F3935-93C4-4BCD-93E2-E3B085C9AB24}">
-                <p16:designElem xmlns:p16="http://schemas.microsoft.com/office/powerpoint/2015/main" val="1"/>
+                <p16:designElem xmlns:p16="http://schemas.microsoft.com/office/powerpoint/2015/main" xmlns="" val="1"/>
               </p:ext>
             </p:extLst>
           </p:nvPr>
@@ -3637,7 +3637,7 @@
           <p:cNvPr id="2" name="Titolo 1">
             <a:extLst>
               <a:ext uri="{FF2B5EF4-FFF2-40B4-BE49-F238E27FC236}">
-                <a16:creationId xmlns:a16="http://schemas.microsoft.com/office/drawing/2014/main" id="{DCBAC149-DB9F-4874-BC24-7F077AA4B78D}"/>
+                <a16:creationId xmlns:a16="http://schemas.microsoft.com/office/drawing/2014/main" xmlns="" id="{DCBAC149-DB9F-4874-BC24-7F077AA4B78D}"/>
               </a:ext>
             </a:extLst>
           </p:cNvPr>
@@ -3676,7 +3676,7 @@
           <p:cNvPr id="3" name="Sottotitolo 2">
             <a:extLst>
               <a:ext uri="{FF2B5EF4-FFF2-40B4-BE49-F238E27FC236}">
-                <a16:creationId xmlns:a16="http://schemas.microsoft.com/office/drawing/2014/main" id="{B9F686C4-B595-4CDD-8233-91A53C48A369}"/>
+                <a16:creationId xmlns:a16="http://schemas.microsoft.com/office/drawing/2014/main" xmlns="" id="{B9F686C4-B595-4CDD-8233-91A53C48A369}"/>
               </a:ext>
             </a:extLst>
           </p:cNvPr>
@@ -3720,6 +3720,13 @@
   <p:clrMapOvr>
     <a:masterClrMapping/>
   </p:clrMapOvr>
+  <p:timing>
+    <p:tnLst>
+      <p:par>
+        <p:cTn id="1" dur="indefinite" restart="never" nodeType="tmRoot"/>
+      </p:par>
+    </p:tnLst>
+  </p:timing>
 </p:sld>
 </file>
 
@@ -3745,7 +3752,7 @@
           <p:cNvPr id="2" name="Titolo 1">
             <a:extLst>
               <a:ext uri="{FF2B5EF4-FFF2-40B4-BE49-F238E27FC236}">
-                <a16:creationId xmlns:a16="http://schemas.microsoft.com/office/drawing/2014/main" id="{B7EC37DD-9E0C-4C6E-A811-00302AD6EACB}"/>
+                <a16:creationId xmlns:a16="http://schemas.microsoft.com/office/drawing/2014/main" xmlns="" id="{B7EC37DD-9E0C-4C6E-A811-00302AD6EACB}"/>
               </a:ext>
             </a:extLst>
           </p:cNvPr>
@@ -3778,7 +3785,7 @@
           <p:cNvPr id="4" name="Tabella 4">
             <a:extLst>
               <a:ext uri="{FF2B5EF4-FFF2-40B4-BE49-F238E27FC236}">
-                <a16:creationId xmlns:a16="http://schemas.microsoft.com/office/drawing/2014/main" id="{043F75E0-1B48-4C2E-8ADF-C8441714A81A}"/>
+                <a16:creationId xmlns:a16="http://schemas.microsoft.com/office/drawing/2014/main" xmlns="" id="{043F75E0-1B48-4C2E-8ADF-C8441714A81A}"/>
               </a:ext>
             </a:extLst>
           </p:cNvPr>
@@ -3789,7 +3796,7 @@
             <p:ph idx="1"/>
             <p:extLst>
               <p:ext uri="{D42A27DB-BD31-4B8C-83A1-F6EECF244321}">
-                <p14:modId xmlns:p14="http://schemas.microsoft.com/office/powerpoint/2010/main" val="3292740738"/>
+                <p14:modId xmlns:p14="http://schemas.microsoft.com/office/powerpoint/2010/main" val="394766594"/>
               </p:ext>
             </p:extLst>
           </p:nvPr>
@@ -3808,14 +3815,14 @@
                 <a:gridCol w="2483498">
                   <a:extLst>
                     <a:ext uri="{9D8B030D-6E8A-4147-A177-3AD203B41FA5}">
-                      <a16:colId xmlns:a16="http://schemas.microsoft.com/office/drawing/2014/main" val="414173828"/>
+                      <a16:colId xmlns:a16="http://schemas.microsoft.com/office/drawing/2014/main" xmlns="" val="414173828"/>
                     </a:ext>
                   </a:extLst>
                 </a:gridCol>
                 <a:gridCol w="8032102">
                   <a:extLst>
                     <a:ext uri="{9D8B030D-6E8A-4147-A177-3AD203B41FA5}">
-                      <a16:colId xmlns:a16="http://schemas.microsoft.com/office/drawing/2014/main" val="418542194"/>
+                      <a16:colId xmlns:a16="http://schemas.microsoft.com/office/drawing/2014/main" xmlns="" val="418542194"/>
                     </a:ext>
                   </a:extLst>
                 </a:gridCol>
@@ -3849,7 +3856,7 @@
                 </a:tc>
                 <a:extLst>
                   <a:ext uri="{0D108BD9-81ED-4DB2-BD59-A6C34878D82A}">
-                    <a16:rowId xmlns:a16="http://schemas.microsoft.com/office/drawing/2014/main" val="246340804"/>
+                    <a16:rowId xmlns:a16="http://schemas.microsoft.com/office/drawing/2014/main" xmlns="" val="246340804"/>
                   </a:ext>
                 </a:extLst>
               </a:tr>
@@ -3883,7 +3890,7 @@
                 </a:tc>
                 <a:extLst>
                   <a:ext uri="{0D108BD9-81ED-4DB2-BD59-A6C34878D82A}">
-                    <a16:rowId xmlns:a16="http://schemas.microsoft.com/office/drawing/2014/main" val="2368987764"/>
+                    <a16:rowId xmlns:a16="http://schemas.microsoft.com/office/drawing/2014/main" xmlns="" val="2368987764"/>
                   </a:ext>
                 </a:extLst>
               </a:tr>
@@ -3916,7 +3923,7 @@
                 </a:tc>
                 <a:extLst>
                   <a:ext uri="{0D108BD9-81ED-4DB2-BD59-A6C34878D82A}">
-                    <a16:rowId xmlns:a16="http://schemas.microsoft.com/office/drawing/2014/main" val="301388857"/>
+                    <a16:rowId xmlns:a16="http://schemas.microsoft.com/office/drawing/2014/main" xmlns="" val="301388857"/>
                   </a:ext>
                 </a:extLst>
               </a:tr>
@@ -3954,7 +3961,7 @@
                 </a:tc>
                 <a:extLst>
                   <a:ext uri="{0D108BD9-81ED-4DB2-BD59-A6C34878D82A}">
-                    <a16:rowId xmlns:a16="http://schemas.microsoft.com/office/drawing/2014/main" val="2333084500"/>
+                    <a16:rowId xmlns:a16="http://schemas.microsoft.com/office/drawing/2014/main" xmlns="" val="2333084500"/>
                   </a:ext>
                 </a:extLst>
               </a:tr>
@@ -3978,16 +3985,17 @@
                     <a:lstStyle/>
                     <a:p>
                       <a:r>
-                        <a:rPr lang="it-IT" dirty="0"/>
-                        <a:t>12/12/2019</a:t>
-                      </a:r>
+                        <a:rPr lang="it-IT" smtClean="0"/>
+                        <a:t>16/12/2019</a:t>
+                      </a:r>
+                      <a:endParaRPr lang="it-IT" dirty="0"/>
                     </a:p>
                   </a:txBody>
                   <a:tcPr/>
                 </a:tc>
                 <a:extLst>
                   <a:ext uri="{0D108BD9-81ED-4DB2-BD59-A6C34878D82A}">
-                    <a16:rowId xmlns:a16="http://schemas.microsoft.com/office/drawing/2014/main" val="2773735045"/>
+                    <a16:rowId xmlns:a16="http://schemas.microsoft.com/office/drawing/2014/main" xmlns="" val="2773735045"/>
                   </a:ext>
                 </a:extLst>
               </a:tr>
@@ -4011,12 +4019,20 @@
                     <a:lstStyle/>
                     <a:p>
                       <a:r>
-                        <a:rPr lang="it-IT" dirty="0"/>
-                        <a:t>Simone </a:t>
-                      </a:r>
-                      <a:r>
-                        <a:rPr lang="it-IT" dirty="0" err="1"/>
-                        <a:t>Barzaghi</a:t>
+                        <a:rPr lang="it-IT" dirty="0" err="1" smtClean="0"/>
+                        <a:t>Ntiegko</a:t>
+                      </a:r>
+                      <a:r>
+                        <a:rPr lang="it-IT" baseline="0" dirty="0" smtClean="0"/>
+                        <a:t> </a:t>
+                      </a:r>
+                      <a:r>
+                        <a:rPr lang="it-IT" baseline="0" dirty="0" err="1" smtClean="0"/>
+                        <a:t>Tsipas</a:t>
+                      </a:r>
+                      <a:r>
+                        <a:rPr lang="it-IT" u="sng" baseline="0" dirty="0" err="1" smtClean="0"/>
+                        <a:t>s</a:t>
                       </a:r>
                       <a:endParaRPr lang="it-IT" dirty="0"/>
                     </a:p>
@@ -4025,7 +4041,7 @@
                 </a:tc>
                 <a:extLst>
                   <a:ext uri="{0D108BD9-81ED-4DB2-BD59-A6C34878D82A}">
-                    <a16:rowId xmlns:a16="http://schemas.microsoft.com/office/drawing/2014/main" val="3315426333"/>
+                    <a16:rowId xmlns:a16="http://schemas.microsoft.com/office/drawing/2014/main" xmlns="" val="3315426333"/>
                   </a:ext>
                 </a:extLst>
               </a:tr>
@@ -4059,7 +4075,7 @@
                 </a:tc>
                 <a:extLst>
                   <a:ext uri="{0D108BD9-81ED-4DB2-BD59-A6C34878D82A}">
-                    <a16:rowId xmlns:a16="http://schemas.microsoft.com/office/drawing/2014/main" val="833276135"/>
+                    <a16:rowId xmlns:a16="http://schemas.microsoft.com/office/drawing/2014/main" xmlns="" val="833276135"/>
                   </a:ext>
                 </a:extLst>
               </a:tr>
@@ -4092,7 +4108,7 @@
                 </a:tc>
                 <a:extLst>
                   <a:ext uri="{0D108BD9-81ED-4DB2-BD59-A6C34878D82A}">
-                    <a16:rowId xmlns:a16="http://schemas.microsoft.com/office/drawing/2014/main" val="1615278520"/>
+                    <a16:rowId xmlns:a16="http://schemas.microsoft.com/office/drawing/2014/main" xmlns="" val="1615278520"/>
                   </a:ext>
                 </a:extLst>
               </a:tr>
@@ -4105,7 +4121,7 @@
           <p:cNvPr id="7" name="Elemento grafico 6" descr="Informazioni">
             <a:extLst>
               <a:ext uri="{FF2B5EF4-FFF2-40B4-BE49-F238E27FC236}">
-                <a16:creationId xmlns:a16="http://schemas.microsoft.com/office/drawing/2014/main" id="{53D936C3-6DDC-4194-987E-7AE9EFD9723F}"/>
+                <a16:creationId xmlns:a16="http://schemas.microsoft.com/office/drawing/2014/main" xmlns="" id="{53D936C3-6DDC-4194-987E-7AE9EFD9723F}"/>
               </a:ext>
             </a:extLst>
           </p:cNvPr>
@@ -4121,7 +4137,7 @@
                 <a14:useLocalDpi xmlns:a14="http://schemas.microsoft.com/office/drawing/2010/main" val="0"/>
               </a:ext>
               <a:ext uri="{96DAC541-7B7A-43D3-8B79-37D633B846F1}">
-                <asvg:svgBlip xmlns:asvg="http://schemas.microsoft.com/office/drawing/2016/SVG/main" r:embed="rId3"/>
+                <asvg:svgBlip xmlns:asvg="http://schemas.microsoft.com/office/drawing/2016/SVG/main" xmlns="" r:embed="rId3"/>
               </a:ext>
             </a:extLst>
           </a:blip>
@@ -4149,6 +4165,13 @@
   <p:clrMapOvr>
     <a:masterClrMapping/>
   </p:clrMapOvr>
+  <p:timing>
+    <p:tnLst>
+      <p:par>
+        <p:cTn id="1" dur="indefinite" restart="never" nodeType="tmRoot"/>
+      </p:par>
+    </p:tnLst>
+  </p:timing>
 </p:sld>
 </file>
 
@@ -4174,7 +4197,7 @@
           <p:cNvPr id="2" name="Titolo 1">
             <a:extLst>
               <a:ext uri="{FF2B5EF4-FFF2-40B4-BE49-F238E27FC236}">
-                <a16:creationId xmlns:a16="http://schemas.microsoft.com/office/drawing/2014/main" id="{FF61BD71-50E0-44C1-A558-965A7ABC70AD}"/>
+                <a16:creationId xmlns:a16="http://schemas.microsoft.com/office/drawing/2014/main" xmlns="" id="{FF61BD71-50E0-44C1-A558-965A7ABC70AD}"/>
               </a:ext>
             </a:extLst>
           </p:cNvPr>
@@ -4202,7 +4225,7 @@
           <p:cNvPr id="4" name="Tabella 4">
             <a:extLst>
               <a:ext uri="{FF2B5EF4-FFF2-40B4-BE49-F238E27FC236}">
-                <a16:creationId xmlns:a16="http://schemas.microsoft.com/office/drawing/2014/main" id="{0BC89AA1-366F-4BE5-824E-0153DB6DF5C3}"/>
+                <a16:creationId xmlns:a16="http://schemas.microsoft.com/office/drawing/2014/main" xmlns="" id="{0BC89AA1-366F-4BE5-824E-0153DB6DF5C3}"/>
               </a:ext>
             </a:extLst>
           </p:cNvPr>
@@ -4232,14 +4255,14 @@
                 <a:gridCol w="2866053">
                   <a:extLst>
                     <a:ext uri="{9D8B030D-6E8A-4147-A177-3AD203B41FA5}">
-                      <a16:colId xmlns:a16="http://schemas.microsoft.com/office/drawing/2014/main" val="3900888184"/>
+                      <a16:colId xmlns:a16="http://schemas.microsoft.com/office/drawing/2014/main" xmlns="" val="3900888184"/>
                     </a:ext>
                   </a:extLst>
                 </a:gridCol>
                 <a:gridCol w="7649547">
                   <a:extLst>
                     <a:ext uri="{9D8B030D-6E8A-4147-A177-3AD203B41FA5}">
-                      <a16:colId xmlns:a16="http://schemas.microsoft.com/office/drawing/2014/main" val="2392364571"/>
+                      <a16:colId xmlns:a16="http://schemas.microsoft.com/office/drawing/2014/main" xmlns="" val="2392364571"/>
                     </a:ext>
                   </a:extLst>
                 </a:gridCol>
@@ -4286,7 +4309,7 @@
                 </a:tc>
                 <a:extLst>
                   <a:ext uri="{0D108BD9-81ED-4DB2-BD59-A6C34878D82A}">
-                    <a16:rowId xmlns:a16="http://schemas.microsoft.com/office/drawing/2014/main" val="2750207453"/>
+                    <a16:rowId xmlns:a16="http://schemas.microsoft.com/office/drawing/2014/main" xmlns="" val="2750207453"/>
                   </a:ext>
                 </a:extLst>
               </a:tr>
@@ -4319,7 +4342,7 @@
                 </a:tc>
                 <a:extLst>
                   <a:ext uri="{0D108BD9-81ED-4DB2-BD59-A6C34878D82A}">
-                    <a16:rowId xmlns:a16="http://schemas.microsoft.com/office/drawing/2014/main" val="43365482"/>
+                    <a16:rowId xmlns:a16="http://schemas.microsoft.com/office/drawing/2014/main" xmlns="" val="43365482"/>
                   </a:ext>
                 </a:extLst>
               </a:tr>
@@ -4357,7 +4380,7 @@
                 </a:tc>
                 <a:extLst>
                   <a:ext uri="{0D108BD9-81ED-4DB2-BD59-A6C34878D82A}">
-                    <a16:rowId xmlns:a16="http://schemas.microsoft.com/office/drawing/2014/main" val="1813106428"/>
+                    <a16:rowId xmlns:a16="http://schemas.microsoft.com/office/drawing/2014/main" xmlns="" val="1813106428"/>
                   </a:ext>
                 </a:extLst>
               </a:tr>
@@ -4391,7 +4414,7 @@
                 </a:tc>
                 <a:extLst>
                   <a:ext uri="{0D108BD9-81ED-4DB2-BD59-A6C34878D82A}">
-                    <a16:rowId xmlns:a16="http://schemas.microsoft.com/office/drawing/2014/main" val="4265491522"/>
+                    <a16:rowId xmlns:a16="http://schemas.microsoft.com/office/drawing/2014/main" xmlns="" val="4265491522"/>
                   </a:ext>
                 </a:extLst>
               </a:tr>
@@ -4424,7 +4447,7 @@
                 </a:tc>
                 <a:extLst>
                   <a:ext uri="{0D108BD9-81ED-4DB2-BD59-A6C34878D82A}">
-                    <a16:rowId xmlns:a16="http://schemas.microsoft.com/office/drawing/2014/main" val="1759204447"/>
+                    <a16:rowId xmlns:a16="http://schemas.microsoft.com/office/drawing/2014/main" xmlns="" val="1759204447"/>
                   </a:ext>
                 </a:extLst>
               </a:tr>
@@ -4461,7 +4484,7 @@
                 </a:tc>
                 <a:extLst>
                   <a:ext uri="{0D108BD9-81ED-4DB2-BD59-A6C34878D82A}">
-                    <a16:rowId xmlns:a16="http://schemas.microsoft.com/office/drawing/2014/main" val="4176074482"/>
+                    <a16:rowId xmlns:a16="http://schemas.microsoft.com/office/drawing/2014/main" xmlns="" val="4176074482"/>
                   </a:ext>
                 </a:extLst>
               </a:tr>
@@ -4499,7 +4522,7 @@
                 </a:tc>
                 <a:extLst>
                   <a:ext uri="{0D108BD9-81ED-4DB2-BD59-A6C34878D82A}">
-                    <a16:rowId xmlns:a16="http://schemas.microsoft.com/office/drawing/2014/main" val="2176725863"/>
+                    <a16:rowId xmlns:a16="http://schemas.microsoft.com/office/drawing/2014/main" xmlns="" val="2176725863"/>
                   </a:ext>
                 </a:extLst>
               </a:tr>
@@ -4512,7 +4535,7 @@
           <p:cNvPr id="7" name="Elemento grafico 6" descr="Alta tensione">
             <a:extLst>
               <a:ext uri="{FF2B5EF4-FFF2-40B4-BE49-F238E27FC236}">
-                <a16:creationId xmlns:a16="http://schemas.microsoft.com/office/drawing/2014/main" id="{4BC6B4F9-BBF9-493A-8CEC-E6BC93390131}"/>
+                <a16:creationId xmlns:a16="http://schemas.microsoft.com/office/drawing/2014/main" xmlns="" id="{4BC6B4F9-BBF9-493A-8CEC-E6BC93390131}"/>
               </a:ext>
             </a:extLst>
           </p:cNvPr>
@@ -4528,7 +4551,7 @@
                 <a14:useLocalDpi xmlns:a14="http://schemas.microsoft.com/office/drawing/2010/main" val="0"/>
               </a:ext>
               <a:ext uri="{96DAC541-7B7A-43D3-8B79-37D633B846F1}">
-                <asvg:svgBlip xmlns:asvg="http://schemas.microsoft.com/office/drawing/2016/SVG/main" r:embed="rId3"/>
+                <asvg:svgBlip xmlns:asvg="http://schemas.microsoft.com/office/drawing/2016/SVG/main" xmlns="" r:embed="rId3"/>
               </a:ext>
             </a:extLst>
           </a:blip>
@@ -4581,7 +4604,7 @@
           <p:cNvPr id="2" name="Titolo 1">
             <a:extLst>
               <a:ext uri="{FF2B5EF4-FFF2-40B4-BE49-F238E27FC236}">
-                <a16:creationId xmlns:a16="http://schemas.microsoft.com/office/drawing/2014/main" id="{A8B055A1-B3E5-4E97-BAF3-4C33FEAE38D5}"/>
+                <a16:creationId xmlns:a16="http://schemas.microsoft.com/office/drawing/2014/main" xmlns="" id="{A8B055A1-B3E5-4E97-BAF3-4C33FEAE38D5}"/>
               </a:ext>
             </a:extLst>
           </p:cNvPr>
@@ -4615,7 +4638,7 @@
           <p:cNvPr id="4" name="Tabella 4">
             <a:extLst>
               <a:ext uri="{FF2B5EF4-FFF2-40B4-BE49-F238E27FC236}">
-                <a16:creationId xmlns:a16="http://schemas.microsoft.com/office/drawing/2014/main" id="{67C1CEAA-13A3-482D-AA09-BF3FC903FFE5}"/>
+                <a16:creationId xmlns:a16="http://schemas.microsoft.com/office/drawing/2014/main" xmlns="" id="{67C1CEAA-13A3-482D-AA09-BF3FC903FFE5}"/>
               </a:ext>
             </a:extLst>
           </p:cNvPr>
@@ -4626,14 +4649,14 @@
             <p:ph idx="1"/>
             <p:extLst>
               <p:ext uri="{D42A27DB-BD31-4B8C-83A1-F6EECF244321}">
-                <p14:modId xmlns:p14="http://schemas.microsoft.com/office/powerpoint/2010/main" val="459082039"/>
+                <p14:modId xmlns:p14="http://schemas.microsoft.com/office/powerpoint/2010/main" val="1275767574"/>
               </p:ext>
             </p:extLst>
           </p:nvPr>
         </p:nvGraphicFramePr>
         <p:xfrm>
-          <a:off x="838200" y="1825625"/>
-          <a:ext cx="10515600" cy="1656080"/>
+          <a:off x="838200" y="1703062"/>
+          <a:ext cx="10515600" cy="3882719"/>
         </p:xfrm>
         <a:graphic>
           <a:graphicData uri="http://schemas.openxmlformats.org/drawingml/2006/table">
@@ -4645,19 +4668,19 @@
                 <a:gridCol w="2688771">
                   <a:extLst>
                     <a:ext uri="{9D8B030D-6E8A-4147-A177-3AD203B41FA5}">
-                      <a16:colId xmlns:a16="http://schemas.microsoft.com/office/drawing/2014/main" val="634955233"/>
+                      <a16:colId xmlns:a16="http://schemas.microsoft.com/office/drawing/2014/main" xmlns="" val="634955233"/>
                     </a:ext>
                   </a:extLst>
                 </a:gridCol>
                 <a:gridCol w="7826829">
                   <a:extLst>
                     <a:ext uri="{9D8B030D-6E8A-4147-A177-3AD203B41FA5}">
-                      <a16:colId xmlns:a16="http://schemas.microsoft.com/office/drawing/2014/main" val="1784330953"/>
+                      <a16:colId xmlns:a16="http://schemas.microsoft.com/office/drawing/2014/main" xmlns="" val="1784330953"/>
                     </a:ext>
                   </a:extLst>
                 </a:gridCol>
               </a:tblGrid>
-              <a:tr h="370840">
+              <a:tr h="1139519">
                 <a:tc>
                   <a:txBody>
                     <a:bodyPr/>
@@ -4681,8 +4704,20 @@
                         <a:buAutoNum type="arabicPeriod"/>
                       </a:pPr>
                       <a:r>
+                        <a:rPr lang="it-IT" dirty="0" err="1" smtClean="0"/>
+                        <a:t>Admin</a:t>
+                      </a:r>
+                      <a:r>
+                        <a:rPr lang="it-IT" baseline="0" dirty="0" smtClean="0"/>
+                        <a:t> a</a:t>
+                      </a:r>
+                      <a:r>
+                        <a:rPr lang="it-IT" dirty="0" smtClean="0"/>
+                        <a:t>ccede </a:t>
+                      </a:r>
+                      <a:r>
                         <a:rPr lang="it-IT" dirty="0"/>
-                        <a:t>Accesso alla Web APP</a:t>
+                        <a:t>alla Web APP</a:t>
                       </a:r>
                       <a:r>
                         <a:rPr lang="it-IT" baseline="0" dirty="0"/>
@@ -4695,9 +4730,10 @@
                         <a:buAutoNum type="arabicPeriod"/>
                       </a:pPr>
                       <a:r>
-                        <a:rPr lang="it-IT" baseline="0"/>
-                        <a:t>Controllo DB </a:t>
-                      </a:r>
+                        <a:rPr lang="it-IT" baseline="0" dirty="0" smtClean="0"/>
+                        <a:t>Ultimo aggiornamento del DB viene messo disponibile</a:t>
+                      </a:r>
+                      <a:endParaRPr lang="it-IT" baseline="0" dirty="0"/>
                     </a:p>
                     <a:p>
                       <a:pPr marL="342900" indent="-342900">
@@ -4705,12 +4741,8 @@
                         <a:buAutoNum type="arabicPeriod"/>
                       </a:pPr>
                       <a:r>
-                        <a:rPr lang="it-IT" baseline="0"/>
-                        <a:t>Aggiunta</a:t>
-                      </a:r>
-                      <a:r>
-                        <a:rPr lang="it-IT" baseline="0" dirty="0"/>
-                        <a:t>/Cambiamento dei dati del DB</a:t>
+                        <a:rPr lang="it-IT" baseline="0" dirty="0" smtClean="0"/>
+                        <a:t>Verifica caricamento flussi giornalieri</a:t>
                       </a:r>
                       <a:endParaRPr lang="it-IT" dirty="0"/>
                     </a:p>
@@ -4719,11 +4751,11 @@
                 </a:tc>
                 <a:extLst>
                   <a:ext uri="{0D108BD9-81ED-4DB2-BD59-A6C34878D82A}">
-                    <a16:rowId xmlns:a16="http://schemas.microsoft.com/office/drawing/2014/main" val="400559187"/>
+                    <a16:rowId xmlns:a16="http://schemas.microsoft.com/office/drawing/2014/main" xmlns="" val="400559187"/>
                   </a:ext>
                 </a:extLst>
               </a:tr>
-              <a:tr h="370840">
+              <a:tr h="462138">
                 <a:tc>
                   <a:txBody>
                     <a:bodyPr/>
@@ -4742,21 +4774,84 @@
                     <a:bodyPr/>
                     <a:lstStyle/>
                     <a:p>
-                      <a:r>
-                        <a:rPr lang="it-IT" dirty="0"/>
-                        <a:t>-</a:t>
-                      </a:r>
+                      <a:pPr marL="342900" indent="-342900">
+                        <a:buFont typeface="+mj-lt"/>
+                        <a:buAutoNum type="arabicPeriod"/>
+                      </a:pPr>
+                      <a:r>
+                        <a:rPr lang="it-IT" dirty="0" err="1" smtClean="0"/>
+                        <a:t>Admin</a:t>
+                      </a:r>
+                      <a:r>
+                        <a:rPr lang="it-IT" baseline="0" dirty="0" smtClean="0"/>
+                        <a:t> accede </a:t>
+                      </a:r>
+                      <a:r>
+                        <a:rPr lang="it-IT" baseline="0" dirty="0" err="1" smtClean="0"/>
+                        <a:t>all</a:t>
+                      </a:r>
+                      <a:r>
+                        <a:rPr lang="it-IT" baseline="0" dirty="0" smtClean="0"/>
+                        <a:t> Web </a:t>
+                      </a:r>
+                      <a:r>
+                        <a:rPr lang="it-IT" baseline="0" dirty="0" err="1" smtClean="0"/>
+                        <a:t>App</a:t>
+                      </a:r>
+                      <a:endParaRPr lang="it-IT" baseline="0" dirty="0" smtClean="0"/>
+                    </a:p>
+                    <a:p>
+                      <a:pPr marL="342900" marR="0" indent="-342900" algn="l" defTabSz="914400" rtl="0" eaLnBrk="1" fontAlgn="auto" latinLnBrk="0" hangingPunct="1">
+                        <a:lnSpc>
+                          <a:spcPct val="100000"/>
+                        </a:lnSpc>
+                        <a:spcBef>
+                          <a:spcPts val="0"/>
+                        </a:spcBef>
+                        <a:spcAft>
+                          <a:spcPts val="0"/>
+                        </a:spcAft>
+                        <a:buClrTx/>
+                        <a:buSzTx/>
+                        <a:buFont typeface="+mj-lt"/>
+                        <a:buAutoNum type="arabicPeriod"/>
+                        <a:tabLst/>
+                        <a:defRPr/>
+                      </a:pPr>
+                      <a:r>
+                        <a:rPr lang="it-IT" baseline="0" dirty="0" smtClean="0"/>
+                        <a:t>Ultimo aggiornamento del DB viene messo disponibile</a:t>
+                      </a:r>
+                    </a:p>
+                    <a:p>
+                      <a:pPr marL="342900" indent="-342900">
+                        <a:buFont typeface="+mj-lt"/>
+                        <a:buAutoNum type="arabicPeriod"/>
+                      </a:pPr>
+                      <a:r>
+                        <a:rPr lang="it-IT" dirty="0" err="1" smtClean="0"/>
+                        <a:t>Admin</a:t>
+                      </a:r>
+                      <a:r>
+                        <a:rPr lang="it-IT" dirty="0" smtClean="0"/>
+                        <a:t> può</a:t>
+                      </a:r>
+                      <a:r>
+                        <a:rPr lang="it-IT" baseline="0" dirty="0" smtClean="0"/>
+                        <a:t> abilitare-disabilitare i Utenti</a:t>
+                      </a:r>
+                      <a:endParaRPr lang="it-IT" dirty="0"/>
                     </a:p>
                   </a:txBody>
                   <a:tcPr/>
                 </a:tc>
                 <a:extLst>
                   <a:ext uri="{0D108BD9-81ED-4DB2-BD59-A6C34878D82A}">
-                    <a16:rowId xmlns:a16="http://schemas.microsoft.com/office/drawing/2014/main" val="286916072"/>
+                    <a16:rowId xmlns:a16="http://schemas.microsoft.com/office/drawing/2014/main" xmlns="" val="286916072"/>
                   </a:ext>
                 </a:extLst>
               </a:tr>
-              <a:tr h="370840">
+              <a:tr h="243198">
                 <a:tc>
                   <a:txBody>
                     <a:bodyPr/>
@@ -4764,8 +4859,17 @@
                     <a:p>
                       <a:r>
                         <a:rPr lang="it-IT" dirty="0"/>
-                        <a:t>Flusso eccezionale 1</a:t>
-                      </a:r>
+                        <a:t>Flusso </a:t>
+                      </a:r>
+                      <a:r>
+                        <a:rPr lang="it-IT" dirty="0" smtClean="0"/>
+                        <a:t>Alternativo</a:t>
+                      </a:r>
+                      <a:r>
+                        <a:rPr lang="it-IT" baseline="0" dirty="0" smtClean="0"/>
+                        <a:t> 2</a:t>
+                      </a:r>
+                      <a:endParaRPr lang="it-IT" dirty="0"/>
                     </a:p>
                   </a:txBody>
                   <a:tcPr/>
@@ -4775,19 +4879,206 @@
                     <a:bodyPr/>
                     <a:lstStyle/>
                     <a:p>
-                      <a:r>
-                        <a:rPr lang="it-IT" dirty="0"/>
-                        <a:t>-</a:t>
-                      </a:r>
+                      <a:pPr marL="342900" marR="0" indent="-342900" algn="l" defTabSz="914400" rtl="0" eaLnBrk="1" fontAlgn="auto" latinLnBrk="0" hangingPunct="1">
+                        <a:lnSpc>
+                          <a:spcPct val="100000"/>
+                        </a:lnSpc>
+                        <a:spcBef>
+                          <a:spcPts val="0"/>
+                        </a:spcBef>
+                        <a:spcAft>
+                          <a:spcPts val="0"/>
+                        </a:spcAft>
+                        <a:buClrTx/>
+                        <a:buSzTx/>
+                        <a:buFont typeface="+mj-lt"/>
+                        <a:buAutoNum type="arabicPeriod"/>
+                        <a:tabLst/>
+                        <a:defRPr/>
+                      </a:pPr>
+                      <a:r>
+                        <a:rPr lang="it-IT" dirty="0" err="1" smtClean="0"/>
+                        <a:t>Admin</a:t>
+                      </a:r>
+                      <a:r>
+                        <a:rPr lang="it-IT" baseline="0" dirty="0" smtClean="0"/>
+                        <a:t> accede </a:t>
+                      </a:r>
+                      <a:r>
+                        <a:rPr lang="it-IT" baseline="0" dirty="0" err="1" smtClean="0"/>
+                        <a:t>all</a:t>
+                      </a:r>
+                      <a:r>
+                        <a:rPr lang="it-IT" baseline="0" dirty="0" smtClean="0"/>
+                        <a:t> Web </a:t>
+                      </a:r>
+                      <a:r>
+                        <a:rPr lang="it-IT" baseline="0" dirty="0" err="1" smtClean="0"/>
+                        <a:t>App</a:t>
+                      </a:r>
+                      <a:endParaRPr lang="it-IT" baseline="0" dirty="0" smtClean="0"/>
+                    </a:p>
+                    <a:p>
+                      <a:pPr marL="342900" marR="0" indent="-342900" algn="l" defTabSz="914400" rtl="0" eaLnBrk="1" fontAlgn="auto" latinLnBrk="0" hangingPunct="1">
+                        <a:lnSpc>
+                          <a:spcPct val="100000"/>
+                        </a:lnSpc>
+                        <a:spcBef>
+                          <a:spcPts val="0"/>
+                        </a:spcBef>
+                        <a:spcAft>
+                          <a:spcPts val="0"/>
+                        </a:spcAft>
+                        <a:buClrTx/>
+                        <a:buSzTx/>
+                        <a:buFont typeface="+mj-lt"/>
+                        <a:buAutoNum type="arabicPeriod"/>
+                        <a:tabLst/>
+                        <a:defRPr/>
+                      </a:pPr>
+                      <a:r>
+                        <a:rPr lang="it-IT" baseline="0" dirty="0" smtClean="0"/>
+                        <a:t>Ultimo aggiornamento del DB viene messo disponibile</a:t>
+                      </a:r>
+                    </a:p>
+                    <a:p>
+                      <a:pPr marL="342900" indent="-342900">
+                        <a:buFont typeface="+mj-lt"/>
+                        <a:buAutoNum type="arabicPeriod"/>
+                      </a:pPr>
+                      <a:r>
+                        <a:rPr lang="it-IT" dirty="0" err="1" smtClean="0"/>
+                        <a:t>Admin</a:t>
+                      </a:r>
+                      <a:r>
+                        <a:rPr lang="it-IT" dirty="0" smtClean="0"/>
+                        <a:t> può</a:t>
+                      </a:r>
+                      <a:r>
+                        <a:rPr lang="it-IT" baseline="0" dirty="0" smtClean="0"/>
+                        <a:t> moderare  le valutazioni gocce</a:t>
+                      </a:r>
+                      <a:endParaRPr lang="it-IT" dirty="0"/>
                     </a:p>
                   </a:txBody>
                   <a:tcPr/>
                 </a:tc>
                 <a:extLst>
                   <a:ext uri="{0D108BD9-81ED-4DB2-BD59-A6C34878D82A}">
-                    <a16:rowId xmlns:a16="http://schemas.microsoft.com/office/drawing/2014/main" val="1276537878"/>
+                    <a16:rowId xmlns:a16="http://schemas.microsoft.com/office/drawing/2014/main" xmlns="" val="1276537878"/>
                   </a:ext>
                 </a:extLst>
+              </a:tr>
+              <a:tr h="243198">
+                <a:tc>
+                  <a:txBody>
+                    <a:bodyPr/>
+                    <a:lstStyle/>
+                    <a:p>
+                      <a:r>
+                        <a:rPr lang="it-IT" dirty="0" smtClean="0"/>
+                        <a:t>Flusso Alternativo 3</a:t>
+                      </a:r>
+                    </a:p>
+                    <a:p>
+                      <a:endParaRPr lang="it-IT" dirty="0"/>
+                    </a:p>
+                  </a:txBody>
+                  <a:tcPr/>
+                </a:tc>
+                <a:tc>
+                  <a:txBody>
+                    <a:bodyPr/>
+                    <a:lstStyle/>
+                    <a:p>
+                      <a:pPr marL="342900" marR="0" indent="-342900" algn="l" defTabSz="914400" rtl="0" eaLnBrk="1" fontAlgn="auto" latinLnBrk="0" hangingPunct="1">
+                        <a:lnSpc>
+                          <a:spcPct val="100000"/>
+                        </a:lnSpc>
+                        <a:spcBef>
+                          <a:spcPts val="0"/>
+                        </a:spcBef>
+                        <a:spcAft>
+                          <a:spcPts val="0"/>
+                        </a:spcAft>
+                        <a:buClrTx/>
+                        <a:buSzTx/>
+                        <a:buFont typeface="+mj-lt"/>
+                        <a:buAutoNum type="arabicPeriod"/>
+                        <a:tabLst/>
+                        <a:defRPr/>
+                      </a:pPr>
+                      <a:r>
+                        <a:rPr lang="it-IT" dirty="0" err="1" smtClean="0"/>
+                        <a:t>Admin</a:t>
+                      </a:r>
+                      <a:r>
+                        <a:rPr lang="it-IT" baseline="0" dirty="0" smtClean="0"/>
+                        <a:t> accede </a:t>
+                      </a:r>
+                      <a:r>
+                        <a:rPr lang="it-IT" baseline="0" dirty="0" err="1" smtClean="0"/>
+                        <a:t>all</a:t>
+                      </a:r>
+                      <a:r>
+                        <a:rPr lang="it-IT" baseline="0" dirty="0" smtClean="0"/>
+                        <a:t> Web </a:t>
+                      </a:r>
+                      <a:r>
+                        <a:rPr lang="it-IT" baseline="0" dirty="0" err="1" smtClean="0"/>
+                        <a:t>App</a:t>
+                      </a:r>
+                      <a:endParaRPr lang="it-IT" baseline="0" dirty="0" smtClean="0"/>
+                    </a:p>
+                    <a:p>
+                      <a:pPr marL="342900" marR="0" indent="-342900" algn="l" defTabSz="914400" rtl="0" eaLnBrk="1" fontAlgn="auto" latinLnBrk="0" hangingPunct="1">
+                        <a:lnSpc>
+                          <a:spcPct val="100000"/>
+                        </a:lnSpc>
+                        <a:spcBef>
+                          <a:spcPts val="0"/>
+                        </a:spcBef>
+                        <a:spcAft>
+                          <a:spcPts val="0"/>
+                        </a:spcAft>
+                        <a:buClrTx/>
+                        <a:buSzTx/>
+                        <a:buFont typeface="+mj-lt"/>
+                        <a:buAutoNum type="arabicPeriod"/>
+                        <a:tabLst/>
+                        <a:defRPr/>
+                      </a:pPr>
+                      <a:r>
+                        <a:rPr lang="it-IT" baseline="0" dirty="0" smtClean="0"/>
+                        <a:t>Ultimo aggiornamento del DB viene messo disponibile</a:t>
+                      </a:r>
+                    </a:p>
+                    <a:p>
+                      <a:pPr marL="342900" indent="-342900">
+                        <a:buFont typeface="+mj-lt"/>
+                        <a:buAutoNum type="arabicPeriod"/>
+                      </a:pPr>
+                      <a:r>
+                        <a:rPr lang="it-IT" dirty="0" err="1" smtClean="0"/>
+                        <a:t>Admin</a:t>
+                      </a:r>
+                      <a:r>
+                        <a:rPr lang="it-IT" dirty="0" smtClean="0"/>
+                        <a:t> </a:t>
+                      </a:r>
+                      <a:r>
+                        <a:rPr lang="it-IT" dirty="0" err="1" smtClean="0"/>
+                        <a:t>amminisra</a:t>
+                      </a:r>
+                      <a:r>
+                        <a:rPr lang="it-IT" dirty="0" smtClean="0"/>
+                        <a:t> la sezione News</a:t>
+                      </a:r>
+                      <a:endParaRPr lang="it-IT" dirty="0"/>
+                    </a:p>
+                  </a:txBody>
+                  <a:tcPr/>
+                </a:tc>
               </a:tr>
             </a:tbl>
           </a:graphicData>
@@ -4798,7 +5089,7 @@
           <p:cNvPr id="8" name="Elemento grafico 7" descr="Flusso di lavoro">
             <a:extLst>
               <a:ext uri="{FF2B5EF4-FFF2-40B4-BE49-F238E27FC236}">
-                <a16:creationId xmlns:a16="http://schemas.microsoft.com/office/drawing/2014/main" id="{A495AF70-8473-45AA-80C8-B98D01FB12D2}"/>
+                <a16:creationId xmlns:a16="http://schemas.microsoft.com/office/drawing/2014/main" xmlns="" id="{A495AF70-8473-45AA-80C8-B98D01FB12D2}"/>
               </a:ext>
             </a:extLst>
           </p:cNvPr>
@@ -4814,7 +5105,7 @@
                 <a14:useLocalDpi xmlns:a14="http://schemas.microsoft.com/office/drawing/2010/main" val="0"/>
               </a:ext>
               <a:ext uri="{96DAC541-7B7A-43D3-8B79-37D633B846F1}">
-                <asvg:svgBlip xmlns:asvg="http://schemas.microsoft.com/office/drawing/2016/SVG/main" r:embed="rId3"/>
+                <asvg:svgBlip xmlns:asvg="http://schemas.microsoft.com/office/drawing/2016/SVG/main" xmlns="" r:embed="rId3"/>
               </a:ext>
             </a:extLst>
           </a:blip>
@@ -4842,6 +5133,13 @@
   <p:clrMapOvr>
     <a:masterClrMapping/>
   </p:clrMapOvr>
+  <p:timing>
+    <p:tnLst>
+      <p:par>
+        <p:cTn id="1" dur="indefinite" restart="never" nodeType="tmRoot"/>
+      </p:par>
+    </p:tnLst>
+  </p:timing>
 </p:sld>
 </file>
 
@@ -5134,7 +5432,7 @@
   <a:extraClrSchemeLst/>
   <a:extLst>
     <a:ext uri="{05A4C25C-085E-4340-85A3-A5531E510DB2}">
-      <thm15:themeFamily xmlns:thm15="http://schemas.microsoft.com/office/thememl/2012/main" name="Office Theme" id="{62F939B6-93AF-4DB8-9C6B-D6C7DFDC589F}" vid="{4A3C46E8-61CC-4603-A589-7422A47A8E4A}"/>
+      <thm15:themeFamily xmlns:thm15="http://schemas.microsoft.com/office/thememl/2012/main" xmlns="" name="Office Theme" id="{62F939B6-93AF-4DB8-9C6B-D6C7DFDC589F}" vid="{4A3C46E8-61CC-4603-A589-7422A47A8E4A}"/>
     </a:ext>
   </a:extLst>
 </a:theme>

</xml_diff>

<commit_message>
Flusso alternativo DB Admin
</commit_message>
<xml_diff>
--- a/docs/analisi/Template use case/Template Use Case - Gestione DB.pptx
+++ b/docs/analisi/Template use case/Template Use Case - Gestione DB.pptx
@@ -109,7 +109,7 @@
   </p:defaultTextStyle>
   <p:extLst>
     <p:ext uri="{EFAFB233-063F-42B5-8137-9DF3F51BA10A}">
-      <p15:sldGuideLst xmlns:p15="http://schemas.microsoft.com/office/powerpoint/2012/main" xmlns="">
+      <p15:sldGuideLst xmlns="" xmlns:p15="http://schemas.microsoft.com/office/powerpoint/2012/main">
         <p15:guide id="1" orient="horz" pos="2160">
           <p15:clr>
             <a:srgbClr val="A4A3A4"/>
@@ -302,7 +302,7 @@
           <p:cNvPr id="2" name="Titolo 1">
             <a:extLst>
               <a:ext uri="{FF2B5EF4-FFF2-40B4-BE49-F238E27FC236}">
-                <a16:creationId xmlns:a16="http://schemas.microsoft.com/office/drawing/2014/main" xmlns="" id="{CFBF2858-9FF9-49F6-9325-A5B5D4185723}"/>
+                <a16:creationId xmlns="" xmlns:a16="http://schemas.microsoft.com/office/drawing/2014/main" id="{CFBF2858-9FF9-49F6-9325-A5B5D4185723}"/>
               </a:ext>
             </a:extLst>
           </p:cNvPr>
@@ -339,7 +339,7 @@
           <p:cNvPr id="3" name="Sottotitolo 2">
             <a:extLst>
               <a:ext uri="{FF2B5EF4-FFF2-40B4-BE49-F238E27FC236}">
-                <a16:creationId xmlns:a16="http://schemas.microsoft.com/office/drawing/2014/main" xmlns="" id="{4B21D84B-ED35-4CD0-B889-7022650B2578}"/>
+                <a16:creationId xmlns="" xmlns:a16="http://schemas.microsoft.com/office/drawing/2014/main" id="{4B21D84B-ED35-4CD0-B889-7022650B2578}"/>
               </a:ext>
             </a:extLst>
           </p:cNvPr>
@@ -409,7 +409,7 @@
           <p:cNvPr id="4" name="Segnaposto data 3">
             <a:extLst>
               <a:ext uri="{FF2B5EF4-FFF2-40B4-BE49-F238E27FC236}">
-                <a16:creationId xmlns:a16="http://schemas.microsoft.com/office/drawing/2014/main" xmlns="" id="{E66C651E-1356-4A58-BA17-ECFD882A1A0D}"/>
+                <a16:creationId xmlns="" xmlns:a16="http://schemas.microsoft.com/office/drawing/2014/main" id="{E66C651E-1356-4A58-BA17-ECFD882A1A0D}"/>
               </a:ext>
             </a:extLst>
           </p:cNvPr>
@@ -438,7 +438,7 @@
           <p:cNvPr id="5" name="Segnaposto piè di pagina 4">
             <a:extLst>
               <a:ext uri="{FF2B5EF4-FFF2-40B4-BE49-F238E27FC236}">
-                <a16:creationId xmlns:a16="http://schemas.microsoft.com/office/drawing/2014/main" xmlns="" id="{74328D79-8461-43BC-84DA-249AF43BC14A}"/>
+                <a16:creationId xmlns="" xmlns:a16="http://schemas.microsoft.com/office/drawing/2014/main" id="{74328D79-8461-43BC-84DA-249AF43BC14A}"/>
               </a:ext>
             </a:extLst>
           </p:cNvPr>
@@ -463,7 +463,7 @@
           <p:cNvPr id="6" name="Segnaposto numero diapositiva 5">
             <a:extLst>
               <a:ext uri="{FF2B5EF4-FFF2-40B4-BE49-F238E27FC236}">
-                <a16:creationId xmlns:a16="http://schemas.microsoft.com/office/drawing/2014/main" xmlns="" id="{816387D6-94E6-47FE-871A-C8EF03F29BDB}"/>
+                <a16:creationId xmlns="" xmlns:a16="http://schemas.microsoft.com/office/drawing/2014/main" id="{816387D6-94E6-47FE-871A-C8EF03F29BDB}"/>
               </a:ext>
             </a:extLst>
           </p:cNvPr>
@@ -522,7 +522,7 @@
           <p:cNvPr id="2" name="Titolo 1">
             <a:extLst>
               <a:ext uri="{FF2B5EF4-FFF2-40B4-BE49-F238E27FC236}">
-                <a16:creationId xmlns:a16="http://schemas.microsoft.com/office/drawing/2014/main" xmlns="" id="{F59AC4B1-2C56-4BBF-A05F-D9500F78FEB9}"/>
+                <a16:creationId xmlns="" xmlns:a16="http://schemas.microsoft.com/office/drawing/2014/main" id="{F59AC4B1-2C56-4BBF-A05F-D9500F78FEB9}"/>
               </a:ext>
             </a:extLst>
           </p:cNvPr>
@@ -550,7 +550,7 @@
           <p:cNvPr id="3" name="Segnaposto testo verticale 2">
             <a:extLst>
               <a:ext uri="{FF2B5EF4-FFF2-40B4-BE49-F238E27FC236}">
-                <a16:creationId xmlns:a16="http://schemas.microsoft.com/office/drawing/2014/main" xmlns="" id="{90389E8C-63A3-42AB-93CD-0F8792454FCC}"/>
+                <a16:creationId xmlns="" xmlns:a16="http://schemas.microsoft.com/office/drawing/2014/main" id="{90389E8C-63A3-42AB-93CD-0F8792454FCC}"/>
               </a:ext>
             </a:extLst>
           </p:cNvPr>
@@ -607,7 +607,7 @@
           <p:cNvPr id="4" name="Segnaposto data 3">
             <a:extLst>
               <a:ext uri="{FF2B5EF4-FFF2-40B4-BE49-F238E27FC236}">
-                <a16:creationId xmlns:a16="http://schemas.microsoft.com/office/drawing/2014/main" xmlns="" id="{254FADA6-B05E-4B35-A06A-2022D2DBEC26}"/>
+                <a16:creationId xmlns="" xmlns:a16="http://schemas.microsoft.com/office/drawing/2014/main" id="{254FADA6-B05E-4B35-A06A-2022D2DBEC26}"/>
               </a:ext>
             </a:extLst>
           </p:cNvPr>
@@ -636,7 +636,7 @@
           <p:cNvPr id="5" name="Segnaposto piè di pagina 4">
             <a:extLst>
               <a:ext uri="{FF2B5EF4-FFF2-40B4-BE49-F238E27FC236}">
-                <a16:creationId xmlns:a16="http://schemas.microsoft.com/office/drawing/2014/main" xmlns="" id="{0631869E-DF6C-4226-B729-2123308FE398}"/>
+                <a16:creationId xmlns="" xmlns:a16="http://schemas.microsoft.com/office/drawing/2014/main" id="{0631869E-DF6C-4226-B729-2123308FE398}"/>
               </a:ext>
             </a:extLst>
           </p:cNvPr>
@@ -661,7 +661,7 @@
           <p:cNvPr id="6" name="Segnaposto numero diapositiva 5">
             <a:extLst>
               <a:ext uri="{FF2B5EF4-FFF2-40B4-BE49-F238E27FC236}">
-                <a16:creationId xmlns:a16="http://schemas.microsoft.com/office/drawing/2014/main" xmlns="" id="{5EBEEC90-B83C-4DEE-937E-C7EC1D025508}"/>
+                <a16:creationId xmlns="" xmlns:a16="http://schemas.microsoft.com/office/drawing/2014/main" id="{5EBEEC90-B83C-4DEE-937E-C7EC1D025508}"/>
               </a:ext>
             </a:extLst>
           </p:cNvPr>
@@ -720,7 +720,7 @@
           <p:cNvPr id="2" name="Titolo verticale 1">
             <a:extLst>
               <a:ext uri="{FF2B5EF4-FFF2-40B4-BE49-F238E27FC236}">
-                <a16:creationId xmlns:a16="http://schemas.microsoft.com/office/drawing/2014/main" xmlns="" id="{30E33601-4D9B-4E96-B3C3-AB65F0C81F37}"/>
+                <a16:creationId xmlns="" xmlns:a16="http://schemas.microsoft.com/office/drawing/2014/main" id="{30E33601-4D9B-4E96-B3C3-AB65F0C81F37}"/>
               </a:ext>
             </a:extLst>
           </p:cNvPr>
@@ -753,7 +753,7 @@
           <p:cNvPr id="3" name="Segnaposto testo verticale 2">
             <a:extLst>
               <a:ext uri="{FF2B5EF4-FFF2-40B4-BE49-F238E27FC236}">
-                <a16:creationId xmlns:a16="http://schemas.microsoft.com/office/drawing/2014/main" xmlns="" id="{FEDAA464-5CD2-4C93-83F5-E13251F55648}"/>
+                <a16:creationId xmlns="" xmlns:a16="http://schemas.microsoft.com/office/drawing/2014/main" id="{FEDAA464-5CD2-4C93-83F5-E13251F55648}"/>
               </a:ext>
             </a:extLst>
           </p:cNvPr>
@@ -815,7 +815,7 @@
           <p:cNvPr id="4" name="Segnaposto data 3">
             <a:extLst>
               <a:ext uri="{FF2B5EF4-FFF2-40B4-BE49-F238E27FC236}">
-                <a16:creationId xmlns:a16="http://schemas.microsoft.com/office/drawing/2014/main" xmlns="" id="{F61719B4-CD99-4540-BEA4-8B7884B7C59C}"/>
+                <a16:creationId xmlns="" xmlns:a16="http://schemas.microsoft.com/office/drawing/2014/main" id="{F61719B4-CD99-4540-BEA4-8B7884B7C59C}"/>
               </a:ext>
             </a:extLst>
           </p:cNvPr>
@@ -844,7 +844,7 @@
           <p:cNvPr id="5" name="Segnaposto piè di pagina 4">
             <a:extLst>
               <a:ext uri="{FF2B5EF4-FFF2-40B4-BE49-F238E27FC236}">
-                <a16:creationId xmlns:a16="http://schemas.microsoft.com/office/drawing/2014/main" xmlns="" id="{30F0B4A5-E6FA-4C78-86A7-F528FA130059}"/>
+                <a16:creationId xmlns="" xmlns:a16="http://schemas.microsoft.com/office/drawing/2014/main" id="{30F0B4A5-E6FA-4C78-86A7-F528FA130059}"/>
               </a:ext>
             </a:extLst>
           </p:cNvPr>
@@ -869,7 +869,7 @@
           <p:cNvPr id="6" name="Segnaposto numero diapositiva 5">
             <a:extLst>
               <a:ext uri="{FF2B5EF4-FFF2-40B4-BE49-F238E27FC236}">
-                <a16:creationId xmlns:a16="http://schemas.microsoft.com/office/drawing/2014/main" xmlns="" id="{442BF533-5946-4F10-92FC-3CD5053CF4D8}"/>
+                <a16:creationId xmlns="" xmlns:a16="http://schemas.microsoft.com/office/drawing/2014/main" id="{442BF533-5946-4F10-92FC-3CD5053CF4D8}"/>
               </a:ext>
             </a:extLst>
           </p:cNvPr>
@@ -928,7 +928,7 @@
           <p:cNvPr id="2" name="Titolo 1">
             <a:extLst>
               <a:ext uri="{FF2B5EF4-FFF2-40B4-BE49-F238E27FC236}">
-                <a16:creationId xmlns:a16="http://schemas.microsoft.com/office/drawing/2014/main" xmlns="" id="{8D324EC4-C5F5-4344-815B-63064E440846}"/>
+                <a16:creationId xmlns="" xmlns:a16="http://schemas.microsoft.com/office/drawing/2014/main" id="{8D324EC4-C5F5-4344-815B-63064E440846}"/>
               </a:ext>
             </a:extLst>
           </p:cNvPr>
@@ -956,7 +956,7 @@
           <p:cNvPr id="3" name="Segnaposto contenuto 2">
             <a:extLst>
               <a:ext uri="{FF2B5EF4-FFF2-40B4-BE49-F238E27FC236}">
-                <a16:creationId xmlns:a16="http://schemas.microsoft.com/office/drawing/2014/main" xmlns="" id="{55775342-FE66-4A01-9E0A-B6DFF50813CF}"/>
+                <a16:creationId xmlns="" xmlns:a16="http://schemas.microsoft.com/office/drawing/2014/main" id="{55775342-FE66-4A01-9E0A-B6DFF50813CF}"/>
               </a:ext>
             </a:extLst>
           </p:cNvPr>
@@ -1013,7 +1013,7 @@
           <p:cNvPr id="4" name="Segnaposto data 3">
             <a:extLst>
               <a:ext uri="{FF2B5EF4-FFF2-40B4-BE49-F238E27FC236}">
-                <a16:creationId xmlns:a16="http://schemas.microsoft.com/office/drawing/2014/main" xmlns="" id="{397A9FE5-70AC-44CE-914B-A1E1953D424A}"/>
+                <a16:creationId xmlns="" xmlns:a16="http://schemas.microsoft.com/office/drawing/2014/main" id="{397A9FE5-70AC-44CE-914B-A1E1953D424A}"/>
               </a:ext>
             </a:extLst>
           </p:cNvPr>
@@ -1042,7 +1042,7 @@
           <p:cNvPr id="5" name="Segnaposto piè di pagina 4">
             <a:extLst>
               <a:ext uri="{FF2B5EF4-FFF2-40B4-BE49-F238E27FC236}">
-                <a16:creationId xmlns:a16="http://schemas.microsoft.com/office/drawing/2014/main" xmlns="" id="{955E82A6-47E5-4A43-8C14-EB032BC59D50}"/>
+                <a16:creationId xmlns="" xmlns:a16="http://schemas.microsoft.com/office/drawing/2014/main" id="{955E82A6-47E5-4A43-8C14-EB032BC59D50}"/>
               </a:ext>
             </a:extLst>
           </p:cNvPr>
@@ -1067,7 +1067,7 @@
           <p:cNvPr id="6" name="Segnaposto numero diapositiva 5">
             <a:extLst>
               <a:ext uri="{FF2B5EF4-FFF2-40B4-BE49-F238E27FC236}">
-                <a16:creationId xmlns:a16="http://schemas.microsoft.com/office/drawing/2014/main" xmlns="" id="{58E8D349-F894-470A-B25E-2196ABC42040}"/>
+                <a16:creationId xmlns="" xmlns:a16="http://schemas.microsoft.com/office/drawing/2014/main" id="{58E8D349-F894-470A-B25E-2196ABC42040}"/>
               </a:ext>
             </a:extLst>
           </p:cNvPr>
@@ -1126,7 +1126,7 @@
           <p:cNvPr id="2" name="Titolo 1">
             <a:extLst>
               <a:ext uri="{FF2B5EF4-FFF2-40B4-BE49-F238E27FC236}">
-                <a16:creationId xmlns:a16="http://schemas.microsoft.com/office/drawing/2014/main" xmlns="" id="{FF8A343A-BEE9-48C2-8F08-6D02BD514F3F}"/>
+                <a16:creationId xmlns="" xmlns:a16="http://schemas.microsoft.com/office/drawing/2014/main" id="{FF8A343A-BEE9-48C2-8F08-6D02BD514F3F}"/>
               </a:ext>
             </a:extLst>
           </p:cNvPr>
@@ -1163,7 +1163,7 @@
           <p:cNvPr id="3" name="Segnaposto testo 2">
             <a:extLst>
               <a:ext uri="{FF2B5EF4-FFF2-40B4-BE49-F238E27FC236}">
-                <a16:creationId xmlns:a16="http://schemas.microsoft.com/office/drawing/2014/main" xmlns="" id="{0909A412-AD76-4989-B06E-E33E0F00580E}"/>
+                <a16:creationId xmlns="" xmlns:a16="http://schemas.microsoft.com/office/drawing/2014/main" id="{0909A412-AD76-4989-B06E-E33E0F00580E}"/>
               </a:ext>
             </a:extLst>
           </p:cNvPr>
@@ -1288,7 +1288,7 @@
           <p:cNvPr id="4" name="Segnaposto data 3">
             <a:extLst>
               <a:ext uri="{FF2B5EF4-FFF2-40B4-BE49-F238E27FC236}">
-                <a16:creationId xmlns:a16="http://schemas.microsoft.com/office/drawing/2014/main" xmlns="" id="{16318882-43E1-4C25-B100-9FE081333575}"/>
+                <a16:creationId xmlns="" xmlns:a16="http://schemas.microsoft.com/office/drawing/2014/main" id="{16318882-43E1-4C25-B100-9FE081333575}"/>
               </a:ext>
             </a:extLst>
           </p:cNvPr>
@@ -1317,7 +1317,7 @@
           <p:cNvPr id="5" name="Segnaposto piè di pagina 4">
             <a:extLst>
               <a:ext uri="{FF2B5EF4-FFF2-40B4-BE49-F238E27FC236}">
-                <a16:creationId xmlns:a16="http://schemas.microsoft.com/office/drawing/2014/main" xmlns="" id="{C6C78431-C23D-4359-9F41-506C478EC2A0}"/>
+                <a16:creationId xmlns="" xmlns:a16="http://schemas.microsoft.com/office/drawing/2014/main" id="{C6C78431-C23D-4359-9F41-506C478EC2A0}"/>
               </a:ext>
             </a:extLst>
           </p:cNvPr>
@@ -1342,7 +1342,7 @@
           <p:cNvPr id="6" name="Segnaposto numero diapositiva 5">
             <a:extLst>
               <a:ext uri="{FF2B5EF4-FFF2-40B4-BE49-F238E27FC236}">
-                <a16:creationId xmlns:a16="http://schemas.microsoft.com/office/drawing/2014/main" xmlns="" id="{DCF015C2-4C12-42A4-9944-4B1FE7A7FFB1}"/>
+                <a16:creationId xmlns="" xmlns:a16="http://schemas.microsoft.com/office/drawing/2014/main" id="{DCF015C2-4C12-42A4-9944-4B1FE7A7FFB1}"/>
               </a:ext>
             </a:extLst>
           </p:cNvPr>
@@ -1401,7 +1401,7 @@
           <p:cNvPr id="2" name="Titolo 1">
             <a:extLst>
               <a:ext uri="{FF2B5EF4-FFF2-40B4-BE49-F238E27FC236}">
-                <a16:creationId xmlns:a16="http://schemas.microsoft.com/office/drawing/2014/main" xmlns="" id="{7650FD1C-41AC-4FD0-8AF4-B2BFB5ECBDC7}"/>
+                <a16:creationId xmlns="" xmlns:a16="http://schemas.microsoft.com/office/drawing/2014/main" id="{7650FD1C-41AC-4FD0-8AF4-B2BFB5ECBDC7}"/>
               </a:ext>
             </a:extLst>
           </p:cNvPr>
@@ -1429,7 +1429,7 @@
           <p:cNvPr id="3" name="Segnaposto contenuto 2">
             <a:extLst>
               <a:ext uri="{FF2B5EF4-FFF2-40B4-BE49-F238E27FC236}">
-                <a16:creationId xmlns:a16="http://schemas.microsoft.com/office/drawing/2014/main" xmlns="" id="{DD16E77D-6E44-4E42-B7EA-AA87E0A9DBF9}"/>
+                <a16:creationId xmlns="" xmlns:a16="http://schemas.microsoft.com/office/drawing/2014/main" id="{DD16E77D-6E44-4E42-B7EA-AA87E0A9DBF9}"/>
               </a:ext>
             </a:extLst>
           </p:cNvPr>
@@ -1491,7 +1491,7 @@
           <p:cNvPr id="4" name="Segnaposto contenuto 3">
             <a:extLst>
               <a:ext uri="{FF2B5EF4-FFF2-40B4-BE49-F238E27FC236}">
-                <a16:creationId xmlns:a16="http://schemas.microsoft.com/office/drawing/2014/main" xmlns="" id="{844F8AF1-BDF4-4BB6-AA12-D9E74887B7AA}"/>
+                <a16:creationId xmlns="" xmlns:a16="http://schemas.microsoft.com/office/drawing/2014/main" id="{844F8AF1-BDF4-4BB6-AA12-D9E74887B7AA}"/>
               </a:ext>
             </a:extLst>
           </p:cNvPr>
@@ -1553,7 +1553,7 @@
           <p:cNvPr id="5" name="Segnaposto data 4">
             <a:extLst>
               <a:ext uri="{FF2B5EF4-FFF2-40B4-BE49-F238E27FC236}">
-                <a16:creationId xmlns:a16="http://schemas.microsoft.com/office/drawing/2014/main" xmlns="" id="{64E49264-4D9E-4F69-ADBE-5FCE7E088F87}"/>
+                <a16:creationId xmlns="" xmlns:a16="http://schemas.microsoft.com/office/drawing/2014/main" id="{64E49264-4D9E-4F69-ADBE-5FCE7E088F87}"/>
               </a:ext>
             </a:extLst>
           </p:cNvPr>
@@ -1582,7 +1582,7 @@
           <p:cNvPr id="6" name="Segnaposto piè di pagina 5">
             <a:extLst>
               <a:ext uri="{FF2B5EF4-FFF2-40B4-BE49-F238E27FC236}">
-                <a16:creationId xmlns:a16="http://schemas.microsoft.com/office/drawing/2014/main" xmlns="" id="{6BD94B07-3F97-448F-A14A-F799F51B318D}"/>
+                <a16:creationId xmlns="" xmlns:a16="http://schemas.microsoft.com/office/drawing/2014/main" id="{6BD94B07-3F97-448F-A14A-F799F51B318D}"/>
               </a:ext>
             </a:extLst>
           </p:cNvPr>
@@ -1607,7 +1607,7 @@
           <p:cNvPr id="7" name="Segnaposto numero diapositiva 6">
             <a:extLst>
               <a:ext uri="{FF2B5EF4-FFF2-40B4-BE49-F238E27FC236}">
-                <a16:creationId xmlns:a16="http://schemas.microsoft.com/office/drawing/2014/main" xmlns="" id="{B0CD1917-F8A2-456F-82E6-C095438948B0}"/>
+                <a16:creationId xmlns="" xmlns:a16="http://schemas.microsoft.com/office/drawing/2014/main" id="{B0CD1917-F8A2-456F-82E6-C095438948B0}"/>
               </a:ext>
             </a:extLst>
           </p:cNvPr>
@@ -1666,7 +1666,7 @@
           <p:cNvPr id="2" name="Titolo 1">
             <a:extLst>
               <a:ext uri="{FF2B5EF4-FFF2-40B4-BE49-F238E27FC236}">
-                <a16:creationId xmlns:a16="http://schemas.microsoft.com/office/drawing/2014/main" xmlns="" id="{B58BF815-104D-4049-9B9F-5BEFA614935C}"/>
+                <a16:creationId xmlns="" xmlns:a16="http://schemas.microsoft.com/office/drawing/2014/main" id="{B58BF815-104D-4049-9B9F-5BEFA614935C}"/>
               </a:ext>
             </a:extLst>
           </p:cNvPr>
@@ -1699,7 +1699,7 @@
           <p:cNvPr id="3" name="Segnaposto testo 2">
             <a:extLst>
               <a:ext uri="{FF2B5EF4-FFF2-40B4-BE49-F238E27FC236}">
-                <a16:creationId xmlns:a16="http://schemas.microsoft.com/office/drawing/2014/main" xmlns="" id="{CAE85FF7-9C0E-4DB9-A6AB-9133F631A4B3}"/>
+                <a16:creationId xmlns="" xmlns:a16="http://schemas.microsoft.com/office/drawing/2014/main" id="{CAE85FF7-9C0E-4DB9-A6AB-9133F631A4B3}"/>
               </a:ext>
             </a:extLst>
           </p:cNvPr>
@@ -1770,7 +1770,7 @@
           <p:cNvPr id="4" name="Segnaposto contenuto 3">
             <a:extLst>
               <a:ext uri="{FF2B5EF4-FFF2-40B4-BE49-F238E27FC236}">
-                <a16:creationId xmlns:a16="http://schemas.microsoft.com/office/drawing/2014/main" xmlns="" id="{31A1FF07-A483-4CBC-B502-D2040A241C59}"/>
+                <a16:creationId xmlns="" xmlns:a16="http://schemas.microsoft.com/office/drawing/2014/main" id="{31A1FF07-A483-4CBC-B502-D2040A241C59}"/>
               </a:ext>
             </a:extLst>
           </p:cNvPr>
@@ -1832,7 +1832,7 @@
           <p:cNvPr id="5" name="Segnaposto testo 4">
             <a:extLst>
               <a:ext uri="{FF2B5EF4-FFF2-40B4-BE49-F238E27FC236}">
-                <a16:creationId xmlns:a16="http://schemas.microsoft.com/office/drawing/2014/main" xmlns="" id="{30D9E67F-0023-4AD8-8149-34BD4C055D4E}"/>
+                <a16:creationId xmlns="" xmlns:a16="http://schemas.microsoft.com/office/drawing/2014/main" id="{30D9E67F-0023-4AD8-8149-34BD4C055D4E}"/>
               </a:ext>
             </a:extLst>
           </p:cNvPr>
@@ -1903,7 +1903,7 @@
           <p:cNvPr id="6" name="Segnaposto contenuto 5">
             <a:extLst>
               <a:ext uri="{FF2B5EF4-FFF2-40B4-BE49-F238E27FC236}">
-                <a16:creationId xmlns:a16="http://schemas.microsoft.com/office/drawing/2014/main" xmlns="" id="{23831668-98C0-4979-87D7-959474A9085E}"/>
+                <a16:creationId xmlns="" xmlns:a16="http://schemas.microsoft.com/office/drawing/2014/main" id="{23831668-98C0-4979-87D7-959474A9085E}"/>
               </a:ext>
             </a:extLst>
           </p:cNvPr>
@@ -1965,7 +1965,7 @@
           <p:cNvPr id="7" name="Segnaposto data 6">
             <a:extLst>
               <a:ext uri="{FF2B5EF4-FFF2-40B4-BE49-F238E27FC236}">
-                <a16:creationId xmlns:a16="http://schemas.microsoft.com/office/drawing/2014/main" xmlns="" id="{91B922F5-7D11-4052-AF29-AA3B75B06734}"/>
+                <a16:creationId xmlns="" xmlns:a16="http://schemas.microsoft.com/office/drawing/2014/main" id="{91B922F5-7D11-4052-AF29-AA3B75B06734}"/>
               </a:ext>
             </a:extLst>
           </p:cNvPr>
@@ -1994,7 +1994,7 @@
           <p:cNvPr id="8" name="Segnaposto piè di pagina 7">
             <a:extLst>
               <a:ext uri="{FF2B5EF4-FFF2-40B4-BE49-F238E27FC236}">
-                <a16:creationId xmlns:a16="http://schemas.microsoft.com/office/drawing/2014/main" xmlns="" id="{6EA02A2F-7388-4F42-A4C6-2A7660ED38E4}"/>
+                <a16:creationId xmlns="" xmlns:a16="http://schemas.microsoft.com/office/drawing/2014/main" id="{6EA02A2F-7388-4F42-A4C6-2A7660ED38E4}"/>
               </a:ext>
             </a:extLst>
           </p:cNvPr>
@@ -2019,7 +2019,7 @@
           <p:cNvPr id="9" name="Segnaposto numero diapositiva 8">
             <a:extLst>
               <a:ext uri="{FF2B5EF4-FFF2-40B4-BE49-F238E27FC236}">
-                <a16:creationId xmlns:a16="http://schemas.microsoft.com/office/drawing/2014/main" xmlns="" id="{CB48DB9B-4650-4AD2-89EF-29E9A37B5E48}"/>
+                <a16:creationId xmlns="" xmlns:a16="http://schemas.microsoft.com/office/drawing/2014/main" id="{CB48DB9B-4650-4AD2-89EF-29E9A37B5E48}"/>
               </a:ext>
             </a:extLst>
           </p:cNvPr>
@@ -2078,7 +2078,7 @@
           <p:cNvPr id="2" name="Titolo 1">
             <a:extLst>
               <a:ext uri="{FF2B5EF4-FFF2-40B4-BE49-F238E27FC236}">
-                <a16:creationId xmlns:a16="http://schemas.microsoft.com/office/drawing/2014/main" xmlns="" id="{7FEFC453-E380-4034-875E-863F49914714}"/>
+                <a16:creationId xmlns="" xmlns:a16="http://schemas.microsoft.com/office/drawing/2014/main" id="{7FEFC453-E380-4034-875E-863F49914714}"/>
               </a:ext>
             </a:extLst>
           </p:cNvPr>
@@ -2106,7 +2106,7 @@
           <p:cNvPr id="3" name="Segnaposto data 2">
             <a:extLst>
               <a:ext uri="{FF2B5EF4-FFF2-40B4-BE49-F238E27FC236}">
-                <a16:creationId xmlns:a16="http://schemas.microsoft.com/office/drawing/2014/main" xmlns="" id="{5BC16F08-373A-43EF-8FBC-2D846E43D6B9}"/>
+                <a16:creationId xmlns="" xmlns:a16="http://schemas.microsoft.com/office/drawing/2014/main" id="{5BC16F08-373A-43EF-8FBC-2D846E43D6B9}"/>
               </a:ext>
             </a:extLst>
           </p:cNvPr>
@@ -2135,7 +2135,7 @@
           <p:cNvPr id="4" name="Segnaposto piè di pagina 3">
             <a:extLst>
               <a:ext uri="{FF2B5EF4-FFF2-40B4-BE49-F238E27FC236}">
-                <a16:creationId xmlns:a16="http://schemas.microsoft.com/office/drawing/2014/main" xmlns="" id="{2A78CDAE-3535-434E-BF92-560FEDD6C387}"/>
+                <a16:creationId xmlns="" xmlns:a16="http://schemas.microsoft.com/office/drawing/2014/main" id="{2A78CDAE-3535-434E-BF92-560FEDD6C387}"/>
               </a:ext>
             </a:extLst>
           </p:cNvPr>
@@ -2160,7 +2160,7 @@
           <p:cNvPr id="5" name="Segnaposto numero diapositiva 4">
             <a:extLst>
               <a:ext uri="{FF2B5EF4-FFF2-40B4-BE49-F238E27FC236}">
-                <a16:creationId xmlns:a16="http://schemas.microsoft.com/office/drawing/2014/main" xmlns="" id="{FAD2588D-B079-4FE5-B454-629CF3E310A3}"/>
+                <a16:creationId xmlns="" xmlns:a16="http://schemas.microsoft.com/office/drawing/2014/main" id="{FAD2588D-B079-4FE5-B454-629CF3E310A3}"/>
               </a:ext>
             </a:extLst>
           </p:cNvPr>
@@ -2219,7 +2219,7 @@
           <p:cNvPr id="2" name="Segnaposto data 1">
             <a:extLst>
               <a:ext uri="{FF2B5EF4-FFF2-40B4-BE49-F238E27FC236}">
-                <a16:creationId xmlns:a16="http://schemas.microsoft.com/office/drawing/2014/main" xmlns="" id="{D9E26DD7-8914-4A23-85B9-0C03B3ACA40C}"/>
+                <a16:creationId xmlns="" xmlns:a16="http://schemas.microsoft.com/office/drawing/2014/main" id="{D9E26DD7-8914-4A23-85B9-0C03B3ACA40C}"/>
               </a:ext>
             </a:extLst>
           </p:cNvPr>
@@ -2248,7 +2248,7 @@
           <p:cNvPr id="3" name="Segnaposto piè di pagina 2">
             <a:extLst>
               <a:ext uri="{FF2B5EF4-FFF2-40B4-BE49-F238E27FC236}">
-                <a16:creationId xmlns:a16="http://schemas.microsoft.com/office/drawing/2014/main" xmlns="" id="{992E87C0-E01E-4B5D-B829-69CEB0DB0D77}"/>
+                <a16:creationId xmlns="" xmlns:a16="http://schemas.microsoft.com/office/drawing/2014/main" id="{992E87C0-E01E-4B5D-B829-69CEB0DB0D77}"/>
               </a:ext>
             </a:extLst>
           </p:cNvPr>
@@ -2273,7 +2273,7 @@
           <p:cNvPr id="4" name="Segnaposto numero diapositiva 3">
             <a:extLst>
               <a:ext uri="{FF2B5EF4-FFF2-40B4-BE49-F238E27FC236}">
-                <a16:creationId xmlns:a16="http://schemas.microsoft.com/office/drawing/2014/main" xmlns="" id="{F7867DD9-A762-457F-A406-B864D98AA788}"/>
+                <a16:creationId xmlns="" xmlns:a16="http://schemas.microsoft.com/office/drawing/2014/main" id="{F7867DD9-A762-457F-A406-B864D98AA788}"/>
               </a:ext>
             </a:extLst>
           </p:cNvPr>
@@ -2332,7 +2332,7 @@
           <p:cNvPr id="2" name="Titolo 1">
             <a:extLst>
               <a:ext uri="{FF2B5EF4-FFF2-40B4-BE49-F238E27FC236}">
-                <a16:creationId xmlns:a16="http://schemas.microsoft.com/office/drawing/2014/main" xmlns="" id="{76124E57-2EC1-4A69-8B20-E15B6D22940F}"/>
+                <a16:creationId xmlns="" xmlns:a16="http://schemas.microsoft.com/office/drawing/2014/main" id="{76124E57-2EC1-4A69-8B20-E15B6D22940F}"/>
               </a:ext>
             </a:extLst>
           </p:cNvPr>
@@ -2369,7 +2369,7 @@
           <p:cNvPr id="3" name="Segnaposto contenuto 2">
             <a:extLst>
               <a:ext uri="{FF2B5EF4-FFF2-40B4-BE49-F238E27FC236}">
-                <a16:creationId xmlns:a16="http://schemas.microsoft.com/office/drawing/2014/main" xmlns="" id="{734D8066-1E08-4CE8-983F-9BBA87274CC7}"/>
+                <a16:creationId xmlns="" xmlns:a16="http://schemas.microsoft.com/office/drawing/2014/main" id="{734D8066-1E08-4CE8-983F-9BBA87274CC7}"/>
               </a:ext>
             </a:extLst>
           </p:cNvPr>
@@ -2459,7 +2459,7 @@
           <p:cNvPr id="4" name="Segnaposto testo 3">
             <a:extLst>
               <a:ext uri="{FF2B5EF4-FFF2-40B4-BE49-F238E27FC236}">
-                <a16:creationId xmlns:a16="http://schemas.microsoft.com/office/drawing/2014/main" xmlns="" id="{F3FA6396-D906-40C8-AE24-510E2F78C7FE}"/>
+                <a16:creationId xmlns="" xmlns:a16="http://schemas.microsoft.com/office/drawing/2014/main" id="{F3FA6396-D906-40C8-AE24-510E2F78C7FE}"/>
               </a:ext>
             </a:extLst>
           </p:cNvPr>
@@ -2530,7 +2530,7 @@
           <p:cNvPr id="5" name="Segnaposto data 4">
             <a:extLst>
               <a:ext uri="{FF2B5EF4-FFF2-40B4-BE49-F238E27FC236}">
-                <a16:creationId xmlns:a16="http://schemas.microsoft.com/office/drawing/2014/main" xmlns="" id="{BAA5942A-3BCE-4482-8A5C-CD97772E8976}"/>
+                <a16:creationId xmlns="" xmlns:a16="http://schemas.microsoft.com/office/drawing/2014/main" id="{BAA5942A-3BCE-4482-8A5C-CD97772E8976}"/>
               </a:ext>
             </a:extLst>
           </p:cNvPr>
@@ -2559,7 +2559,7 @@
           <p:cNvPr id="6" name="Segnaposto piè di pagina 5">
             <a:extLst>
               <a:ext uri="{FF2B5EF4-FFF2-40B4-BE49-F238E27FC236}">
-                <a16:creationId xmlns:a16="http://schemas.microsoft.com/office/drawing/2014/main" xmlns="" id="{99420126-9AFA-4777-BFF5-366C09F8B32E}"/>
+                <a16:creationId xmlns="" xmlns:a16="http://schemas.microsoft.com/office/drawing/2014/main" id="{99420126-9AFA-4777-BFF5-366C09F8B32E}"/>
               </a:ext>
             </a:extLst>
           </p:cNvPr>
@@ -2584,7 +2584,7 @@
           <p:cNvPr id="7" name="Segnaposto numero diapositiva 6">
             <a:extLst>
               <a:ext uri="{FF2B5EF4-FFF2-40B4-BE49-F238E27FC236}">
-                <a16:creationId xmlns:a16="http://schemas.microsoft.com/office/drawing/2014/main" xmlns="" id="{87996299-B8B2-4606-A686-94BC7B31D834}"/>
+                <a16:creationId xmlns="" xmlns:a16="http://schemas.microsoft.com/office/drawing/2014/main" id="{87996299-B8B2-4606-A686-94BC7B31D834}"/>
               </a:ext>
             </a:extLst>
           </p:cNvPr>
@@ -2643,7 +2643,7 @@
           <p:cNvPr id="2" name="Titolo 1">
             <a:extLst>
               <a:ext uri="{FF2B5EF4-FFF2-40B4-BE49-F238E27FC236}">
-                <a16:creationId xmlns:a16="http://schemas.microsoft.com/office/drawing/2014/main" xmlns="" id="{B966293D-979C-4064-9F2B-6124C51E68FE}"/>
+                <a16:creationId xmlns="" xmlns:a16="http://schemas.microsoft.com/office/drawing/2014/main" id="{B966293D-979C-4064-9F2B-6124C51E68FE}"/>
               </a:ext>
             </a:extLst>
           </p:cNvPr>
@@ -2680,7 +2680,7 @@
           <p:cNvPr id="3" name="Segnaposto immagine 2">
             <a:extLst>
               <a:ext uri="{FF2B5EF4-FFF2-40B4-BE49-F238E27FC236}">
-                <a16:creationId xmlns:a16="http://schemas.microsoft.com/office/drawing/2014/main" xmlns="" id="{6A8C2EA0-142A-454E-BAAB-7C4485D60299}"/>
+                <a16:creationId xmlns="" xmlns:a16="http://schemas.microsoft.com/office/drawing/2014/main" id="{6A8C2EA0-142A-454E-BAAB-7C4485D60299}"/>
               </a:ext>
             </a:extLst>
           </p:cNvPr>
@@ -2747,7 +2747,7 @@
           <p:cNvPr id="4" name="Segnaposto testo 3">
             <a:extLst>
               <a:ext uri="{FF2B5EF4-FFF2-40B4-BE49-F238E27FC236}">
-                <a16:creationId xmlns:a16="http://schemas.microsoft.com/office/drawing/2014/main" xmlns="" id="{41AB84A7-19D9-44FE-8513-77CAF35AA7C2}"/>
+                <a16:creationId xmlns="" xmlns:a16="http://schemas.microsoft.com/office/drawing/2014/main" id="{41AB84A7-19D9-44FE-8513-77CAF35AA7C2}"/>
               </a:ext>
             </a:extLst>
           </p:cNvPr>
@@ -2818,7 +2818,7 @@
           <p:cNvPr id="5" name="Segnaposto data 4">
             <a:extLst>
               <a:ext uri="{FF2B5EF4-FFF2-40B4-BE49-F238E27FC236}">
-                <a16:creationId xmlns:a16="http://schemas.microsoft.com/office/drawing/2014/main" xmlns="" id="{8BE837FD-91EA-47CC-A6A0-F23A450D108C}"/>
+                <a16:creationId xmlns="" xmlns:a16="http://schemas.microsoft.com/office/drawing/2014/main" id="{8BE837FD-91EA-47CC-A6A0-F23A450D108C}"/>
               </a:ext>
             </a:extLst>
           </p:cNvPr>
@@ -2847,7 +2847,7 @@
           <p:cNvPr id="6" name="Segnaposto piè di pagina 5">
             <a:extLst>
               <a:ext uri="{FF2B5EF4-FFF2-40B4-BE49-F238E27FC236}">
-                <a16:creationId xmlns:a16="http://schemas.microsoft.com/office/drawing/2014/main" xmlns="" id="{81B3C88D-C08B-4A45-BF0D-04C3264EB32A}"/>
+                <a16:creationId xmlns="" xmlns:a16="http://schemas.microsoft.com/office/drawing/2014/main" id="{81B3C88D-C08B-4A45-BF0D-04C3264EB32A}"/>
               </a:ext>
             </a:extLst>
           </p:cNvPr>
@@ -2872,7 +2872,7 @@
           <p:cNvPr id="7" name="Segnaposto numero diapositiva 6">
             <a:extLst>
               <a:ext uri="{FF2B5EF4-FFF2-40B4-BE49-F238E27FC236}">
-                <a16:creationId xmlns:a16="http://schemas.microsoft.com/office/drawing/2014/main" xmlns="" id="{C35DA505-C2B5-4A20-A0ED-32D6B7B4CE44}"/>
+                <a16:creationId xmlns="" xmlns:a16="http://schemas.microsoft.com/office/drawing/2014/main" id="{C35DA505-C2B5-4A20-A0ED-32D6B7B4CE44}"/>
               </a:ext>
             </a:extLst>
           </p:cNvPr>
@@ -2936,7 +2936,7 @@
           <p:cNvPr id="2" name="Segnaposto titolo 1">
             <a:extLst>
               <a:ext uri="{FF2B5EF4-FFF2-40B4-BE49-F238E27FC236}">
-                <a16:creationId xmlns:a16="http://schemas.microsoft.com/office/drawing/2014/main" xmlns="" id="{4B1D921F-2C48-4285-A8BD-792591D929C6}"/>
+                <a16:creationId xmlns="" xmlns:a16="http://schemas.microsoft.com/office/drawing/2014/main" id="{4B1D921F-2C48-4285-A8BD-792591D929C6}"/>
               </a:ext>
             </a:extLst>
           </p:cNvPr>
@@ -2974,7 +2974,7 @@
           <p:cNvPr id="3" name="Segnaposto testo 2">
             <a:extLst>
               <a:ext uri="{FF2B5EF4-FFF2-40B4-BE49-F238E27FC236}">
-                <a16:creationId xmlns:a16="http://schemas.microsoft.com/office/drawing/2014/main" xmlns="" id="{518CFD04-AD80-4442-9D20-77C3C390CCFF}"/>
+                <a16:creationId xmlns="" xmlns:a16="http://schemas.microsoft.com/office/drawing/2014/main" id="{518CFD04-AD80-4442-9D20-77C3C390CCFF}"/>
               </a:ext>
             </a:extLst>
           </p:cNvPr>
@@ -3041,7 +3041,7 @@
           <p:cNvPr id="4" name="Segnaposto data 3">
             <a:extLst>
               <a:ext uri="{FF2B5EF4-FFF2-40B4-BE49-F238E27FC236}">
-                <a16:creationId xmlns:a16="http://schemas.microsoft.com/office/drawing/2014/main" xmlns="" id="{2D1ACE57-994B-471D-A0C5-61CE109C7E59}"/>
+                <a16:creationId xmlns="" xmlns:a16="http://schemas.microsoft.com/office/drawing/2014/main" id="{2D1ACE57-994B-471D-A0C5-61CE109C7E59}"/>
               </a:ext>
             </a:extLst>
           </p:cNvPr>
@@ -3088,7 +3088,7 @@
           <p:cNvPr id="5" name="Segnaposto piè di pagina 4">
             <a:extLst>
               <a:ext uri="{FF2B5EF4-FFF2-40B4-BE49-F238E27FC236}">
-                <a16:creationId xmlns:a16="http://schemas.microsoft.com/office/drawing/2014/main" xmlns="" id="{311C4A1E-1E5A-4141-9735-E37F71E2C7B0}"/>
+                <a16:creationId xmlns="" xmlns:a16="http://schemas.microsoft.com/office/drawing/2014/main" id="{311C4A1E-1E5A-4141-9735-E37F71E2C7B0}"/>
               </a:ext>
             </a:extLst>
           </p:cNvPr>
@@ -3131,7 +3131,7 @@
           <p:cNvPr id="6" name="Segnaposto numero diapositiva 5">
             <a:extLst>
               <a:ext uri="{FF2B5EF4-FFF2-40B4-BE49-F238E27FC236}">
-                <a16:creationId xmlns:a16="http://schemas.microsoft.com/office/drawing/2014/main" xmlns="" id="{5C64D511-420E-43E5-BCD4-81BC958B8929}"/>
+                <a16:creationId xmlns="" xmlns:a16="http://schemas.microsoft.com/office/drawing/2014/main" id="{5C64D511-420E-43E5-BCD4-81BC958B8929}"/>
               </a:ext>
             </a:extLst>
           </p:cNvPr>
@@ -3507,10 +3507,10 @@
           <p:cNvPr id="8" name="Rectangle 7">
             <a:extLst>
               <a:ext uri="{FF2B5EF4-FFF2-40B4-BE49-F238E27FC236}">
-                <a16:creationId xmlns:a16="http://schemas.microsoft.com/office/drawing/2014/main" xmlns="" id="{23962611-DFD5-4092-AAFD-559E3DFCE2C9}"/>
+                <a16:creationId xmlns="" xmlns:a16="http://schemas.microsoft.com/office/drawing/2014/main" id="{23962611-DFD5-4092-AAFD-559E3DFCE2C9}"/>
               </a:ext>
               <a:ext uri="{C183D7F6-B498-43B3-948B-1728B52AA6E4}">
-                <adec:decorative xmlns:adec="http://schemas.microsoft.com/office/drawing/2017/decorative" xmlns="" val="1"/>
+                <adec:decorative xmlns="" xmlns:adec="http://schemas.microsoft.com/office/drawing/2017/decorative" val="1"/>
               </a:ext>
             </a:extLst>
           </p:cNvPr>
@@ -3520,7 +3520,7 @@
           <p:nvPr>
             <p:extLst>
               <p:ext uri="{386F3935-93C4-4BCD-93E2-E3B085C9AB24}">
-                <p16:designElem xmlns:p16="http://schemas.microsoft.com/office/powerpoint/2015/main" xmlns="" val="1"/>
+                <p16:designElem xmlns="" xmlns:p16="http://schemas.microsoft.com/office/powerpoint/2015/main" val="1"/>
               </p:ext>
             </p:extLst>
           </p:nvPr>
@@ -3592,10 +3592,10 @@
           <p:cNvPr id="10" name="Picture 9">
             <a:extLst>
               <a:ext uri="{FF2B5EF4-FFF2-40B4-BE49-F238E27FC236}">
-                <a16:creationId xmlns:a16="http://schemas.microsoft.com/office/drawing/2014/main" xmlns="" id="{2270F1FA-0425-408F-9861-80BF5AFB276D}"/>
+                <a16:creationId xmlns="" xmlns:a16="http://schemas.microsoft.com/office/drawing/2014/main" id="{2270F1FA-0425-408F-9861-80BF5AFB276D}"/>
               </a:ext>
               <a:ext uri="{C183D7F6-B498-43B3-948B-1728B52AA6E4}">
-                <adec:decorative xmlns:adec="http://schemas.microsoft.com/office/drawing/2017/decorative" xmlns="" val="1"/>
+                <adec:decorative xmlns="" xmlns:adec="http://schemas.microsoft.com/office/drawing/2017/decorative" val="1"/>
               </a:ext>
             </a:extLst>
           </p:cNvPr>
@@ -3605,7 +3605,7 @@
           <p:nvPr>
             <p:extLst>
               <p:ext uri="{386F3935-93C4-4BCD-93E2-E3B085C9AB24}">
-                <p16:designElem xmlns:p16="http://schemas.microsoft.com/office/powerpoint/2015/main" xmlns="" val="1"/>
+                <p16:designElem xmlns="" xmlns:p16="http://schemas.microsoft.com/office/powerpoint/2015/main" val="1"/>
               </p:ext>
             </p:extLst>
           </p:nvPr>
@@ -3637,7 +3637,7 @@
           <p:cNvPr id="2" name="Titolo 1">
             <a:extLst>
               <a:ext uri="{FF2B5EF4-FFF2-40B4-BE49-F238E27FC236}">
-                <a16:creationId xmlns:a16="http://schemas.microsoft.com/office/drawing/2014/main" xmlns="" id="{DCBAC149-DB9F-4874-BC24-7F077AA4B78D}"/>
+                <a16:creationId xmlns="" xmlns:a16="http://schemas.microsoft.com/office/drawing/2014/main" id="{DCBAC149-DB9F-4874-BC24-7F077AA4B78D}"/>
               </a:ext>
             </a:extLst>
           </p:cNvPr>
@@ -3676,7 +3676,7 @@
           <p:cNvPr id="3" name="Sottotitolo 2">
             <a:extLst>
               <a:ext uri="{FF2B5EF4-FFF2-40B4-BE49-F238E27FC236}">
-                <a16:creationId xmlns:a16="http://schemas.microsoft.com/office/drawing/2014/main" xmlns="" id="{B9F686C4-B595-4CDD-8233-91A53C48A369}"/>
+                <a16:creationId xmlns="" xmlns:a16="http://schemas.microsoft.com/office/drawing/2014/main" id="{B9F686C4-B595-4CDD-8233-91A53C48A369}"/>
               </a:ext>
             </a:extLst>
           </p:cNvPr>
@@ -3752,7 +3752,7 @@
           <p:cNvPr id="2" name="Titolo 1">
             <a:extLst>
               <a:ext uri="{FF2B5EF4-FFF2-40B4-BE49-F238E27FC236}">
-                <a16:creationId xmlns:a16="http://schemas.microsoft.com/office/drawing/2014/main" xmlns="" id="{B7EC37DD-9E0C-4C6E-A811-00302AD6EACB}"/>
+                <a16:creationId xmlns="" xmlns:a16="http://schemas.microsoft.com/office/drawing/2014/main" id="{B7EC37DD-9E0C-4C6E-A811-00302AD6EACB}"/>
               </a:ext>
             </a:extLst>
           </p:cNvPr>
@@ -3785,7 +3785,7 @@
           <p:cNvPr id="4" name="Tabella 4">
             <a:extLst>
               <a:ext uri="{FF2B5EF4-FFF2-40B4-BE49-F238E27FC236}">
-                <a16:creationId xmlns:a16="http://schemas.microsoft.com/office/drawing/2014/main" xmlns="" id="{043F75E0-1B48-4C2E-8ADF-C8441714A81A}"/>
+                <a16:creationId xmlns="" xmlns:a16="http://schemas.microsoft.com/office/drawing/2014/main" id="{043F75E0-1B48-4C2E-8ADF-C8441714A81A}"/>
               </a:ext>
             </a:extLst>
           </p:cNvPr>
@@ -3815,14 +3815,14 @@
                 <a:gridCol w="2483498">
                   <a:extLst>
                     <a:ext uri="{9D8B030D-6E8A-4147-A177-3AD203B41FA5}">
-                      <a16:colId xmlns:a16="http://schemas.microsoft.com/office/drawing/2014/main" xmlns="" val="414173828"/>
+                      <a16:colId xmlns="" xmlns:a16="http://schemas.microsoft.com/office/drawing/2014/main" val="414173828"/>
                     </a:ext>
                   </a:extLst>
                 </a:gridCol>
                 <a:gridCol w="8032102">
                   <a:extLst>
                     <a:ext uri="{9D8B030D-6E8A-4147-A177-3AD203B41FA5}">
-                      <a16:colId xmlns:a16="http://schemas.microsoft.com/office/drawing/2014/main" xmlns="" val="418542194"/>
+                      <a16:colId xmlns="" xmlns:a16="http://schemas.microsoft.com/office/drawing/2014/main" val="418542194"/>
                     </a:ext>
                   </a:extLst>
                 </a:gridCol>
@@ -3856,7 +3856,7 @@
                 </a:tc>
                 <a:extLst>
                   <a:ext uri="{0D108BD9-81ED-4DB2-BD59-A6C34878D82A}">
-                    <a16:rowId xmlns:a16="http://schemas.microsoft.com/office/drawing/2014/main" xmlns="" val="246340804"/>
+                    <a16:rowId xmlns="" xmlns:a16="http://schemas.microsoft.com/office/drawing/2014/main" val="246340804"/>
                   </a:ext>
                 </a:extLst>
               </a:tr>
@@ -3890,7 +3890,7 @@
                 </a:tc>
                 <a:extLst>
                   <a:ext uri="{0D108BD9-81ED-4DB2-BD59-A6C34878D82A}">
-                    <a16:rowId xmlns:a16="http://schemas.microsoft.com/office/drawing/2014/main" xmlns="" val="2368987764"/>
+                    <a16:rowId xmlns="" xmlns:a16="http://schemas.microsoft.com/office/drawing/2014/main" val="2368987764"/>
                   </a:ext>
                 </a:extLst>
               </a:tr>
@@ -3923,7 +3923,7 @@
                 </a:tc>
                 <a:extLst>
                   <a:ext uri="{0D108BD9-81ED-4DB2-BD59-A6C34878D82A}">
-                    <a16:rowId xmlns:a16="http://schemas.microsoft.com/office/drawing/2014/main" xmlns="" val="301388857"/>
+                    <a16:rowId xmlns="" xmlns:a16="http://schemas.microsoft.com/office/drawing/2014/main" val="301388857"/>
                   </a:ext>
                 </a:extLst>
               </a:tr>
@@ -3961,7 +3961,7 @@
                 </a:tc>
                 <a:extLst>
                   <a:ext uri="{0D108BD9-81ED-4DB2-BD59-A6C34878D82A}">
-                    <a16:rowId xmlns:a16="http://schemas.microsoft.com/office/drawing/2014/main" xmlns="" val="2333084500"/>
+                    <a16:rowId xmlns="" xmlns:a16="http://schemas.microsoft.com/office/drawing/2014/main" val="2333084500"/>
                   </a:ext>
                 </a:extLst>
               </a:tr>
@@ -3995,7 +3995,7 @@
                 </a:tc>
                 <a:extLst>
                   <a:ext uri="{0D108BD9-81ED-4DB2-BD59-A6C34878D82A}">
-                    <a16:rowId xmlns:a16="http://schemas.microsoft.com/office/drawing/2014/main" xmlns="" val="2773735045"/>
+                    <a16:rowId xmlns="" xmlns:a16="http://schemas.microsoft.com/office/drawing/2014/main" val="2773735045"/>
                   </a:ext>
                 </a:extLst>
               </a:tr>
@@ -4041,7 +4041,7 @@
                 </a:tc>
                 <a:extLst>
                   <a:ext uri="{0D108BD9-81ED-4DB2-BD59-A6C34878D82A}">
-                    <a16:rowId xmlns:a16="http://schemas.microsoft.com/office/drawing/2014/main" xmlns="" val="3315426333"/>
+                    <a16:rowId xmlns="" xmlns:a16="http://schemas.microsoft.com/office/drawing/2014/main" val="3315426333"/>
                   </a:ext>
                 </a:extLst>
               </a:tr>
@@ -4075,7 +4075,7 @@
                 </a:tc>
                 <a:extLst>
                   <a:ext uri="{0D108BD9-81ED-4DB2-BD59-A6C34878D82A}">
-                    <a16:rowId xmlns:a16="http://schemas.microsoft.com/office/drawing/2014/main" xmlns="" val="833276135"/>
+                    <a16:rowId xmlns="" xmlns:a16="http://schemas.microsoft.com/office/drawing/2014/main" val="833276135"/>
                   </a:ext>
                 </a:extLst>
               </a:tr>
@@ -4108,7 +4108,7 @@
                 </a:tc>
                 <a:extLst>
                   <a:ext uri="{0D108BD9-81ED-4DB2-BD59-A6C34878D82A}">
-                    <a16:rowId xmlns:a16="http://schemas.microsoft.com/office/drawing/2014/main" xmlns="" val="1615278520"/>
+                    <a16:rowId xmlns="" xmlns:a16="http://schemas.microsoft.com/office/drawing/2014/main" val="1615278520"/>
                   </a:ext>
                 </a:extLst>
               </a:tr>
@@ -4121,7 +4121,7 @@
           <p:cNvPr id="7" name="Elemento grafico 6" descr="Informazioni">
             <a:extLst>
               <a:ext uri="{FF2B5EF4-FFF2-40B4-BE49-F238E27FC236}">
-                <a16:creationId xmlns:a16="http://schemas.microsoft.com/office/drawing/2014/main" xmlns="" id="{53D936C3-6DDC-4194-987E-7AE9EFD9723F}"/>
+                <a16:creationId xmlns="" xmlns:a16="http://schemas.microsoft.com/office/drawing/2014/main" id="{53D936C3-6DDC-4194-987E-7AE9EFD9723F}"/>
               </a:ext>
             </a:extLst>
           </p:cNvPr>
@@ -4137,7 +4137,7 @@
                 <a14:useLocalDpi xmlns:a14="http://schemas.microsoft.com/office/drawing/2010/main" val="0"/>
               </a:ext>
               <a:ext uri="{96DAC541-7B7A-43D3-8B79-37D633B846F1}">
-                <asvg:svgBlip xmlns:asvg="http://schemas.microsoft.com/office/drawing/2016/SVG/main" xmlns="" r:embed="rId3"/>
+                <asvg:svgBlip xmlns="" xmlns:asvg="http://schemas.microsoft.com/office/drawing/2016/SVG/main" r:embed="rId3"/>
               </a:ext>
             </a:extLst>
           </a:blip>
@@ -4197,7 +4197,7 @@
           <p:cNvPr id="2" name="Titolo 1">
             <a:extLst>
               <a:ext uri="{FF2B5EF4-FFF2-40B4-BE49-F238E27FC236}">
-                <a16:creationId xmlns:a16="http://schemas.microsoft.com/office/drawing/2014/main" xmlns="" id="{FF61BD71-50E0-44C1-A558-965A7ABC70AD}"/>
+                <a16:creationId xmlns="" xmlns:a16="http://schemas.microsoft.com/office/drawing/2014/main" id="{FF61BD71-50E0-44C1-A558-965A7ABC70AD}"/>
               </a:ext>
             </a:extLst>
           </p:cNvPr>
@@ -4225,7 +4225,7 @@
           <p:cNvPr id="4" name="Tabella 4">
             <a:extLst>
               <a:ext uri="{FF2B5EF4-FFF2-40B4-BE49-F238E27FC236}">
-                <a16:creationId xmlns:a16="http://schemas.microsoft.com/office/drawing/2014/main" xmlns="" id="{0BC89AA1-366F-4BE5-824E-0153DB6DF5C3}"/>
+                <a16:creationId xmlns="" xmlns:a16="http://schemas.microsoft.com/office/drawing/2014/main" id="{0BC89AA1-366F-4BE5-824E-0153DB6DF5C3}"/>
               </a:ext>
             </a:extLst>
           </p:cNvPr>
@@ -4236,7 +4236,7 @@
             <p:ph idx="1"/>
             <p:extLst>
               <p:ext uri="{D42A27DB-BD31-4B8C-83A1-F6EECF244321}">
-                <p14:modId xmlns:p14="http://schemas.microsoft.com/office/powerpoint/2010/main" val="518385307"/>
+                <p14:modId xmlns:p14="http://schemas.microsoft.com/office/powerpoint/2010/main" val="2924286885"/>
               </p:ext>
             </p:extLst>
           </p:nvPr>
@@ -4255,14 +4255,14 @@
                 <a:gridCol w="2866053">
                   <a:extLst>
                     <a:ext uri="{9D8B030D-6E8A-4147-A177-3AD203B41FA5}">
-                      <a16:colId xmlns:a16="http://schemas.microsoft.com/office/drawing/2014/main" xmlns="" val="3900888184"/>
+                      <a16:colId xmlns="" xmlns:a16="http://schemas.microsoft.com/office/drawing/2014/main" val="3900888184"/>
                     </a:ext>
                   </a:extLst>
                 </a:gridCol>
                 <a:gridCol w="7649547">
                   <a:extLst>
                     <a:ext uri="{9D8B030D-6E8A-4147-A177-3AD203B41FA5}">
-                      <a16:colId xmlns:a16="http://schemas.microsoft.com/office/drawing/2014/main" xmlns="" val="2392364571"/>
+                      <a16:colId xmlns="" xmlns:a16="http://schemas.microsoft.com/office/drawing/2014/main" val="2392364571"/>
                     </a:ext>
                   </a:extLst>
                 </a:gridCol>
@@ -4309,7 +4309,7 @@
                 </a:tc>
                 <a:extLst>
                   <a:ext uri="{0D108BD9-81ED-4DB2-BD59-A6C34878D82A}">
-                    <a16:rowId xmlns:a16="http://schemas.microsoft.com/office/drawing/2014/main" xmlns="" val="2750207453"/>
+                    <a16:rowId xmlns="" xmlns:a16="http://schemas.microsoft.com/office/drawing/2014/main" val="2750207453"/>
                   </a:ext>
                 </a:extLst>
               </a:tr>
@@ -4342,7 +4342,7 @@
                 </a:tc>
                 <a:extLst>
                   <a:ext uri="{0D108BD9-81ED-4DB2-BD59-A6C34878D82A}">
-                    <a16:rowId xmlns:a16="http://schemas.microsoft.com/office/drawing/2014/main" xmlns="" val="43365482"/>
+                    <a16:rowId xmlns="" xmlns:a16="http://schemas.microsoft.com/office/drawing/2014/main" val="43365482"/>
                   </a:ext>
                 </a:extLst>
               </a:tr>
@@ -4380,7 +4380,7 @@
                 </a:tc>
                 <a:extLst>
                   <a:ext uri="{0D108BD9-81ED-4DB2-BD59-A6C34878D82A}">
-                    <a16:rowId xmlns:a16="http://schemas.microsoft.com/office/drawing/2014/main" xmlns="" val="1813106428"/>
+                    <a16:rowId xmlns="" xmlns:a16="http://schemas.microsoft.com/office/drawing/2014/main" val="1813106428"/>
                   </a:ext>
                 </a:extLst>
               </a:tr>
@@ -4414,7 +4414,7 @@
                 </a:tc>
                 <a:extLst>
                   <a:ext uri="{0D108BD9-81ED-4DB2-BD59-A6C34878D82A}">
-                    <a16:rowId xmlns:a16="http://schemas.microsoft.com/office/drawing/2014/main" xmlns="" val="4265491522"/>
+                    <a16:rowId xmlns="" xmlns:a16="http://schemas.microsoft.com/office/drawing/2014/main" val="4265491522"/>
                   </a:ext>
                 </a:extLst>
               </a:tr>
@@ -4447,7 +4447,7 @@
                 </a:tc>
                 <a:extLst>
                   <a:ext uri="{0D108BD9-81ED-4DB2-BD59-A6C34878D82A}">
-                    <a16:rowId xmlns:a16="http://schemas.microsoft.com/office/drawing/2014/main" xmlns="" val="1759204447"/>
+                    <a16:rowId xmlns="" xmlns:a16="http://schemas.microsoft.com/office/drawing/2014/main" val="1759204447"/>
                   </a:ext>
                 </a:extLst>
               </a:tr>
@@ -4476,15 +4476,24 @@
                     <a:p>
                       <a:r>
                         <a:rPr lang="it-IT" dirty="0"/>
-                        <a:t>Creazione del DB</a:t>
-                      </a:r>
+                        <a:t>Creazione </a:t>
+                      </a:r>
+                      <a:r>
+                        <a:rPr lang="it-IT"/>
+                        <a:t>del </a:t>
+                      </a:r>
+                      <a:r>
+                        <a:rPr lang="it-IT" smtClean="0"/>
+                        <a:t>DB </a:t>
+                      </a:r>
+                      <a:endParaRPr lang="it-IT" dirty="0"/>
                     </a:p>
                   </a:txBody>
                   <a:tcPr/>
                 </a:tc>
                 <a:extLst>
                   <a:ext uri="{0D108BD9-81ED-4DB2-BD59-A6C34878D82A}">
-                    <a16:rowId xmlns:a16="http://schemas.microsoft.com/office/drawing/2014/main" xmlns="" val="4176074482"/>
+                    <a16:rowId xmlns="" xmlns:a16="http://schemas.microsoft.com/office/drawing/2014/main" val="4176074482"/>
                   </a:ext>
                 </a:extLst>
               </a:tr>
@@ -4522,7 +4531,7 @@
                 </a:tc>
                 <a:extLst>
                   <a:ext uri="{0D108BD9-81ED-4DB2-BD59-A6C34878D82A}">
-                    <a16:rowId xmlns:a16="http://schemas.microsoft.com/office/drawing/2014/main" xmlns="" val="2176725863"/>
+                    <a16:rowId xmlns="" xmlns:a16="http://schemas.microsoft.com/office/drawing/2014/main" val="2176725863"/>
                   </a:ext>
                 </a:extLst>
               </a:tr>
@@ -4535,7 +4544,7 @@
           <p:cNvPr id="7" name="Elemento grafico 6" descr="Alta tensione">
             <a:extLst>
               <a:ext uri="{FF2B5EF4-FFF2-40B4-BE49-F238E27FC236}">
-                <a16:creationId xmlns:a16="http://schemas.microsoft.com/office/drawing/2014/main" xmlns="" id="{4BC6B4F9-BBF9-493A-8CEC-E6BC93390131}"/>
+                <a16:creationId xmlns="" xmlns:a16="http://schemas.microsoft.com/office/drawing/2014/main" id="{4BC6B4F9-BBF9-493A-8CEC-E6BC93390131}"/>
               </a:ext>
             </a:extLst>
           </p:cNvPr>
@@ -4551,7 +4560,7 @@
                 <a14:useLocalDpi xmlns:a14="http://schemas.microsoft.com/office/drawing/2010/main" val="0"/>
               </a:ext>
               <a:ext uri="{96DAC541-7B7A-43D3-8B79-37D633B846F1}">
-                <asvg:svgBlip xmlns:asvg="http://schemas.microsoft.com/office/drawing/2016/SVG/main" xmlns="" r:embed="rId3"/>
+                <asvg:svgBlip xmlns="" xmlns:asvg="http://schemas.microsoft.com/office/drawing/2016/SVG/main" r:embed="rId3"/>
               </a:ext>
             </a:extLst>
           </a:blip>
@@ -4604,7 +4613,7 @@
           <p:cNvPr id="2" name="Titolo 1">
             <a:extLst>
               <a:ext uri="{FF2B5EF4-FFF2-40B4-BE49-F238E27FC236}">
-                <a16:creationId xmlns:a16="http://schemas.microsoft.com/office/drawing/2014/main" xmlns="" id="{A8B055A1-B3E5-4E97-BAF3-4C33FEAE38D5}"/>
+                <a16:creationId xmlns="" xmlns:a16="http://schemas.microsoft.com/office/drawing/2014/main" id="{A8B055A1-B3E5-4E97-BAF3-4C33FEAE38D5}"/>
               </a:ext>
             </a:extLst>
           </p:cNvPr>
@@ -4638,7 +4647,7 @@
           <p:cNvPr id="4" name="Tabella 4">
             <a:extLst>
               <a:ext uri="{FF2B5EF4-FFF2-40B4-BE49-F238E27FC236}">
-                <a16:creationId xmlns:a16="http://schemas.microsoft.com/office/drawing/2014/main" xmlns="" id="{67C1CEAA-13A3-482D-AA09-BF3FC903FFE5}"/>
+                <a16:creationId xmlns="" xmlns:a16="http://schemas.microsoft.com/office/drawing/2014/main" id="{67C1CEAA-13A3-482D-AA09-BF3FC903FFE5}"/>
               </a:ext>
             </a:extLst>
           </p:cNvPr>
@@ -4668,14 +4677,14 @@
                 <a:gridCol w="2688771">
                   <a:extLst>
                     <a:ext uri="{9D8B030D-6E8A-4147-A177-3AD203B41FA5}">
-                      <a16:colId xmlns:a16="http://schemas.microsoft.com/office/drawing/2014/main" xmlns="" val="634955233"/>
+                      <a16:colId xmlns="" xmlns:a16="http://schemas.microsoft.com/office/drawing/2014/main" val="634955233"/>
                     </a:ext>
                   </a:extLst>
                 </a:gridCol>
                 <a:gridCol w="7826829">
                   <a:extLst>
                     <a:ext uri="{9D8B030D-6E8A-4147-A177-3AD203B41FA5}">
-                      <a16:colId xmlns:a16="http://schemas.microsoft.com/office/drawing/2014/main" xmlns="" val="1784330953"/>
+                      <a16:colId xmlns="" xmlns:a16="http://schemas.microsoft.com/office/drawing/2014/main" val="1784330953"/>
                     </a:ext>
                   </a:extLst>
                 </a:gridCol>
@@ -4751,7 +4760,7 @@
                 </a:tc>
                 <a:extLst>
                   <a:ext uri="{0D108BD9-81ED-4DB2-BD59-A6C34878D82A}">
-                    <a16:rowId xmlns:a16="http://schemas.microsoft.com/office/drawing/2014/main" xmlns="" val="400559187"/>
+                    <a16:rowId xmlns="" xmlns:a16="http://schemas.microsoft.com/office/drawing/2014/main" val="400559187"/>
                   </a:ext>
                 </a:extLst>
               </a:tr>
@@ -4847,7 +4856,7 @@
                 </a:tc>
                 <a:extLst>
                   <a:ext uri="{0D108BD9-81ED-4DB2-BD59-A6C34878D82A}">
-                    <a16:rowId xmlns:a16="http://schemas.microsoft.com/office/drawing/2014/main" xmlns="" val="286916072"/>
+                    <a16:rowId xmlns="" xmlns:a16="http://schemas.microsoft.com/office/drawing/2014/main" val="286916072"/>
                   </a:ext>
                 </a:extLst>
               </a:tr>
@@ -4965,7 +4974,7 @@
                 </a:tc>
                 <a:extLst>
                   <a:ext uri="{0D108BD9-81ED-4DB2-BD59-A6C34878D82A}">
-                    <a16:rowId xmlns:a16="http://schemas.microsoft.com/office/drawing/2014/main" xmlns="" val="1276537878"/>
+                    <a16:rowId xmlns="" xmlns:a16="http://schemas.microsoft.com/office/drawing/2014/main" val="1276537878"/>
                   </a:ext>
                 </a:extLst>
               </a:tr>
@@ -5089,7 +5098,7 @@
           <p:cNvPr id="8" name="Elemento grafico 7" descr="Flusso di lavoro">
             <a:extLst>
               <a:ext uri="{FF2B5EF4-FFF2-40B4-BE49-F238E27FC236}">
-                <a16:creationId xmlns:a16="http://schemas.microsoft.com/office/drawing/2014/main" xmlns="" id="{A495AF70-8473-45AA-80C8-B98D01FB12D2}"/>
+                <a16:creationId xmlns="" xmlns:a16="http://schemas.microsoft.com/office/drawing/2014/main" id="{A495AF70-8473-45AA-80C8-B98D01FB12D2}"/>
               </a:ext>
             </a:extLst>
           </p:cNvPr>
@@ -5105,7 +5114,7 @@
                 <a14:useLocalDpi xmlns:a14="http://schemas.microsoft.com/office/drawing/2010/main" val="0"/>
               </a:ext>
               <a:ext uri="{96DAC541-7B7A-43D3-8B79-37D633B846F1}">
-                <asvg:svgBlip xmlns:asvg="http://schemas.microsoft.com/office/drawing/2016/SVG/main" xmlns="" r:embed="rId3"/>
+                <asvg:svgBlip xmlns="" xmlns:asvg="http://schemas.microsoft.com/office/drawing/2016/SVG/main" r:embed="rId3"/>
               </a:ext>
             </a:extLst>
           </a:blip>
@@ -5432,7 +5441,7 @@
   <a:extraClrSchemeLst/>
   <a:extLst>
     <a:ext uri="{05A4C25C-085E-4340-85A3-A5531E510DB2}">
-      <thm15:themeFamily xmlns:thm15="http://schemas.microsoft.com/office/thememl/2012/main" xmlns="" name="Office Theme" id="{62F939B6-93AF-4DB8-9C6B-D6C7DFDC589F}" vid="{4A3C46E8-61CC-4603-A589-7422A47A8E4A}"/>
+      <thm15:themeFamily xmlns="" xmlns:thm15="http://schemas.microsoft.com/office/thememl/2012/main" name="Office Theme" id="{62F939B6-93AF-4DB8-9C6B-D6C7DFDC589F}" vid="{4A3C46E8-61CC-4603-A589-7422A47A8E4A}"/>
     </a:ext>
   </a:extLst>
 </a:theme>

</xml_diff>

<commit_message>
Diego, revisionati tutti Template
</commit_message>
<xml_diff>
--- a/docs/analisi/Template use case/Template Use Case - Gestione DB.pptx
+++ b/docs/analisi/Template use case/Template Use Case - Gestione DB.pptx
@@ -109,7 +109,7 @@
   </p:defaultTextStyle>
   <p:extLst>
     <p:ext uri="{EFAFB233-063F-42B5-8137-9DF3F51BA10A}">
-      <p15:sldGuideLst xmlns="" xmlns:p15="http://schemas.microsoft.com/office/powerpoint/2012/main">
+      <p15:sldGuideLst xmlns:p15="http://schemas.microsoft.com/office/powerpoint/2012/main">
         <p15:guide id="1" orient="horz" pos="2160">
           <p15:clr>
             <a:srgbClr val="A4A3A4"/>
@@ -302,7 +302,7 @@
           <p:cNvPr id="2" name="Titolo 1">
             <a:extLst>
               <a:ext uri="{FF2B5EF4-FFF2-40B4-BE49-F238E27FC236}">
-                <a16:creationId xmlns="" xmlns:a16="http://schemas.microsoft.com/office/drawing/2014/main" id="{CFBF2858-9FF9-49F6-9325-A5B5D4185723}"/>
+                <a16:creationId xmlns:a16="http://schemas.microsoft.com/office/drawing/2014/main" id="{CFBF2858-9FF9-49F6-9325-A5B5D4185723}"/>
               </a:ext>
             </a:extLst>
           </p:cNvPr>
@@ -339,7 +339,7 @@
           <p:cNvPr id="3" name="Sottotitolo 2">
             <a:extLst>
               <a:ext uri="{FF2B5EF4-FFF2-40B4-BE49-F238E27FC236}">
-                <a16:creationId xmlns="" xmlns:a16="http://schemas.microsoft.com/office/drawing/2014/main" id="{4B21D84B-ED35-4CD0-B889-7022650B2578}"/>
+                <a16:creationId xmlns:a16="http://schemas.microsoft.com/office/drawing/2014/main" id="{4B21D84B-ED35-4CD0-B889-7022650B2578}"/>
               </a:ext>
             </a:extLst>
           </p:cNvPr>
@@ -409,7 +409,7 @@
           <p:cNvPr id="4" name="Segnaposto data 3">
             <a:extLst>
               <a:ext uri="{FF2B5EF4-FFF2-40B4-BE49-F238E27FC236}">
-                <a16:creationId xmlns="" xmlns:a16="http://schemas.microsoft.com/office/drawing/2014/main" id="{E66C651E-1356-4A58-BA17-ECFD882A1A0D}"/>
+                <a16:creationId xmlns:a16="http://schemas.microsoft.com/office/drawing/2014/main" id="{E66C651E-1356-4A58-BA17-ECFD882A1A0D}"/>
               </a:ext>
             </a:extLst>
           </p:cNvPr>
@@ -427,7 +427,7 @@
           <a:p>
             <a:fld id="{F7D71F90-2C6D-44F6-A1F9-0B80B911F8CA}" type="datetimeFigureOut">
               <a:rPr lang="it-IT" smtClean="0"/>
-              <a:t>16/12/2019</a:t>
+              <a:t>19/12/2019</a:t>
             </a:fld>
             <a:endParaRPr lang="it-IT"/>
           </a:p>
@@ -438,7 +438,7 @@
           <p:cNvPr id="5" name="Segnaposto piè di pagina 4">
             <a:extLst>
               <a:ext uri="{FF2B5EF4-FFF2-40B4-BE49-F238E27FC236}">
-                <a16:creationId xmlns="" xmlns:a16="http://schemas.microsoft.com/office/drawing/2014/main" id="{74328D79-8461-43BC-84DA-249AF43BC14A}"/>
+                <a16:creationId xmlns:a16="http://schemas.microsoft.com/office/drawing/2014/main" id="{74328D79-8461-43BC-84DA-249AF43BC14A}"/>
               </a:ext>
             </a:extLst>
           </p:cNvPr>
@@ -463,7 +463,7 @@
           <p:cNvPr id="6" name="Segnaposto numero diapositiva 5">
             <a:extLst>
               <a:ext uri="{FF2B5EF4-FFF2-40B4-BE49-F238E27FC236}">
-                <a16:creationId xmlns="" xmlns:a16="http://schemas.microsoft.com/office/drawing/2014/main" id="{816387D6-94E6-47FE-871A-C8EF03F29BDB}"/>
+                <a16:creationId xmlns:a16="http://schemas.microsoft.com/office/drawing/2014/main" id="{816387D6-94E6-47FE-871A-C8EF03F29BDB}"/>
               </a:ext>
             </a:extLst>
           </p:cNvPr>
@@ -481,7 +481,7 @@
           <a:p>
             <a:fld id="{055FF49E-80C9-43E6-9ECC-5DC75BE05600}" type="slidenum">
               <a:rPr lang="it-IT" smtClean="0"/>
-              <a:t>‹N›</a:t>
+              <a:t>‹#›</a:t>
             </a:fld>
             <a:endParaRPr lang="it-IT"/>
           </a:p>
@@ -522,7 +522,7 @@
           <p:cNvPr id="2" name="Titolo 1">
             <a:extLst>
               <a:ext uri="{FF2B5EF4-FFF2-40B4-BE49-F238E27FC236}">
-                <a16:creationId xmlns="" xmlns:a16="http://schemas.microsoft.com/office/drawing/2014/main" id="{F59AC4B1-2C56-4BBF-A05F-D9500F78FEB9}"/>
+                <a16:creationId xmlns:a16="http://schemas.microsoft.com/office/drawing/2014/main" id="{F59AC4B1-2C56-4BBF-A05F-D9500F78FEB9}"/>
               </a:ext>
             </a:extLst>
           </p:cNvPr>
@@ -550,7 +550,7 @@
           <p:cNvPr id="3" name="Segnaposto testo verticale 2">
             <a:extLst>
               <a:ext uri="{FF2B5EF4-FFF2-40B4-BE49-F238E27FC236}">
-                <a16:creationId xmlns="" xmlns:a16="http://schemas.microsoft.com/office/drawing/2014/main" id="{90389E8C-63A3-42AB-93CD-0F8792454FCC}"/>
+                <a16:creationId xmlns:a16="http://schemas.microsoft.com/office/drawing/2014/main" id="{90389E8C-63A3-42AB-93CD-0F8792454FCC}"/>
               </a:ext>
             </a:extLst>
           </p:cNvPr>
@@ -607,7 +607,7 @@
           <p:cNvPr id="4" name="Segnaposto data 3">
             <a:extLst>
               <a:ext uri="{FF2B5EF4-FFF2-40B4-BE49-F238E27FC236}">
-                <a16:creationId xmlns="" xmlns:a16="http://schemas.microsoft.com/office/drawing/2014/main" id="{254FADA6-B05E-4B35-A06A-2022D2DBEC26}"/>
+                <a16:creationId xmlns:a16="http://schemas.microsoft.com/office/drawing/2014/main" id="{254FADA6-B05E-4B35-A06A-2022D2DBEC26}"/>
               </a:ext>
             </a:extLst>
           </p:cNvPr>
@@ -625,7 +625,7 @@
           <a:p>
             <a:fld id="{F7D71F90-2C6D-44F6-A1F9-0B80B911F8CA}" type="datetimeFigureOut">
               <a:rPr lang="it-IT" smtClean="0"/>
-              <a:t>16/12/2019</a:t>
+              <a:t>19/12/2019</a:t>
             </a:fld>
             <a:endParaRPr lang="it-IT"/>
           </a:p>
@@ -636,7 +636,7 @@
           <p:cNvPr id="5" name="Segnaposto piè di pagina 4">
             <a:extLst>
               <a:ext uri="{FF2B5EF4-FFF2-40B4-BE49-F238E27FC236}">
-                <a16:creationId xmlns="" xmlns:a16="http://schemas.microsoft.com/office/drawing/2014/main" id="{0631869E-DF6C-4226-B729-2123308FE398}"/>
+                <a16:creationId xmlns:a16="http://schemas.microsoft.com/office/drawing/2014/main" id="{0631869E-DF6C-4226-B729-2123308FE398}"/>
               </a:ext>
             </a:extLst>
           </p:cNvPr>
@@ -661,7 +661,7 @@
           <p:cNvPr id="6" name="Segnaposto numero diapositiva 5">
             <a:extLst>
               <a:ext uri="{FF2B5EF4-FFF2-40B4-BE49-F238E27FC236}">
-                <a16:creationId xmlns="" xmlns:a16="http://schemas.microsoft.com/office/drawing/2014/main" id="{5EBEEC90-B83C-4DEE-937E-C7EC1D025508}"/>
+                <a16:creationId xmlns:a16="http://schemas.microsoft.com/office/drawing/2014/main" id="{5EBEEC90-B83C-4DEE-937E-C7EC1D025508}"/>
               </a:ext>
             </a:extLst>
           </p:cNvPr>
@@ -679,7 +679,7 @@
           <a:p>
             <a:fld id="{055FF49E-80C9-43E6-9ECC-5DC75BE05600}" type="slidenum">
               <a:rPr lang="it-IT" smtClean="0"/>
-              <a:t>‹N›</a:t>
+              <a:t>‹#›</a:t>
             </a:fld>
             <a:endParaRPr lang="it-IT"/>
           </a:p>
@@ -720,7 +720,7 @@
           <p:cNvPr id="2" name="Titolo verticale 1">
             <a:extLst>
               <a:ext uri="{FF2B5EF4-FFF2-40B4-BE49-F238E27FC236}">
-                <a16:creationId xmlns="" xmlns:a16="http://schemas.microsoft.com/office/drawing/2014/main" id="{30E33601-4D9B-4E96-B3C3-AB65F0C81F37}"/>
+                <a16:creationId xmlns:a16="http://schemas.microsoft.com/office/drawing/2014/main" id="{30E33601-4D9B-4E96-B3C3-AB65F0C81F37}"/>
               </a:ext>
             </a:extLst>
           </p:cNvPr>
@@ -753,7 +753,7 @@
           <p:cNvPr id="3" name="Segnaposto testo verticale 2">
             <a:extLst>
               <a:ext uri="{FF2B5EF4-FFF2-40B4-BE49-F238E27FC236}">
-                <a16:creationId xmlns="" xmlns:a16="http://schemas.microsoft.com/office/drawing/2014/main" id="{FEDAA464-5CD2-4C93-83F5-E13251F55648}"/>
+                <a16:creationId xmlns:a16="http://schemas.microsoft.com/office/drawing/2014/main" id="{FEDAA464-5CD2-4C93-83F5-E13251F55648}"/>
               </a:ext>
             </a:extLst>
           </p:cNvPr>
@@ -815,7 +815,7 @@
           <p:cNvPr id="4" name="Segnaposto data 3">
             <a:extLst>
               <a:ext uri="{FF2B5EF4-FFF2-40B4-BE49-F238E27FC236}">
-                <a16:creationId xmlns="" xmlns:a16="http://schemas.microsoft.com/office/drawing/2014/main" id="{F61719B4-CD99-4540-BEA4-8B7884B7C59C}"/>
+                <a16:creationId xmlns:a16="http://schemas.microsoft.com/office/drawing/2014/main" id="{F61719B4-CD99-4540-BEA4-8B7884B7C59C}"/>
               </a:ext>
             </a:extLst>
           </p:cNvPr>
@@ -833,7 +833,7 @@
           <a:p>
             <a:fld id="{F7D71F90-2C6D-44F6-A1F9-0B80B911F8CA}" type="datetimeFigureOut">
               <a:rPr lang="it-IT" smtClean="0"/>
-              <a:t>16/12/2019</a:t>
+              <a:t>19/12/2019</a:t>
             </a:fld>
             <a:endParaRPr lang="it-IT"/>
           </a:p>
@@ -844,7 +844,7 @@
           <p:cNvPr id="5" name="Segnaposto piè di pagina 4">
             <a:extLst>
               <a:ext uri="{FF2B5EF4-FFF2-40B4-BE49-F238E27FC236}">
-                <a16:creationId xmlns="" xmlns:a16="http://schemas.microsoft.com/office/drawing/2014/main" id="{30F0B4A5-E6FA-4C78-86A7-F528FA130059}"/>
+                <a16:creationId xmlns:a16="http://schemas.microsoft.com/office/drawing/2014/main" id="{30F0B4A5-E6FA-4C78-86A7-F528FA130059}"/>
               </a:ext>
             </a:extLst>
           </p:cNvPr>
@@ -869,7 +869,7 @@
           <p:cNvPr id="6" name="Segnaposto numero diapositiva 5">
             <a:extLst>
               <a:ext uri="{FF2B5EF4-FFF2-40B4-BE49-F238E27FC236}">
-                <a16:creationId xmlns="" xmlns:a16="http://schemas.microsoft.com/office/drawing/2014/main" id="{442BF533-5946-4F10-92FC-3CD5053CF4D8}"/>
+                <a16:creationId xmlns:a16="http://schemas.microsoft.com/office/drawing/2014/main" id="{442BF533-5946-4F10-92FC-3CD5053CF4D8}"/>
               </a:ext>
             </a:extLst>
           </p:cNvPr>
@@ -887,7 +887,7 @@
           <a:p>
             <a:fld id="{055FF49E-80C9-43E6-9ECC-5DC75BE05600}" type="slidenum">
               <a:rPr lang="it-IT" smtClean="0"/>
-              <a:t>‹N›</a:t>
+              <a:t>‹#›</a:t>
             </a:fld>
             <a:endParaRPr lang="it-IT"/>
           </a:p>
@@ -928,7 +928,7 @@
           <p:cNvPr id="2" name="Titolo 1">
             <a:extLst>
               <a:ext uri="{FF2B5EF4-FFF2-40B4-BE49-F238E27FC236}">
-                <a16:creationId xmlns="" xmlns:a16="http://schemas.microsoft.com/office/drawing/2014/main" id="{8D324EC4-C5F5-4344-815B-63064E440846}"/>
+                <a16:creationId xmlns:a16="http://schemas.microsoft.com/office/drawing/2014/main" id="{8D324EC4-C5F5-4344-815B-63064E440846}"/>
               </a:ext>
             </a:extLst>
           </p:cNvPr>
@@ -956,7 +956,7 @@
           <p:cNvPr id="3" name="Segnaposto contenuto 2">
             <a:extLst>
               <a:ext uri="{FF2B5EF4-FFF2-40B4-BE49-F238E27FC236}">
-                <a16:creationId xmlns="" xmlns:a16="http://schemas.microsoft.com/office/drawing/2014/main" id="{55775342-FE66-4A01-9E0A-B6DFF50813CF}"/>
+                <a16:creationId xmlns:a16="http://schemas.microsoft.com/office/drawing/2014/main" id="{55775342-FE66-4A01-9E0A-B6DFF50813CF}"/>
               </a:ext>
             </a:extLst>
           </p:cNvPr>
@@ -1013,7 +1013,7 @@
           <p:cNvPr id="4" name="Segnaposto data 3">
             <a:extLst>
               <a:ext uri="{FF2B5EF4-FFF2-40B4-BE49-F238E27FC236}">
-                <a16:creationId xmlns="" xmlns:a16="http://schemas.microsoft.com/office/drawing/2014/main" id="{397A9FE5-70AC-44CE-914B-A1E1953D424A}"/>
+                <a16:creationId xmlns:a16="http://schemas.microsoft.com/office/drawing/2014/main" id="{397A9FE5-70AC-44CE-914B-A1E1953D424A}"/>
               </a:ext>
             </a:extLst>
           </p:cNvPr>
@@ -1031,7 +1031,7 @@
           <a:p>
             <a:fld id="{F7D71F90-2C6D-44F6-A1F9-0B80B911F8CA}" type="datetimeFigureOut">
               <a:rPr lang="it-IT" smtClean="0"/>
-              <a:t>16/12/2019</a:t>
+              <a:t>19/12/2019</a:t>
             </a:fld>
             <a:endParaRPr lang="it-IT"/>
           </a:p>
@@ -1042,7 +1042,7 @@
           <p:cNvPr id="5" name="Segnaposto piè di pagina 4">
             <a:extLst>
               <a:ext uri="{FF2B5EF4-FFF2-40B4-BE49-F238E27FC236}">
-                <a16:creationId xmlns="" xmlns:a16="http://schemas.microsoft.com/office/drawing/2014/main" id="{955E82A6-47E5-4A43-8C14-EB032BC59D50}"/>
+                <a16:creationId xmlns:a16="http://schemas.microsoft.com/office/drawing/2014/main" id="{955E82A6-47E5-4A43-8C14-EB032BC59D50}"/>
               </a:ext>
             </a:extLst>
           </p:cNvPr>
@@ -1067,7 +1067,7 @@
           <p:cNvPr id="6" name="Segnaposto numero diapositiva 5">
             <a:extLst>
               <a:ext uri="{FF2B5EF4-FFF2-40B4-BE49-F238E27FC236}">
-                <a16:creationId xmlns="" xmlns:a16="http://schemas.microsoft.com/office/drawing/2014/main" id="{58E8D349-F894-470A-B25E-2196ABC42040}"/>
+                <a16:creationId xmlns:a16="http://schemas.microsoft.com/office/drawing/2014/main" id="{58E8D349-F894-470A-B25E-2196ABC42040}"/>
               </a:ext>
             </a:extLst>
           </p:cNvPr>
@@ -1085,7 +1085,7 @@
           <a:p>
             <a:fld id="{055FF49E-80C9-43E6-9ECC-5DC75BE05600}" type="slidenum">
               <a:rPr lang="it-IT" smtClean="0"/>
-              <a:t>‹N›</a:t>
+              <a:t>‹#›</a:t>
             </a:fld>
             <a:endParaRPr lang="it-IT"/>
           </a:p>
@@ -1126,7 +1126,7 @@
           <p:cNvPr id="2" name="Titolo 1">
             <a:extLst>
               <a:ext uri="{FF2B5EF4-FFF2-40B4-BE49-F238E27FC236}">
-                <a16:creationId xmlns="" xmlns:a16="http://schemas.microsoft.com/office/drawing/2014/main" id="{FF8A343A-BEE9-48C2-8F08-6D02BD514F3F}"/>
+                <a16:creationId xmlns:a16="http://schemas.microsoft.com/office/drawing/2014/main" id="{FF8A343A-BEE9-48C2-8F08-6D02BD514F3F}"/>
               </a:ext>
             </a:extLst>
           </p:cNvPr>
@@ -1163,7 +1163,7 @@
           <p:cNvPr id="3" name="Segnaposto testo 2">
             <a:extLst>
               <a:ext uri="{FF2B5EF4-FFF2-40B4-BE49-F238E27FC236}">
-                <a16:creationId xmlns="" xmlns:a16="http://schemas.microsoft.com/office/drawing/2014/main" id="{0909A412-AD76-4989-B06E-E33E0F00580E}"/>
+                <a16:creationId xmlns:a16="http://schemas.microsoft.com/office/drawing/2014/main" id="{0909A412-AD76-4989-B06E-E33E0F00580E}"/>
               </a:ext>
             </a:extLst>
           </p:cNvPr>
@@ -1288,7 +1288,7 @@
           <p:cNvPr id="4" name="Segnaposto data 3">
             <a:extLst>
               <a:ext uri="{FF2B5EF4-FFF2-40B4-BE49-F238E27FC236}">
-                <a16:creationId xmlns="" xmlns:a16="http://schemas.microsoft.com/office/drawing/2014/main" id="{16318882-43E1-4C25-B100-9FE081333575}"/>
+                <a16:creationId xmlns:a16="http://schemas.microsoft.com/office/drawing/2014/main" id="{16318882-43E1-4C25-B100-9FE081333575}"/>
               </a:ext>
             </a:extLst>
           </p:cNvPr>
@@ -1306,7 +1306,7 @@
           <a:p>
             <a:fld id="{F7D71F90-2C6D-44F6-A1F9-0B80B911F8CA}" type="datetimeFigureOut">
               <a:rPr lang="it-IT" smtClean="0"/>
-              <a:t>16/12/2019</a:t>
+              <a:t>19/12/2019</a:t>
             </a:fld>
             <a:endParaRPr lang="it-IT"/>
           </a:p>
@@ -1317,7 +1317,7 @@
           <p:cNvPr id="5" name="Segnaposto piè di pagina 4">
             <a:extLst>
               <a:ext uri="{FF2B5EF4-FFF2-40B4-BE49-F238E27FC236}">
-                <a16:creationId xmlns="" xmlns:a16="http://schemas.microsoft.com/office/drawing/2014/main" id="{C6C78431-C23D-4359-9F41-506C478EC2A0}"/>
+                <a16:creationId xmlns:a16="http://schemas.microsoft.com/office/drawing/2014/main" id="{C6C78431-C23D-4359-9F41-506C478EC2A0}"/>
               </a:ext>
             </a:extLst>
           </p:cNvPr>
@@ -1342,7 +1342,7 @@
           <p:cNvPr id="6" name="Segnaposto numero diapositiva 5">
             <a:extLst>
               <a:ext uri="{FF2B5EF4-FFF2-40B4-BE49-F238E27FC236}">
-                <a16:creationId xmlns="" xmlns:a16="http://schemas.microsoft.com/office/drawing/2014/main" id="{DCF015C2-4C12-42A4-9944-4B1FE7A7FFB1}"/>
+                <a16:creationId xmlns:a16="http://schemas.microsoft.com/office/drawing/2014/main" id="{DCF015C2-4C12-42A4-9944-4B1FE7A7FFB1}"/>
               </a:ext>
             </a:extLst>
           </p:cNvPr>
@@ -1360,7 +1360,7 @@
           <a:p>
             <a:fld id="{055FF49E-80C9-43E6-9ECC-5DC75BE05600}" type="slidenum">
               <a:rPr lang="it-IT" smtClean="0"/>
-              <a:t>‹N›</a:t>
+              <a:t>‹#›</a:t>
             </a:fld>
             <a:endParaRPr lang="it-IT"/>
           </a:p>
@@ -1401,7 +1401,7 @@
           <p:cNvPr id="2" name="Titolo 1">
             <a:extLst>
               <a:ext uri="{FF2B5EF4-FFF2-40B4-BE49-F238E27FC236}">
-                <a16:creationId xmlns="" xmlns:a16="http://schemas.microsoft.com/office/drawing/2014/main" id="{7650FD1C-41AC-4FD0-8AF4-B2BFB5ECBDC7}"/>
+                <a16:creationId xmlns:a16="http://schemas.microsoft.com/office/drawing/2014/main" id="{7650FD1C-41AC-4FD0-8AF4-B2BFB5ECBDC7}"/>
               </a:ext>
             </a:extLst>
           </p:cNvPr>
@@ -1429,7 +1429,7 @@
           <p:cNvPr id="3" name="Segnaposto contenuto 2">
             <a:extLst>
               <a:ext uri="{FF2B5EF4-FFF2-40B4-BE49-F238E27FC236}">
-                <a16:creationId xmlns="" xmlns:a16="http://schemas.microsoft.com/office/drawing/2014/main" id="{DD16E77D-6E44-4E42-B7EA-AA87E0A9DBF9}"/>
+                <a16:creationId xmlns:a16="http://schemas.microsoft.com/office/drawing/2014/main" id="{DD16E77D-6E44-4E42-B7EA-AA87E0A9DBF9}"/>
               </a:ext>
             </a:extLst>
           </p:cNvPr>
@@ -1491,7 +1491,7 @@
           <p:cNvPr id="4" name="Segnaposto contenuto 3">
             <a:extLst>
               <a:ext uri="{FF2B5EF4-FFF2-40B4-BE49-F238E27FC236}">
-                <a16:creationId xmlns="" xmlns:a16="http://schemas.microsoft.com/office/drawing/2014/main" id="{844F8AF1-BDF4-4BB6-AA12-D9E74887B7AA}"/>
+                <a16:creationId xmlns:a16="http://schemas.microsoft.com/office/drawing/2014/main" id="{844F8AF1-BDF4-4BB6-AA12-D9E74887B7AA}"/>
               </a:ext>
             </a:extLst>
           </p:cNvPr>
@@ -1553,7 +1553,7 @@
           <p:cNvPr id="5" name="Segnaposto data 4">
             <a:extLst>
               <a:ext uri="{FF2B5EF4-FFF2-40B4-BE49-F238E27FC236}">
-                <a16:creationId xmlns="" xmlns:a16="http://schemas.microsoft.com/office/drawing/2014/main" id="{64E49264-4D9E-4F69-ADBE-5FCE7E088F87}"/>
+                <a16:creationId xmlns:a16="http://schemas.microsoft.com/office/drawing/2014/main" id="{64E49264-4D9E-4F69-ADBE-5FCE7E088F87}"/>
               </a:ext>
             </a:extLst>
           </p:cNvPr>
@@ -1571,7 +1571,7 @@
           <a:p>
             <a:fld id="{F7D71F90-2C6D-44F6-A1F9-0B80B911F8CA}" type="datetimeFigureOut">
               <a:rPr lang="it-IT" smtClean="0"/>
-              <a:t>16/12/2019</a:t>
+              <a:t>19/12/2019</a:t>
             </a:fld>
             <a:endParaRPr lang="it-IT"/>
           </a:p>
@@ -1582,7 +1582,7 @@
           <p:cNvPr id="6" name="Segnaposto piè di pagina 5">
             <a:extLst>
               <a:ext uri="{FF2B5EF4-FFF2-40B4-BE49-F238E27FC236}">
-                <a16:creationId xmlns="" xmlns:a16="http://schemas.microsoft.com/office/drawing/2014/main" id="{6BD94B07-3F97-448F-A14A-F799F51B318D}"/>
+                <a16:creationId xmlns:a16="http://schemas.microsoft.com/office/drawing/2014/main" id="{6BD94B07-3F97-448F-A14A-F799F51B318D}"/>
               </a:ext>
             </a:extLst>
           </p:cNvPr>
@@ -1607,7 +1607,7 @@
           <p:cNvPr id="7" name="Segnaposto numero diapositiva 6">
             <a:extLst>
               <a:ext uri="{FF2B5EF4-FFF2-40B4-BE49-F238E27FC236}">
-                <a16:creationId xmlns="" xmlns:a16="http://schemas.microsoft.com/office/drawing/2014/main" id="{B0CD1917-F8A2-456F-82E6-C095438948B0}"/>
+                <a16:creationId xmlns:a16="http://schemas.microsoft.com/office/drawing/2014/main" id="{B0CD1917-F8A2-456F-82E6-C095438948B0}"/>
               </a:ext>
             </a:extLst>
           </p:cNvPr>
@@ -1625,7 +1625,7 @@
           <a:p>
             <a:fld id="{055FF49E-80C9-43E6-9ECC-5DC75BE05600}" type="slidenum">
               <a:rPr lang="it-IT" smtClean="0"/>
-              <a:t>‹N›</a:t>
+              <a:t>‹#›</a:t>
             </a:fld>
             <a:endParaRPr lang="it-IT"/>
           </a:p>
@@ -1666,7 +1666,7 @@
           <p:cNvPr id="2" name="Titolo 1">
             <a:extLst>
               <a:ext uri="{FF2B5EF4-FFF2-40B4-BE49-F238E27FC236}">
-                <a16:creationId xmlns="" xmlns:a16="http://schemas.microsoft.com/office/drawing/2014/main" id="{B58BF815-104D-4049-9B9F-5BEFA614935C}"/>
+                <a16:creationId xmlns:a16="http://schemas.microsoft.com/office/drawing/2014/main" id="{B58BF815-104D-4049-9B9F-5BEFA614935C}"/>
               </a:ext>
             </a:extLst>
           </p:cNvPr>
@@ -1699,7 +1699,7 @@
           <p:cNvPr id="3" name="Segnaposto testo 2">
             <a:extLst>
               <a:ext uri="{FF2B5EF4-FFF2-40B4-BE49-F238E27FC236}">
-                <a16:creationId xmlns="" xmlns:a16="http://schemas.microsoft.com/office/drawing/2014/main" id="{CAE85FF7-9C0E-4DB9-A6AB-9133F631A4B3}"/>
+                <a16:creationId xmlns:a16="http://schemas.microsoft.com/office/drawing/2014/main" id="{CAE85FF7-9C0E-4DB9-A6AB-9133F631A4B3}"/>
               </a:ext>
             </a:extLst>
           </p:cNvPr>
@@ -1770,7 +1770,7 @@
           <p:cNvPr id="4" name="Segnaposto contenuto 3">
             <a:extLst>
               <a:ext uri="{FF2B5EF4-FFF2-40B4-BE49-F238E27FC236}">
-                <a16:creationId xmlns="" xmlns:a16="http://schemas.microsoft.com/office/drawing/2014/main" id="{31A1FF07-A483-4CBC-B502-D2040A241C59}"/>
+                <a16:creationId xmlns:a16="http://schemas.microsoft.com/office/drawing/2014/main" id="{31A1FF07-A483-4CBC-B502-D2040A241C59}"/>
               </a:ext>
             </a:extLst>
           </p:cNvPr>
@@ -1832,7 +1832,7 @@
           <p:cNvPr id="5" name="Segnaposto testo 4">
             <a:extLst>
               <a:ext uri="{FF2B5EF4-FFF2-40B4-BE49-F238E27FC236}">
-                <a16:creationId xmlns="" xmlns:a16="http://schemas.microsoft.com/office/drawing/2014/main" id="{30D9E67F-0023-4AD8-8149-34BD4C055D4E}"/>
+                <a16:creationId xmlns:a16="http://schemas.microsoft.com/office/drawing/2014/main" id="{30D9E67F-0023-4AD8-8149-34BD4C055D4E}"/>
               </a:ext>
             </a:extLst>
           </p:cNvPr>
@@ -1903,7 +1903,7 @@
           <p:cNvPr id="6" name="Segnaposto contenuto 5">
             <a:extLst>
               <a:ext uri="{FF2B5EF4-FFF2-40B4-BE49-F238E27FC236}">
-                <a16:creationId xmlns="" xmlns:a16="http://schemas.microsoft.com/office/drawing/2014/main" id="{23831668-98C0-4979-87D7-959474A9085E}"/>
+                <a16:creationId xmlns:a16="http://schemas.microsoft.com/office/drawing/2014/main" id="{23831668-98C0-4979-87D7-959474A9085E}"/>
               </a:ext>
             </a:extLst>
           </p:cNvPr>
@@ -1965,7 +1965,7 @@
           <p:cNvPr id="7" name="Segnaposto data 6">
             <a:extLst>
               <a:ext uri="{FF2B5EF4-FFF2-40B4-BE49-F238E27FC236}">
-                <a16:creationId xmlns="" xmlns:a16="http://schemas.microsoft.com/office/drawing/2014/main" id="{91B922F5-7D11-4052-AF29-AA3B75B06734}"/>
+                <a16:creationId xmlns:a16="http://schemas.microsoft.com/office/drawing/2014/main" id="{91B922F5-7D11-4052-AF29-AA3B75B06734}"/>
               </a:ext>
             </a:extLst>
           </p:cNvPr>
@@ -1983,7 +1983,7 @@
           <a:p>
             <a:fld id="{F7D71F90-2C6D-44F6-A1F9-0B80B911F8CA}" type="datetimeFigureOut">
               <a:rPr lang="it-IT" smtClean="0"/>
-              <a:t>16/12/2019</a:t>
+              <a:t>19/12/2019</a:t>
             </a:fld>
             <a:endParaRPr lang="it-IT"/>
           </a:p>
@@ -1994,7 +1994,7 @@
           <p:cNvPr id="8" name="Segnaposto piè di pagina 7">
             <a:extLst>
               <a:ext uri="{FF2B5EF4-FFF2-40B4-BE49-F238E27FC236}">
-                <a16:creationId xmlns="" xmlns:a16="http://schemas.microsoft.com/office/drawing/2014/main" id="{6EA02A2F-7388-4F42-A4C6-2A7660ED38E4}"/>
+                <a16:creationId xmlns:a16="http://schemas.microsoft.com/office/drawing/2014/main" id="{6EA02A2F-7388-4F42-A4C6-2A7660ED38E4}"/>
               </a:ext>
             </a:extLst>
           </p:cNvPr>
@@ -2019,7 +2019,7 @@
           <p:cNvPr id="9" name="Segnaposto numero diapositiva 8">
             <a:extLst>
               <a:ext uri="{FF2B5EF4-FFF2-40B4-BE49-F238E27FC236}">
-                <a16:creationId xmlns="" xmlns:a16="http://schemas.microsoft.com/office/drawing/2014/main" id="{CB48DB9B-4650-4AD2-89EF-29E9A37B5E48}"/>
+                <a16:creationId xmlns:a16="http://schemas.microsoft.com/office/drawing/2014/main" id="{CB48DB9B-4650-4AD2-89EF-29E9A37B5E48}"/>
               </a:ext>
             </a:extLst>
           </p:cNvPr>
@@ -2037,7 +2037,7 @@
           <a:p>
             <a:fld id="{055FF49E-80C9-43E6-9ECC-5DC75BE05600}" type="slidenum">
               <a:rPr lang="it-IT" smtClean="0"/>
-              <a:t>‹N›</a:t>
+              <a:t>‹#›</a:t>
             </a:fld>
             <a:endParaRPr lang="it-IT"/>
           </a:p>
@@ -2078,7 +2078,7 @@
           <p:cNvPr id="2" name="Titolo 1">
             <a:extLst>
               <a:ext uri="{FF2B5EF4-FFF2-40B4-BE49-F238E27FC236}">
-                <a16:creationId xmlns="" xmlns:a16="http://schemas.microsoft.com/office/drawing/2014/main" id="{7FEFC453-E380-4034-875E-863F49914714}"/>
+                <a16:creationId xmlns:a16="http://schemas.microsoft.com/office/drawing/2014/main" id="{7FEFC453-E380-4034-875E-863F49914714}"/>
               </a:ext>
             </a:extLst>
           </p:cNvPr>
@@ -2106,7 +2106,7 @@
           <p:cNvPr id="3" name="Segnaposto data 2">
             <a:extLst>
               <a:ext uri="{FF2B5EF4-FFF2-40B4-BE49-F238E27FC236}">
-                <a16:creationId xmlns="" xmlns:a16="http://schemas.microsoft.com/office/drawing/2014/main" id="{5BC16F08-373A-43EF-8FBC-2D846E43D6B9}"/>
+                <a16:creationId xmlns:a16="http://schemas.microsoft.com/office/drawing/2014/main" id="{5BC16F08-373A-43EF-8FBC-2D846E43D6B9}"/>
               </a:ext>
             </a:extLst>
           </p:cNvPr>
@@ -2124,7 +2124,7 @@
           <a:p>
             <a:fld id="{F7D71F90-2C6D-44F6-A1F9-0B80B911F8CA}" type="datetimeFigureOut">
               <a:rPr lang="it-IT" smtClean="0"/>
-              <a:t>16/12/2019</a:t>
+              <a:t>19/12/2019</a:t>
             </a:fld>
             <a:endParaRPr lang="it-IT"/>
           </a:p>
@@ -2135,7 +2135,7 @@
           <p:cNvPr id="4" name="Segnaposto piè di pagina 3">
             <a:extLst>
               <a:ext uri="{FF2B5EF4-FFF2-40B4-BE49-F238E27FC236}">
-                <a16:creationId xmlns="" xmlns:a16="http://schemas.microsoft.com/office/drawing/2014/main" id="{2A78CDAE-3535-434E-BF92-560FEDD6C387}"/>
+                <a16:creationId xmlns:a16="http://schemas.microsoft.com/office/drawing/2014/main" id="{2A78CDAE-3535-434E-BF92-560FEDD6C387}"/>
               </a:ext>
             </a:extLst>
           </p:cNvPr>
@@ -2160,7 +2160,7 @@
           <p:cNvPr id="5" name="Segnaposto numero diapositiva 4">
             <a:extLst>
               <a:ext uri="{FF2B5EF4-FFF2-40B4-BE49-F238E27FC236}">
-                <a16:creationId xmlns="" xmlns:a16="http://schemas.microsoft.com/office/drawing/2014/main" id="{FAD2588D-B079-4FE5-B454-629CF3E310A3}"/>
+                <a16:creationId xmlns:a16="http://schemas.microsoft.com/office/drawing/2014/main" id="{FAD2588D-B079-4FE5-B454-629CF3E310A3}"/>
               </a:ext>
             </a:extLst>
           </p:cNvPr>
@@ -2178,7 +2178,7 @@
           <a:p>
             <a:fld id="{055FF49E-80C9-43E6-9ECC-5DC75BE05600}" type="slidenum">
               <a:rPr lang="it-IT" smtClean="0"/>
-              <a:t>‹N›</a:t>
+              <a:t>‹#›</a:t>
             </a:fld>
             <a:endParaRPr lang="it-IT"/>
           </a:p>
@@ -2219,7 +2219,7 @@
           <p:cNvPr id="2" name="Segnaposto data 1">
             <a:extLst>
               <a:ext uri="{FF2B5EF4-FFF2-40B4-BE49-F238E27FC236}">
-                <a16:creationId xmlns="" xmlns:a16="http://schemas.microsoft.com/office/drawing/2014/main" id="{D9E26DD7-8914-4A23-85B9-0C03B3ACA40C}"/>
+                <a16:creationId xmlns:a16="http://schemas.microsoft.com/office/drawing/2014/main" id="{D9E26DD7-8914-4A23-85B9-0C03B3ACA40C}"/>
               </a:ext>
             </a:extLst>
           </p:cNvPr>
@@ -2237,7 +2237,7 @@
           <a:p>
             <a:fld id="{F7D71F90-2C6D-44F6-A1F9-0B80B911F8CA}" type="datetimeFigureOut">
               <a:rPr lang="it-IT" smtClean="0"/>
-              <a:t>16/12/2019</a:t>
+              <a:t>19/12/2019</a:t>
             </a:fld>
             <a:endParaRPr lang="it-IT"/>
           </a:p>
@@ -2248,7 +2248,7 @@
           <p:cNvPr id="3" name="Segnaposto piè di pagina 2">
             <a:extLst>
               <a:ext uri="{FF2B5EF4-FFF2-40B4-BE49-F238E27FC236}">
-                <a16:creationId xmlns="" xmlns:a16="http://schemas.microsoft.com/office/drawing/2014/main" id="{992E87C0-E01E-4B5D-B829-69CEB0DB0D77}"/>
+                <a16:creationId xmlns:a16="http://schemas.microsoft.com/office/drawing/2014/main" id="{992E87C0-E01E-4B5D-B829-69CEB0DB0D77}"/>
               </a:ext>
             </a:extLst>
           </p:cNvPr>
@@ -2273,7 +2273,7 @@
           <p:cNvPr id="4" name="Segnaposto numero diapositiva 3">
             <a:extLst>
               <a:ext uri="{FF2B5EF4-FFF2-40B4-BE49-F238E27FC236}">
-                <a16:creationId xmlns="" xmlns:a16="http://schemas.microsoft.com/office/drawing/2014/main" id="{F7867DD9-A762-457F-A406-B864D98AA788}"/>
+                <a16:creationId xmlns:a16="http://schemas.microsoft.com/office/drawing/2014/main" id="{F7867DD9-A762-457F-A406-B864D98AA788}"/>
               </a:ext>
             </a:extLst>
           </p:cNvPr>
@@ -2291,7 +2291,7 @@
           <a:p>
             <a:fld id="{055FF49E-80C9-43E6-9ECC-5DC75BE05600}" type="slidenum">
               <a:rPr lang="it-IT" smtClean="0"/>
-              <a:t>‹N›</a:t>
+              <a:t>‹#›</a:t>
             </a:fld>
             <a:endParaRPr lang="it-IT"/>
           </a:p>
@@ -2332,7 +2332,7 @@
           <p:cNvPr id="2" name="Titolo 1">
             <a:extLst>
               <a:ext uri="{FF2B5EF4-FFF2-40B4-BE49-F238E27FC236}">
-                <a16:creationId xmlns="" xmlns:a16="http://schemas.microsoft.com/office/drawing/2014/main" id="{76124E57-2EC1-4A69-8B20-E15B6D22940F}"/>
+                <a16:creationId xmlns:a16="http://schemas.microsoft.com/office/drawing/2014/main" id="{76124E57-2EC1-4A69-8B20-E15B6D22940F}"/>
               </a:ext>
             </a:extLst>
           </p:cNvPr>
@@ -2369,7 +2369,7 @@
           <p:cNvPr id="3" name="Segnaposto contenuto 2">
             <a:extLst>
               <a:ext uri="{FF2B5EF4-FFF2-40B4-BE49-F238E27FC236}">
-                <a16:creationId xmlns="" xmlns:a16="http://schemas.microsoft.com/office/drawing/2014/main" id="{734D8066-1E08-4CE8-983F-9BBA87274CC7}"/>
+                <a16:creationId xmlns:a16="http://schemas.microsoft.com/office/drawing/2014/main" id="{734D8066-1E08-4CE8-983F-9BBA87274CC7}"/>
               </a:ext>
             </a:extLst>
           </p:cNvPr>
@@ -2459,7 +2459,7 @@
           <p:cNvPr id="4" name="Segnaposto testo 3">
             <a:extLst>
               <a:ext uri="{FF2B5EF4-FFF2-40B4-BE49-F238E27FC236}">
-                <a16:creationId xmlns="" xmlns:a16="http://schemas.microsoft.com/office/drawing/2014/main" id="{F3FA6396-D906-40C8-AE24-510E2F78C7FE}"/>
+                <a16:creationId xmlns:a16="http://schemas.microsoft.com/office/drawing/2014/main" id="{F3FA6396-D906-40C8-AE24-510E2F78C7FE}"/>
               </a:ext>
             </a:extLst>
           </p:cNvPr>
@@ -2530,7 +2530,7 @@
           <p:cNvPr id="5" name="Segnaposto data 4">
             <a:extLst>
               <a:ext uri="{FF2B5EF4-FFF2-40B4-BE49-F238E27FC236}">
-                <a16:creationId xmlns="" xmlns:a16="http://schemas.microsoft.com/office/drawing/2014/main" id="{BAA5942A-3BCE-4482-8A5C-CD97772E8976}"/>
+                <a16:creationId xmlns:a16="http://schemas.microsoft.com/office/drawing/2014/main" id="{BAA5942A-3BCE-4482-8A5C-CD97772E8976}"/>
               </a:ext>
             </a:extLst>
           </p:cNvPr>
@@ -2548,7 +2548,7 @@
           <a:p>
             <a:fld id="{F7D71F90-2C6D-44F6-A1F9-0B80B911F8CA}" type="datetimeFigureOut">
               <a:rPr lang="it-IT" smtClean="0"/>
-              <a:t>16/12/2019</a:t>
+              <a:t>19/12/2019</a:t>
             </a:fld>
             <a:endParaRPr lang="it-IT"/>
           </a:p>
@@ -2559,7 +2559,7 @@
           <p:cNvPr id="6" name="Segnaposto piè di pagina 5">
             <a:extLst>
               <a:ext uri="{FF2B5EF4-FFF2-40B4-BE49-F238E27FC236}">
-                <a16:creationId xmlns="" xmlns:a16="http://schemas.microsoft.com/office/drawing/2014/main" id="{99420126-9AFA-4777-BFF5-366C09F8B32E}"/>
+                <a16:creationId xmlns:a16="http://schemas.microsoft.com/office/drawing/2014/main" id="{99420126-9AFA-4777-BFF5-366C09F8B32E}"/>
               </a:ext>
             </a:extLst>
           </p:cNvPr>
@@ -2584,7 +2584,7 @@
           <p:cNvPr id="7" name="Segnaposto numero diapositiva 6">
             <a:extLst>
               <a:ext uri="{FF2B5EF4-FFF2-40B4-BE49-F238E27FC236}">
-                <a16:creationId xmlns="" xmlns:a16="http://schemas.microsoft.com/office/drawing/2014/main" id="{87996299-B8B2-4606-A686-94BC7B31D834}"/>
+                <a16:creationId xmlns:a16="http://schemas.microsoft.com/office/drawing/2014/main" id="{87996299-B8B2-4606-A686-94BC7B31D834}"/>
               </a:ext>
             </a:extLst>
           </p:cNvPr>
@@ -2602,7 +2602,7 @@
           <a:p>
             <a:fld id="{055FF49E-80C9-43E6-9ECC-5DC75BE05600}" type="slidenum">
               <a:rPr lang="it-IT" smtClean="0"/>
-              <a:t>‹N›</a:t>
+              <a:t>‹#›</a:t>
             </a:fld>
             <a:endParaRPr lang="it-IT"/>
           </a:p>
@@ -2643,7 +2643,7 @@
           <p:cNvPr id="2" name="Titolo 1">
             <a:extLst>
               <a:ext uri="{FF2B5EF4-FFF2-40B4-BE49-F238E27FC236}">
-                <a16:creationId xmlns="" xmlns:a16="http://schemas.microsoft.com/office/drawing/2014/main" id="{B966293D-979C-4064-9F2B-6124C51E68FE}"/>
+                <a16:creationId xmlns:a16="http://schemas.microsoft.com/office/drawing/2014/main" id="{B966293D-979C-4064-9F2B-6124C51E68FE}"/>
               </a:ext>
             </a:extLst>
           </p:cNvPr>
@@ -2680,7 +2680,7 @@
           <p:cNvPr id="3" name="Segnaposto immagine 2">
             <a:extLst>
               <a:ext uri="{FF2B5EF4-FFF2-40B4-BE49-F238E27FC236}">
-                <a16:creationId xmlns="" xmlns:a16="http://schemas.microsoft.com/office/drawing/2014/main" id="{6A8C2EA0-142A-454E-BAAB-7C4485D60299}"/>
+                <a16:creationId xmlns:a16="http://schemas.microsoft.com/office/drawing/2014/main" id="{6A8C2EA0-142A-454E-BAAB-7C4485D60299}"/>
               </a:ext>
             </a:extLst>
           </p:cNvPr>
@@ -2747,7 +2747,7 @@
           <p:cNvPr id="4" name="Segnaposto testo 3">
             <a:extLst>
               <a:ext uri="{FF2B5EF4-FFF2-40B4-BE49-F238E27FC236}">
-                <a16:creationId xmlns="" xmlns:a16="http://schemas.microsoft.com/office/drawing/2014/main" id="{41AB84A7-19D9-44FE-8513-77CAF35AA7C2}"/>
+                <a16:creationId xmlns:a16="http://schemas.microsoft.com/office/drawing/2014/main" id="{41AB84A7-19D9-44FE-8513-77CAF35AA7C2}"/>
               </a:ext>
             </a:extLst>
           </p:cNvPr>
@@ -2818,7 +2818,7 @@
           <p:cNvPr id="5" name="Segnaposto data 4">
             <a:extLst>
               <a:ext uri="{FF2B5EF4-FFF2-40B4-BE49-F238E27FC236}">
-                <a16:creationId xmlns="" xmlns:a16="http://schemas.microsoft.com/office/drawing/2014/main" id="{8BE837FD-91EA-47CC-A6A0-F23A450D108C}"/>
+                <a16:creationId xmlns:a16="http://schemas.microsoft.com/office/drawing/2014/main" id="{8BE837FD-91EA-47CC-A6A0-F23A450D108C}"/>
               </a:ext>
             </a:extLst>
           </p:cNvPr>
@@ -2836,7 +2836,7 @@
           <a:p>
             <a:fld id="{F7D71F90-2C6D-44F6-A1F9-0B80B911F8CA}" type="datetimeFigureOut">
               <a:rPr lang="it-IT" smtClean="0"/>
-              <a:t>16/12/2019</a:t>
+              <a:t>19/12/2019</a:t>
             </a:fld>
             <a:endParaRPr lang="it-IT"/>
           </a:p>
@@ -2847,7 +2847,7 @@
           <p:cNvPr id="6" name="Segnaposto piè di pagina 5">
             <a:extLst>
               <a:ext uri="{FF2B5EF4-FFF2-40B4-BE49-F238E27FC236}">
-                <a16:creationId xmlns="" xmlns:a16="http://schemas.microsoft.com/office/drawing/2014/main" id="{81B3C88D-C08B-4A45-BF0D-04C3264EB32A}"/>
+                <a16:creationId xmlns:a16="http://schemas.microsoft.com/office/drawing/2014/main" id="{81B3C88D-C08B-4A45-BF0D-04C3264EB32A}"/>
               </a:ext>
             </a:extLst>
           </p:cNvPr>
@@ -2872,7 +2872,7 @@
           <p:cNvPr id="7" name="Segnaposto numero diapositiva 6">
             <a:extLst>
               <a:ext uri="{FF2B5EF4-FFF2-40B4-BE49-F238E27FC236}">
-                <a16:creationId xmlns="" xmlns:a16="http://schemas.microsoft.com/office/drawing/2014/main" id="{C35DA505-C2B5-4A20-A0ED-32D6B7B4CE44}"/>
+                <a16:creationId xmlns:a16="http://schemas.microsoft.com/office/drawing/2014/main" id="{C35DA505-C2B5-4A20-A0ED-32D6B7B4CE44}"/>
               </a:ext>
             </a:extLst>
           </p:cNvPr>
@@ -2890,7 +2890,7 @@
           <a:p>
             <a:fld id="{055FF49E-80C9-43E6-9ECC-5DC75BE05600}" type="slidenum">
               <a:rPr lang="it-IT" smtClean="0"/>
-              <a:t>‹N›</a:t>
+              <a:t>‹#›</a:t>
             </a:fld>
             <a:endParaRPr lang="it-IT"/>
           </a:p>
@@ -2936,7 +2936,7 @@
           <p:cNvPr id="2" name="Segnaposto titolo 1">
             <a:extLst>
               <a:ext uri="{FF2B5EF4-FFF2-40B4-BE49-F238E27FC236}">
-                <a16:creationId xmlns="" xmlns:a16="http://schemas.microsoft.com/office/drawing/2014/main" id="{4B1D921F-2C48-4285-A8BD-792591D929C6}"/>
+                <a16:creationId xmlns:a16="http://schemas.microsoft.com/office/drawing/2014/main" id="{4B1D921F-2C48-4285-A8BD-792591D929C6}"/>
               </a:ext>
             </a:extLst>
           </p:cNvPr>
@@ -2974,7 +2974,7 @@
           <p:cNvPr id="3" name="Segnaposto testo 2">
             <a:extLst>
               <a:ext uri="{FF2B5EF4-FFF2-40B4-BE49-F238E27FC236}">
-                <a16:creationId xmlns="" xmlns:a16="http://schemas.microsoft.com/office/drawing/2014/main" id="{518CFD04-AD80-4442-9D20-77C3C390CCFF}"/>
+                <a16:creationId xmlns:a16="http://schemas.microsoft.com/office/drawing/2014/main" id="{518CFD04-AD80-4442-9D20-77C3C390CCFF}"/>
               </a:ext>
             </a:extLst>
           </p:cNvPr>
@@ -3041,7 +3041,7 @@
           <p:cNvPr id="4" name="Segnaposto data 3">
             <a:extLst>
               <a:ext uri="{FF2B5EF4-FFF2-40B4-BE49-F238E27FC236}">
-                <a16:creationId xmlns="" xmlns:a16="http://schemas.microsoft.com/office/drawing/2014/main" id="{2D1ACE57-994B-471D-A0C5-61CE109C7E59}"/>
+                <a16:creationId xmlns:a16="http://schemas.microsoft.com/office/drawing/2014/main" id="{2D1ACE57-994B-471D-A0C5-61CE109C7E59}"/>
               </a:ext>
             </a:extLst>
           </p:cNvPr>
@@ -3077,7 +3077,7 @@
           <a:p>
             <a:fld id="{F7D71F90-2C6D-44F6-A1F9-0B80B911F8CA}" type="datetimeFigureOut">
               <a:rPr lang="it-IT" smtClean="0"/>
-              <a:t>16/12/2019</a:t>
+              <a:t>19/12/2019</a:t>
             </a:fld>
             <a:endParaRPr lang="it-IT"/>
           </a:p>
@@ -3088,7 +3088,7 @@
           <p:cNvPr id="5" name="Segnaposto piè di pagina 4">
             <a:extLst>
               <a:ext uri="{FF2B5EF4-FFF2-40B4-BE49-F238E27FC236}">
-                <a16:creationId xmlns="" xmlns:a16="http://schemas.microsoft.com/office/drawing/2014/main" id="{311C4A1E-1E5A-4141-9735-E37F71E2C7B0}"/>
+                <a16:creationId xmlns:a16="http://schemas.microsoft.com/office/drawing/2014/main" id="{311C4A1E-1E5A-4141-9735-E37F71E2C7B0}"/>
               </a:ext>
             </a:extLst>
           </p:cNvPr>
@@ -3131,7 +3131,7 @@
           <p:cNvPr id="6" name="Segnaposto numero diapositiva 5">
             <a:extLst>
               <a:ext uri="{FF2B5EF4-FFF2-40B4-BE49-F238E27FC236}">
-                <a16:creationId xmlns="" xmlns:a16="http://schemas.microsoft.com/office/drawing/2014/main" id="{5C64D511-420E-43E5-BCD4-81BC958B8929}"/>
+                <a16:creationId xmlns:a16="http://schemas.microsoft.com/office/drawing/2014/main" id="{5C64D511-420E-43E5-BCD4-81BC958B8929}"/>
               </a:ext>
             </a:extLst>
           </p:cNvPr>
@@ -3167,7 +3167,7 @@
           <a:p>
             <a:fld id="{055FF49E-80C9-43E6-9ECC-5DC75BE05600}" type="slidenum">
               <a:rPr lang="it-IT" smtClean="0"/>
-              <a:t>‹N›</a:t>
+              <a:t>‹#›</a:t>
             </a:fld>
             <a:endParaRPr lang="it-IT"/>
           </a:p>
@@ -3507,10 +3507,10 @@
           <p:cNvPr id="8" name="Rectangle 7">
             <a:extLst>
               <a:ext uri="{FF2B5EF4-FFF2-40B4-BE49-F238E27FC236}">
-                <a16:creationId xmlns="" xmlns:a16="http://schemas.microsoft.com/office/drawing/2014/main" id="{23962611-DFD5-4092-AAFD-559E3DFCE2C9}"/>
+                <a16:creationId xmlns:a16="http://schemas.microsoft.com/office/drawing/2014/main" id="{23962611-DFD5-4092-AAFD-559E3DFCE2C9}"/>
               </a:ext>
               <a:ext uri="{C183D7F6-B498-43B3-948B-1728B52AA6E4}">
-                <adec:decorative xmlns="" xmlns:adec="http://schemas.microsoft.com/office/drawing/2017/decorative" val="1"/>
+                <adec:decorative xmlns:adec="http://schemas.microsoft.com/office/drawing/2017/decorative" val="1"/>
               </a:ext>
             </a:extLst>
           </p:cNvPr>
@@ -3520,7 +3520,7 @@
           <p:nvPr>
             <p:extLst>
               <p:ext uri="{386F3935-93C4-4BCD-93E2-E3B085C9AB24}">
-                <p16:designElem xmlns="" xmlns:p16="http://schemas.microsoft.com/office/powerpoint/2015/main" val="1"/>
+                <p16:designElem xmlns:p16="http://schemas.microsoft.com/office/powerpoint/2015/main" val="1"/>
               </p:ext>
             </p:extLst>
           </p:nvPr>
@@ -3592,10 +3592,10 @@
           <p:cNvPr id="10" name="Picture 9">
             <a:extLst>
               <a:ext uri="{FF2B5EF4-FFF2-40B4-BE49-F238E27FC236}">
-                <a16:creationId xmlns="" xmlns:a16="http://schemas.microsoft.com/office/drawing/2014/main" id="{2270F1FA-0425-408F-9861-80BF5AFB276D}"/>
+                <a16:creationId xmlns:a16="http://schemas.microsoft.com/office/drawing/2014/main" id="{2270F1FA-0425-408F-9861-80BF5AFB276D}"/>
               </a:ext>
               <a:ext uri="{C183D7F6-B498-43B3-948B-1728B52AA6E4}">
-                <adec:decorative xmlns="" xmlns:adec="http://schemas.microsoft.com/office/drawing/2017/decorative" val="1"/>
+                <adec:decorative xmlns:adec="http://schemas.microsoft.com/office/drawing/2017/decorative" val="1"/>
               </a:ext>
             </a:extLst>
           </p:cNvPr>
@@ -3605,7 +3605,7 @@
           <p:nvPr>
             <p:extLst>
               <p:ext uri="{386F3935-93C4-4BCD-93E2-E3B085C9AB24}">
-                <p16:designElem xmlns="" xmlns:p16="http://schemas.microsoft.com/office/powerpoint/2015/main" val="1"/>
+                <p16:designElem xmlns:p16="http://schemas.microsoft.com/office/powerpoint/2015/main" val="1"/>
               </p:ext>
             </p:extLst>
           </p:nvPr>
@@ -3637,7 +3637,7 @@
           <p:cNvPr id="2" name="Titolo 1">
             <a:extLst>
               <a:ext uri="{FF2B5EF4-FFF2-40B4-BE49-F238E27FC236}">
-                <a16:creationId xmlns="" xmlns:a16="http://schemas.microsoft.com/office/drawing/2014/main" id="{DCBAC149-DB9F-4874-BC24-7F077AA4B78D}"/>
+                <a16:creationId xmlns:a16="http://schemas.microsoft.com/office/drawing/2014/main" id="{DCBAC149-DB9F-4874-BC24-7F077AA4B78D}"/>
               </a:ext>
             </a:extLst>
           </p:cNvPr>
@@ -3676,7 +3676,7 @@
           <p:cNvPr id="3" name="Sottotitolo 2">
             <a:extLst>
               <a:ext uri="{FF2B5EF4-FFF2-40B4-BE49-F238E27FC236}">
-                <a16:creationId xmlns="" xmlns:a16="http://schemas.microsoft.com/office/drawing/2014/main" id="{B9F686C4-B595-4CDD-8233-91A53C48A369}"/>
+                <a16:creationId xmlns:a16="http://schemas.microsoft.com/office/drawing/2014/main" id="{B9F686C4-B595-4CDD-8233-91A53C48A369}"/>
               </a:ext>
             </a:extLst>
           </p:cNvPr>
@@ -3720,13 +3720,6 @@
   <p:clrMapOvr>
     <a:masterClrMapping/>
   </p:clrMapOvr>
-  <p:timing>
-    <p:tnLst>
-      <p:par>
-        <p:cTn id="1" dur="indefinite" restart="never" nodeType="tmRoot"/>
-      </p:par>
-    </p:tnLst>
-  </p:timing>
 </p:sld>
 </file>
 
@@ -3752,7 +3745,7 @@
           <p:cNvPr id="2" name="Titolo 1">
             <a:extLst>
               <a:ext uri="{FF2B5EF4-FFF2-40B4-BE49-F238E27FC236}">
-                <a16:creationId xmlns="" xmlns:a16="http://schemas.microsoft.com/office/drawing/2014/main" id="{B7EC37DD-9E0C-4C6E-A811-00302AD6EACB}"/>
+                <a16:creationId xmlns:a16="http://schemas.microsoft.com/office/drawing/2014/main" id="{B7EC37DD-9E0C-4C6E-A811-00302AD6EACB}"/>
               </a:ext>
             </a:extLst>
           </p:cNvPr>
@@ -3785,7 +3778,7 @@
           <p:cNvPr id="4" name="Tabella 4">
             <a:extLst>
               <a:ext uri="{FF2B5EF4-FFF2-40B4-BE49-F238E27FC236}">
-                <a16:creationId xmlns="" xmlns:a16="http://schemas.microsoft.com/office/drawing/2014/main" id="{043F75E0-1B48-4C2E-8ADF-C8441714A81A}"/>
+                <a16:creationId xmlns:a16="http://schemas.microsoft.com/office/drawing/2014/main" id="{043F75E0-1B48-4C2E-8ADF-C8441714A81A}"/>
               </a:ext>
             </a:extLst>
           </p:cNvPr>
@@ -3796,7 +3789,7 @@
             <p:ph idx="1"/>
             <p:extLst>
               <p:ext uri="{D42A27DB-BD31-4B8C-83A1-F6EECF244321}">
-                <p14:modId xmlns:p14="http://schemas.microsoft.com/office/powerpoint/2010/main" val="394766594"/>
+                <p14:modId xmlns:p14="http://schemas.microsoft.com/office/powerpoint/2010/main" val="3298388647"/>
               </p:ext>
             </p:extLst>
           </p:nvPr>
@@ -3815,14 +3808,14 @@
                 <a:gridCol w="2483498">
                   <a:extLst>
                     <a:ext uri="{9D8B030D-6E8A-4147-A177-3AD203B41FA5}">
-                      <a16:colId xmlns="" xmlns:a16="http://schemas.microsoft.com/office/drawing/2014/main" val="414173828"/>
+                      <a16:colId xmlns:a16="http://schemas.microsoft.com/office/drawing/2014/main" val="414173828"/>
                     </a:ext>
                   </a:extLst>
                 </a:gridCol>
                 <a:gridCol w="8032102">
                   <a:extLst>
                     <a:ext uri="{9D8B030D-6E8A-4147-A177-3AD203B41FA5}">
-                      <a16:colId xmlns="" xmlns:a16="http://schemas.microsoft.com/office/drawing/2014/main" val="418542194"/>
+                      <a16:colId xmlns:a16="http://schemas.microsoft.com/office/drawing/2014/main" val="418542194"/>
                     </a:ext>
                   </a:extLst>
                 </a:gridCol>
@@ -3856,7 +3849,7 @@
                 </a:tc>
                 <a:extLst>
                   <a:ext uri="{0D108BD9-81ED-4DB2-BD59-A6C34878D82A}">
-                    <a16:rowId xmlns="" xmlns:a16="http://schemas.microsoft.com/office/drawing/2014/main" val="246340804"/>
+                    <a16:rowId xmlns:a16="http://schemas.microsoft.com/office/drawing/2014/main" val="246340804"/>
                   </a:ext>
                 </a:extLst>
               </a:tr>
@@ -3890,7 +3883,7 @@
                 </a:tc>
                 <a:extLst>
                   <a:ext uri="{0D108BD9-81ED-4DB2-BD59-A6C34878D82A}">
-                    <a16:rowId xmlns="" xmlns:a16="http://schemas.microsoft.com/office/drawing/2014/main" val="2368987764"/>
+                    <a16:rowId xmlns:a16="http://schemas.microsoft.com/office/drawing/2014/main" val="2368987764"/>
                   </a:ext>
                 </a:extLst>
               </a:tr>
@@ -3923,7 +3916,7 @@
                 </a:tc>
                 <a:extLst>
                   <a:ext uri="{0D108BD9-81ED-4DB2-BD59-A6C34878D82A}">
-                    <a16:rowId xmlns="" xmlns:a16="http://schemas.microsoft.com/office/drawing/2014/main" val="301388857"/>
+                    <a16:rowId xmlns:a16="http://schemas.microsoft.com/office/drawing/2014/main" val="301388857"/>
                   </a:ext>
                 </a:extLst>
               </a:tr>
@@ -3961,7 +3954,7 @@
                 </a:tc>
                 <a:extLst>
                   <a:ext uri="{0D108BD9-81ED-4DB2-BD59-A6C34878D82A}">
-                    <a16:rowId xmlns="" xmlns:a16="http://schemas.microsoft.com/office/drawing/2014/main" val="2333084500"/>
+                    <a16:rowId xmlns:a16="http://schemas.microsoft.com/office/drawing/2014/main" val="2333084500"/>
                   </a:ext>
                 </a:extLst>
               </a:tr>
@@ -3985,17 +3978,16 @@
                     <a:lstStyle/>
                     <a:p>
                       <a:r>
-                        <a:rPr lang="it-IT" smtClean="0"/>
-                        <a:t>16/12/2019</a:t>
-                      </a:r>
-                      <a:endParaRPr lang="it-IT" dirty="0"/>
+                        <a:rPr lang="it-IT" dirty="0"/>
+                        <a:t>19/12/2019</a:t>
+                      </a:r>
                     </a:p>
                   </a:txBody>
                   <a:tcPr/>
                 </a:tc>
                 <a:extLst>
                   <a:ext uri="{0D108BD9-81ED-4DB2-BD59-A6C34878D82A}">
-                    <a16:rowId xmlns="" xmlns:a16="http://schemas.microsoft.com/office/drawing/2014/main" val="2773735045"/>
+                    <a16:rowId xmlns:a16="http://schemas.microsoft.com/office/drawing/2014/main" val="2773735045"/>
                   </a:ext>
                 </a:extLst>
               </a:tr>
@@ -4019,29 +4011,16 @@
                     <a:lstStyle/>
                     <a:p>
                       <a:r>
-                        <a:rPr lang="it-IT" dirty="0" err="1" smtClean="0"/>
-                        <a:t>Ntiegko</a:t>
-                      </a:r>
-                      <a:r>
-                        <a:rPr lang="it-IT" baseline="0" dirty="0" smtClean="0"/>
-                        <a:t> </a:t>
-                      </a:r>
-                      <a:r>
-                        <a:rPr lang="it-IT" baseline="0" dirty="0" err="1" smtClean="0"/>
+                        <a:rPr lang="it-IT" dirty="0"/>
                         <a:t>Tsipas</a:t>
                       </a:r>
-                      <a:r>
-                        <a:rPr lang="it-IT" u="sng" baseline="0" dirty="0" err="1" smtClean="0"/>
-                        <a:t>s</a:t>
-                      </a:r>
-                      <a:endParaRPr lang="it-IT" dirty="0"/>
                     </a:p>
                   </a:txBody>
                   <a:tcPr/>
                 </a:tc>
                 <a:extLst>
                   <a:ext uri="{0D108BD9-81ED-4DB2-BD59-A6C34878D82A}">
-                    <a16:rowId xmlns="" xmlns:a16="http://schemas.microsoft.com/office/drawing/2014/main" val="3315426333"/>
+                    <a16:rowId xmlns:a16="http://schemas.microsoft.com/office/drawing/2014/main" val="3315426333"/>
                   </a:ext>
                 </a:extLst>
               </a:tr>
@@ -4075,7 +4054,7 @@
                 </a:tc>
                 <a:extLst>
                   <a:ext uri="{0D108BD9-81ED-4DB2-BD59-A6C34878D82A}">
-                    <a16:rowId xmlns="" xmlns:a16="http://schemas.microsoft.com/office/drawing/2014/main" val="833276135"/>
+                    <a16:rowId xmlns:a16="http://schemas.microsoft.com/office/drawing/2014/main" val="833276135"/>
                   </a:ext>
                 </a:extLst>
               </a:tr>
@@ -4108,7 +4087,7 @@
                 </a:tc>
                 <a:extLst>
                   <a:ext uri="{0D108BD9-81ED-4DB2-BD59-A6C34878D82A}">
-                    <a16:rowId xmlns="" xmlns:a16="http://schemas.microsoft.com/office/drawing/2014/main" val="1615278520"/>
+                    <a16:rowId xmlns:a16="http://schemas.microsoft.com/office/drawing/2014/main" val="1615278520"/>
                   </a:ext>
                 </a:extLst>
               </a:tr>
@@ -4121,7 +4100,7 @@
           <p:cNvPr id="7" name="Elemento grafico 6" descr="Informazioni">
             <a:extLst>
               <a:ext uri="{FF2B5EF4-FFF2-40B4-BE49-F238E27FC236}">
-                <a16:creationId xmlns="" xmlns:a16="http://schemas.microsoft.com/office/drawing/2014/main" id="{53D936C3-6DDC-4194-987E-7AE9EFD9723F}"/>
+                <a16:creationId xmlns:a16="http://schemas.microsoft.com/office/drawing/2014/main" id="{53D936C3-6DDC-4194-987E-7AE9EFD9723F}"/>
               </a:ext>
             </a:extLst>
           </p:cNvPr>
@@ -4137,7 +4116,7 @@
                 <a14:useLocalDpi xmlns:a14="http://schemas.microsoft.com/office/drawing/2010/main" val="0"/>
               </a:ext>
               <a:ext uri="{96DAC541-7B7A-43D3-8B79-37D633B846F1}">
-                <asvg:svgBlip xmlns="" xmlns:asvg="http://schemas.microsoft.com/office/drawing/2016/SVG/main" r:embed="rId3"/>
+                <asvg:svgBlip xmlns:asvg="http://schemas.microsoft.com/office/drawing/2016/SVG/main" r:embed="rId3"/>
               </a:ext>
             </a:extLst>
           </a:blip>
@@ -4165,13 +4144,6 @@
   <p:clrMapOvr>
     <a:masterClrMapping/>
   </p:clrMapOvr>
-  <p:timing>
-    <p:tnLst>
-      <p:par>
-        <p:cTn id="1" dur="indefinite" restart="never" nodeType="tmRoot"/>
-      </p:par>
-    </p:tnLst>
-  </p:timing>
 </p:sld>
 </file>
 
@@ -4197,7 +4169,7 @@
           <p:cNvPr id="2" name="Titolo 1">
             <a:extLst>
               <a:ext uri="{FF2B5EF4-FFF2-40B4-BE49-F238E27FC236}">
-                <a16:creationId xmlns="" xmlns:a16="http://schemas.microsoft.com/office/drawing/2014/main" id="{FF61BD71-50E0-44C1-A558-965A7ABC70AD}"/>
+                <a16:creationId xmlns:a16="http://schemas.microsoft.com/office/drawing/2014/main" id="{FF61BD71-50E0-44C1-A558-965A7ABC70AD}"/>
               </a:ext>
             </a:extLst>
           </p:cNvPr>
@@ -4225,7 +4197,7 @@
           <p:cNvPr id="4" name="Tabella 4">
             <a:extLst>
               <a:ext uri="{FF2B5EF4-FFF2-40B4-BE49-F238E27FC236}">
-                <a16:creationId xmlns="" xmlns:a16="http://schemas.microsoft.com/office/drawing/2014/main" id="{0BC89AA1-366F-4BE5-824E-0153DB6DF5C3}"/>
+                <a16:creationId xmlns:a16="http://schemas.microsoft.com/office/drawing/2014/main" id="{0BC89AA1-366F-4BE5-824E-0153DB6DF5C3}"/>
               </a:ext>
             </a:extLst>
           </p:cNvPr>
@@ -4236,7 +4208,7 @@
             <p:ph idx="1"/>
             <p:extLst>
               <p:ext uri="{D42A27DB-BD31-4B8C-83A1-F6EECF244321}">
-                <p14:modId xmlns:p14="http://schemas.microsoft.com/office/powerpoint/2010/main" val="2924286885"/>
+                <p14:modId xmlns:p14="http://schemas.microsoft.com/office/powerpoint/2010/main" val="2519837666"/>
               </p:ext>
             </p:extLst>
           </p:nvPr>
@@ -4255,14 +4227,14 @@
                 <a:gridCol w="2866053">
                   <a:extLst>
                     <a:ext uri="{9D8B030D-6E8A-4147-A177-3AD203B41FA5}">
-                      <a16:colId xmlns="" xmlns:a16="http://schemas.microsoft.com/office/drawing/2014/main" val="3900888184"/>
+                      <a16:colId xmlns:a16="http://schemas.microsoft.com/office/drawing/2014/main" val="3900888184"/>
                     </a:ext>
                   </a:extLst>
                 </a:gridCol>
                 <a:gridCol w="7649547">
                   <a:extLst>
                     <a:ext uri="{9D8B030D-6E8A-4147-A177-3AD203B41FA5}">
-                      <a16:colId xmlns="" xmlns:a16="http://schemas.microsoft.com/office/drawing/2014/main" val="2392364571"/>
+                      <a16:colId xmlns:a16="http://schemas.microsoft.com/office/drawing/2014/main" val="2392364571"/>
                     </a:ext>
                   </a:extLst>
                 </a:gridCol>
@@ -4309,7 +4281,7 @@
                 </a:tc>
                 <a:extLst>
                   <a:ext uri="{0D108BD9-81ED-4DB2-BD59-A6C34878D82A}">
-                    <a16:rowId xmlns="" xmlns:a16="http://schemas.microsoft.com/office/drawing/2014/main" val="2750207453"/>
+                    <a16:rowId xmlns:a16="http://schemas.microsoft.com/office/drawing/2014/main" val="2750207453"/>
                   </a:ext>
                 </a:extLst>
               </a:tr>
@@ -4334,7 +4306,7 @@
                     <a:p>
                       <a:r>
                         <a:rPr lang="it-IT" dirty="0"/>
-                        <a:t>Mensile</a:t>
+                        <a:t>Frequente</a:t>
                       </a:r>
                     </a:p>
                   </a:txBody>
@@ -4342,7 +4314,7 @@
                 </a:tc>
                 <a:extLst>
                   <a:ext uri="{0D108BD9-81ED-4DB2-BD59-A6C34878D82A}">
-                    <a16:rowId xmlns="" xmlns:a16="http://schemas.microsoft.com/office/drawing/2014/main" val="43365482"/>
+                    <a16:rowId xmlns:a16="http://schemas.microsoft.com/office/drawing/2014/main" val="43365482"/>
                   </a:ext>
                 </a:extLst>
               </a:tr>
@@ -4380,7 +4352,7 @@
                 </a:tc>
                 <a:extLst>
                   <a:ext uri="{0D108BD9-81ED-4DB2-BD59-A6C34878D82A}">
-                    <a16:rowId xmlns="" xmlns:a16="http://schemas.microsoft.com/office/drawing/2014/main" val="1813106428"/>
+                    <a16:rowId xmlns:a16="http://schemas.microsoft.com/office/drawing/2014/main" val="1813106428"/>
                   </a:ext>
                 </a:extLst>
               </a:tr>
@@ -4414,7 +4386,7 @@
                 </a:tc>
                 <a:extLst>
                   <a:ext uri="{0D108BD9-81ED-4DB2-BD59-A6C34878D82A}">
-                    <a16:rowId xmlns="" xmlns:a16="http://schemas.microsoft.com/office/drawing/2014/main" val="4265491522"/>
+                    <a16:rowId xmlns:a16="http://schemas.microsoft.com/office/drawing/2014/main" val="4265491522"/>
                   </a:ext>
                 </a:extLst>
               </a:tr>
@@ -4447,7 +4419,7 @@
                 </a:tc>
                 <a:extLst>
                   <a:ext uri="{0D108BD9-81ED-4DB2-BD59-A6C34878D82A}">
-                    <a16:rowId xmlns="" xmlns:a16="http://schemas.microsoft.com/office/drawing/2014/main" val="1759204447"/>
+                    <a16:rowId xmlns:a16="http://schemas.microsoft.com/office/drawing/2014/main" val="1759204447"/>
                   </a:ext>
                 </a:extLst>
               </a:tr>
@@ -4480,11 +4452,7 @@
                       </a:r>
                       <a:r>
                         <a:rPr lang="it-IT"/>
-                        <a:t>del </a:t>
-                      </a:r>
-                      <a:r>
-                        <a:rPr lang="it-IT" smtClean="0"/>
-                        <a:t>DB </a:t>
+                        <a:t>del DB </a:t>
                       </a:r>
                       <a:endParaRPr lang="it-IT" dirty="0"/>
                     </a:p>
@@ -4493,7 +4461,7 @@
                 </a:tc>
                 <a:extLst>
                   <a:ext uri="{0D108BD9-81ED-4DB2-BD59-A6C34878D82A}">
-                    <a16:rowId xmlns="" xmlns:a16="http://schemas.microsoft.com/office/drawing/2014/main" val="4176074482"/>
+                    <a16:rowId xmlns:a16="http://schemas.microsoft.com/office/drawing/2014/main" val="4176074482"/>
                   </a:ext>
                 </a:extLst>
               </a:tr>
@@ -4531,7 +4499,7 @@
                 </a:tc>
                 <a:extLst>
                   <a:ext uri="{0D108BD9-81ED-4DB2-BD59-A6C34878D82A}">
-                    <a16:rowId xmlns="" xmlns:a16="http://schemas.microsoft.com/office/drawing/2014/main" val="2176725863"/>
+                    <a16:rowId xmlns:a16="http://schemas.microsoft.com/office/drawing/2014/main" val="2176725863"/>
                   </a:ext>
                 </a:extLst>
               </a:tr>
@@ -4544,7 +4512,7 @@
           <p:cNvPr id="7" name="Elemento grafico 6" descr="Alta tensione">
             <a:extLst>
               <a:ext uri="{FF2B5EF4-FFF2-40B4-BE49-F238E27FC236}">
-                <a16:creationId xmlns="" xmlns:a16="http://schemas.microsoft.com/office/drawing/2014/main" id="{4BC6B4F9-BBF9-493A-8CEC-E6BC93390131}"/>
+                <a16:creationId xmlns:a16="http://schemas.microsoft.com/office/drawing/2014/main" id="{4BC6B4F9-BBF9-493A-8CEC-E6BC93390131}"/>
               </a:ext>
             </a:extLst>
           </p:cNvPr>
@@ -4560,7 +4528,7 @@
                 <a14:useLocalDpi xmlns:a14="http://schemas.microsoft.com/office/drawing/2010/main" val="0"/>
               </a:ext>
               <a:ext uri="{96DAC541-7B7A-43D3-8B79-37D633B846F1}">
-                <asvg:svgBlip xmlns="" xmlns:asvg="http://schemas.microsoft.com/office/drawing/2016/SVG/main" r:embed="rId3"/>
+                <asvg:svgBlip xmlns:asvg="http://schemas.microsoft.com/office/drawing/2016/SVG/main" r:embed="rId3"/>
               </a:ext>
             </a:extLst>
           </a:blip>
@@ -4613,7 +4581,7 @@
           <p:cNvPr id="2" name="Titolo 1">
             <a:extLst>
               <a:ext uri="{FF2B5EF4-FFF2-40B4-BE49-F238E27FC236}">
-                <a16:creationId xmlns="" xmlns:a16="http://schemas.microsoft.com/office/drawing/2014/main" id="{A8B055A1-B3E5-4E97-BAF3-4C33FEAE38D5}"/>
+                <a16:creationId xmlns:a16="http://schemas.microsoft.com/office/drawing/2014/main" id="{A8B055A1-B3E5-4E97-BAF3-4C33FEAE38D5}"/>
               </a:ext>
             </a:extLst>
           </p:cNvPr>
@@ -4647,7 +4615,7 @@
           <p:cNvPr id="4" name="Tabella 4">
             <a:extLst>
               <a:ext uri="{FF2B5EF4-FFF2-40B4-BE49-F238E27FC236}">
-                <a16:creationId xmlns="" xmlns:a16="http://schemas.microsoft.com/office/drawing/2014/main" id="{67C1CEAA-13A3-482D-AA09-BF3FC903FFE5}"/>
+                <a16:creationId xmlns:a16="http://schemas.microsoft.com/office/drawing/2014/main" id="{67C1CEAA-13A3-482D-AA09-BF3FC903FFE5}"/>
               </a:ext>
             </a:extLst>
           </p:cNvPr>
@@ -4658,7 +4626,7 @@
             <p:ph idx="1"/>
             <p:extLst>
               <p:ext uri="{D42A27DB-BD31-4B8C-83A1-F6EECF244321}">
-                <p14:modId xmlns:p14="http://schemas.microsoft.com/office/powerpoint/2010/main" val="1275767574"/>
+                <p14:modId xmlns:p14="http://schemas.microsoft.com/office/powerpoint/2010/main" val="262474154"/>
               </p:ext>
             </p:extLst>
           </p:nvPr>
@@ -4677,14 +4645,14 @@
                 <a:gridCol w="2688771">
                   <a:extLst>
                     <a:ext uri="{9D8B030D-6E8A-4147-A177-3AD203B41FA5}">
-                      <a16:colId xmlns="" xmlns:a16="http://schemas.microsoft.com/office/drawing/2014/main" val="634955233"/>
+                      <a16:colId xmlns:a16="http://schemas.microsoft.com/office/drawing/2014/main" val="634955233"/>
                     </a:ext>
                   </a:extLst>
                 </a:gridCol>
                 <a:gridCol w="7826829">
                   <a:extLst>
                     <a:ext uri="{9D8B030D-6E8A-4147-A177-3AD203B41FA5}">
-                      <a16:colId xmlns="" xmlns:a16="http://schemas.microsoft.com/office/drawing/2014/main" val="1784330953"/>
+                      <a16:colId xmlns:a16="http://schemas.microsoft.com/office/drawing/2014/main" val="1784330953"/>
                     </a:ext>
                   </a:extLst>
                 </a:gridCol>
@@ -4713,20 +4681,16 @@
                         <a:buAutoNum type="arabicPeriod"/>
                       </a:pPr>
                       <a:r>
-                        <a:rPr lang="it-IT" dirty="0" err="1" smtClean="0"/>
+                        <a:rPr lang="it-IT" dirty="0" err="1"/>
                         <a:t>Admin</a:t>
                       </a:r>
                       <a:r>
-                        <a:rPr lang="it-IT" baseline="0" dirty="0" smtClean="0"/>
+                        <a:rPr lang="it-IT" baseline="0" dirty="0"/>
                         <a:t> a</a:t>
                       </a:r>
                       <a:r>
-                        <a:rPr lang="it-IT" dirty="0" smtClean="0"/>
-                        <a:t>ccede </a:t>
-                      </a:r>
-                      <a:r>
                         <a:rPr lang="it-IT" dirty="0"/>
-                        <a:t>alla Web APP</a:t>
+                        <a:t>ccede alla Web APP</a:t>
                       </a:r>
                       <a:r>
                         <a:rPr lang="it-IT" baseline="0" dirty="0"/>
@@ -4739,10 +4703,9 @@
                         <a:buAutoNum type="arabicPeriod"/>
                       </a:pPr>
                       <a:r>
-                        <a:rPr lang="it-IT" baseline="0" dirty="0" smtClean="0"/>
+                        <a:rPr lang="it-IT" baseline="0" dirty="0"/>
                         <a:t>Ultimo aggiornamento del DB viene messo disponibile</a:t>
                       </a:r>
-                      <a:endParaRPr lang="it-IT" baseline="0" dirty="0"/>
                     </a:p>
                     <a:p>
                       <a:pPr marL="342900" indent="-342900">
@@ -4750,7 +4713,7 @@
                         <a:buAutoNum type="arabicPeriod"/>
                       </a:pPr>
                       <a:r>
-                        <a:rPr lang="it-IT" baseline="0" dirty="0" smtClean="0"/>
+                        <a:rPr lang="it-IT" baseline="0" dirty="0"/>
                         <a:t>Verifica caricamento flussi giornalieri</a:t>
                       </a:r>
                       <a:endParaRPr lang="it-IT" dirty="0"/>
@@ -4760,7 +4723,7 @@
                 </a:tc>
                 <a:extLst>
                   <a:ext uri="{0D108BD9-81ED-4DB2-BD59-A6C34878D82A}">
-                    <a16:rowId xmlns="" xmlns:a16="http://schemas.microsoft.com/office/drawing/2014/main" val="400559187"/>
+                    <a16:rowId xmlns:a16="http://schemas.microsoft.com/office/drawing/2014/main" val="400559187"/>
                   </a:ext>
                 </a:extLst>
               </a:tr>
@@ -4788,26 +4751,26 @@
                         <a:buAutoNum type="arabicPeriod"/>
                       </a:pPr>
                       <a:r>
-                        <a:rPr lang="it-IT" dirty="0" err="1" smtClean="0"/>
+                        <a:rPr lang="it-IT" dirty="0" err="1"/>
                         <a:t>Admin</a:t>
                       </a:r>
                       <a:r>
-                        <a:rPr lang="it-IT" baseline="0" dirty="0" smtClean="0"/>
+                        <a:rPr lang="it-IT" baseline="0" dirty="0"/>
                         <a:t> accede </a:t>
                       </a:r>
                       <a:r>
-                        <a:rPr lang="it-IT" baseline="0" dirty="0" err="1" smtClean="0"/>
+                        <a:rPr lang="it-IT" baseline="0" dirty="0" err="1"/>
                         <a:t>all</a:t>
                       </a:r>
                       <a:r>
-                        <a:rPr lang="it-IT" baseline="0" dirty="0" smtClean="0"/>
+                        <a:rPr lang="it-IT" baseline="0" dirty="0"/>
                         <a:t> Web </a:t>
                       </a:r>
                       <a:r>
-                        <a:rPr lang="it-IT" baseline="0" dirty="0" err="1" smtClean="0"/>
+                        <a:rPr lang="it-IT" baseline="0" dirty="0" err="1"/>
                         <a:t>App</a:t>
                       </a:r>
-                      <a:endParaRPr lang="it-IT" baseline="0" dirty="0" smtClean="0"/>
+                      <a:endParaRPr lang="it-IT" baseline="0" dirty="0"/>
                     </a:p>
                     <a:p>
                       <a:pPr marL="342900" marR="0" indent="-342900" algn="l" defTabSz="914400" rtl="0" eaLnBrk="1" fontAlgn="auto" latinLnBrk="0" hangingPunct="1">
@@ -4828,7 +4791,7 @@
                         <a:defRPr/>
                       </a:pPr>
                       <a:r>
-                        <a:rPr lang="it-IT" baseline="0" dirty="0" smtClean="0"/>
+                        <a:rPr lang="it-IT" baseline="0" dirty="0"/>
                         <a:t>Ultimo aggiornamento del DB viene messo disponibile</a:t>
                       </a:r>
                     </a:p>
@@ -4838,15 +4801,15 @@
                         <a:buAutoNum type="arabicPeriod"/>
                       </a:pPr>
                       <a:r>
-                        <a:rPr lang="it-IT" dirty="0" err="1" smtClean="0"/>
+                        <a:rPr lang="it-IT" dirty="0" err="1"/>
                         <a:t>Admin</a:t>
                       </a:r>
                       <a:r>
-                        <a:rPr lang="it-IT" dirty="0" smtClean="0"/>
+                        <a:rPr lang="it-IT" dirty="0"/>
                         <a:t> può</a:t>
                       </a:r>
                       <a:r>
-                        <a:rPr lang="it-IT" baseline="0" dirty="0" smtClean="0"/>
+                        <a:rPr lang="it-IT" baseline="0" dirty="0"/>
                         <a:t> abilitare-disabilitare i Utenti</a:t>
                       </a:r>
                       <a:endParaRPr lang="it-IT" dirty="0"/>
@@ -4856,7 +4819,7 @@
                 </a:tc>
                 <a:extLst>
                   <a:ext uri="{0D108BD9-81ED-4DB2-BD59-A6C34878D82A}">
-                    <a16:rowId xmlns="" xmlns:a16="http://schemas.microsoft.com/office/drawing/2014/main" val="286916072"/>
+                    <a16:rowId xmlns:a16="http://schemas.microsoft.com/office/drawing/2014/main" val="286916072"/>
                   </a:ext>
                 </a:extLst>
               </a:tr>
@@ -4868,14 +4831,10 @@
                     <a:p>
                       <a:r>
                         <a:rPr lang="it-IT" dirty="0"/>
-                        <a:t>Flusso </a:t>
-                      </a:r>
-                      <a:r>
-                        <a:rPr lang="it-IT" dirty="0" smtClean="0"/>
-                        <a:t>Alternativo</a:t>
-                      </a:r>
-                      <a:r>
-                        <a:rPr lang="it-IT" baseline="0" dirty="0" smtClean="0"/>
+                        <a:t>Flusso Alternativo</a:t>
+                      </a:r>
+                      <a:r>
+                        <a:rPr lang="it-IT" baseline="0" dirty="0"/>
                         <a:t> 2</a:t>
                       </a:r>
                       <a:endParaRPr lang="it-IT" dirty="0"/>
@@ -4906,26 +4865,26 @@
                         <a:defRPr/>
                       </a:pPr>
                       <a:r>
-                        <a:rPr lang="it-IT" dirty="0" err="1" smtClean="0"/>
+                        <a:rPr lang="it-IT" dirty="0" err="1"/>
                         <a:t>Admin</a:t>
                       </a:r>
                       <a:r>
-                        <a:rPr lang="it-IT" baseline="0" dirty="0" smtClean="0"/>
+                        <a:rPr lang="it-IT" baseline="0" dirty="0"/>
                         <a:t> accede </a:t>
                       </a:r>
                       <a:r>
-                        <a:rPr lang="it-IT" baseline="0" dirty="0" err="1" smtClean="0"/>
+                        <a:rPr lang="it-IT" baseline="0" dirty="0" err="1"/>
                         <a:t>all</a:t>
                       </a:r>
                       <a:r>
-                        <a:rPr lang="it-IT" baseline="0" dirty="0" smtClean="0"/>
+                        <a:rPr lang="it-IT" baseline="0" dirty="0"/>
                         <a:t> Web </a:t>
                       </a:r>
                       <a:r>
-                        <a:rPr lang="it-IT" baseline="0" dirty="0" err="1" smtClean="0"/>
+                        <a:rPr lang="it-IT" baseline="0" dirty="0" err="1"/>
                         <a:t>App</a:t>
                       </a:r>
-                      <a:endParaRPr lang="it-IT" baseline="0" dirty="0" smtClean="0"/>
+                      <a:endParaRPr lang="it-IT" baseline="0" dirty="0"/>
                     </a:p>
                     <a:p>
                       <a:pPr marL="342900" marR="0" indent="-342900" algn="l" defTabSz="914400" rtl="0" eaLnBrk="1" fontAlgn="auto" latinLnBrk="0" hangingPunct="1">
@@ -4946,7 +4905,7 @@
                         <a:defRPr/>
                       </a:pPr>
                       <a:r>
-                        <a:rPr lang="it-IT" baseline="0" dirty="0" smtClean="0"/>
+                        <a:rPr lang="it-IT" baseline="0" dirty="0"/>
                         <a:t>Ultimo aggiornamento del DB viene messo disponibile</a:t>
                       </a:r>
                     </a:p>
@@ -4956,15 +4915,15 @@
                         <a:buAutoNum type="arabicPeriod"/>
                       </a:pPr>
                       <a:r>
-                        <a:rPr lang="it-IT" dirty="0" err="1" smtClean="0"/>
+                        <a:rPr lang="it-IT" dirty="0" err="1"/>
                         <a:t>Admin</a:t>
                       </a:r>
                       <a:r>
-                        <a:rPr lang="it-IT" dirty="0" smtClean="0"/>
+                        <a:rPr lang="it-IT" dirty="0"/>
                         <a:t> può</a:t>
                       </a:r>
                       <a:r>
-                        <a:rPr lang="it-IT" baseline="0" dirty="0" smtClean="0"/>
+                        <a:rPr lang="it-IT" baseline="0" dirty="0"/>
                         <a:t> moderare  le valutazioni gocce</a:t>
                       </a:r>
                       <a:endParaRPr lang="it-IT" dirty="0"/>
@@ -4974,7 +4933,7 @@
                 </a:tc>
                 <a:extLst>
                   <a:ext uri="{0D108BD9-81ED-4DB2-BD59-A6C34878D82A}">
-                    <a16:rowId xmlns="" xmlns:a16="http://schemas.microsoft.com/office/drawing/2014/main" val="1276537878"/>
+                    <a16:rowId xmlns:a16="http://schemas.microsoft.com/office/drawing/2014/main" val="1276537878"/>
                   </a:ext>
                 </a:extLst>
               </a:tr>
@@ -4985,7 +4944,7 @@
                     <a:lstStyle/>
                     <a:p>
                       <a:r>
-                        <a:rPr lang="it-IT" dirty="0" smtClean="0"/>
+                        <a:rPr lang="it-IT" dirty="0"/>
                         <a:t>Flusso Alternativo 3</a:t>
                       </a:r>
                     </a:p>
@@ -5018,26 +4977,26 @@
                         <a:defRPr/>
                       </a:pPr>
                       <a:r>
-                        <a:rPr lang="it-IT" dirty="0" err="1" smtClean="0"/>
+                        <a:rPr lang="it-IT" dirty="0" err="1"/>
                         <a:t>Admin</a:t>
                       </a:r>
                       <a:r>
-                        <a:rPr lang="it-IT" baseline="0" dirty="0" smtClean="0"/>
+                        <a:rPr lang="it-IT" baseline="0" dirty="0"/>
                         <a:t> accede </a:t>
                       </a:r>
                       <a:r>
-                        <a:rPr lang="it-IT" baseline="0" dirty="0" err="1" smtClean="0"/>
+                        <a:rPr lang="it-IT" baseline="0" dirty="0" err="1"/>
                         <a:t>all</a:t>
                       </a:r>
                       <a:r>
-                        <a:rPr lang="it-IT" baseline="0" dirty="0" smtClean="0"/>
+                        <a:rPr lang="it-IT" baseline="0" dirty="0"/>
                         <a:t> Web </a:t>
                       </a:r>
                       <a:r>
-                        <a:rPr lang="it-IT" baseline="0" dirty="0" err="1" smtClean="0"/>
+                        <a:rPr lang="it-IT" baseline="0" dirty="0" err="1"/>
                         <a:t>App</a:t>
                       </a:r>
-                      <a:endParaRPr lang="it-IT" baseline="0" dirty="0" smtClean="0"/>
+                      <a:endParaRPr lang="it-IT" baseline="0" dirty="0"/>
                     </a:p>
                     <a:p>
                       <a:pPr marL="342900" marR="0" indent="-342900" algn="l" defTabSz="914400" rtl="0" eaLnBrk="1" fontAlgn="auto" latinLnBrk="0" hangingPunct="1">
@@ -5058,7 +5017,7 @@
                         <a:defRPr/>
                       </a:pPr>
                       <a:r>
-                        <a:rPr lang="it-IT" baseline="0" dirty="0" smtClean="0"/>
+                        <a:rPr lang="it-IT" baseline="0" dirty="0"/>
                         <a:t>Ultimo aggiornamento del DB viene messo disponibile</a:t>
                       </a:r>
                     </a:p>
@@ -5068,26 +5027,18 @@
                         <a:buAutoNum type="arabicPeriod"/>
                       </a:pPr>
                       <a:r>
-                        <a:rPr lang="it-IT" dirty="0" err="1" smtClean="0"/>
-                        <a:t>Admin</a:t>
-                      </a:r>
-                      <a:r>
-                        <a:rPr lang="it-IT" dirty="0" smtClean="0"/>
-                        <a:t> </a:t>
-                      </a:r>
-                      <a:r>
-                        <a:rPr lang="it-IT" dirty="0" err="1" smtClean="0"/>
-                        <a:t>amminisra</a:t>
-                      </a:r>
-                      <a:r>
-                        <a:rPr lang="it-IT" dirty="0" smtClean="0"/>
-                        <a:t> la sezione News</a:t>
-                      </a:r>
-                      <a:endParaRPr lang="it-IT" dirty="0"/>
+                        <a:rPr lang="it-IT" dirty="0"/>
+                        <a:t>Admin amministra la sezione News</a:t>
+                      </a:r>
                     </a:p>
                   </a:txBody>
                   <a:tcPr/>
                 </a:tc>
+                <a:extLst>
+                  <a:ext uri="{0D108BD9-81ED-4DB2-BD59-A6C34878D82A}">
+                    <a16:rowId xmlns:a16="http://schemas.microsoft.com/office/drawing/2014/main" val="10003"/>
+                  </a:ext>
+                </a:extLst>
               </a:tr>
             </a:tbl>
           </a:graphicData>
@@ -5098,7 +5049,7 @@
           <p:cNvPr id="8" name="Elemento grafico 7" descr="Flusso di lavoro">
             <a:extLst>
               <a:ext uri="{FF2B5EF4-FFF2-40B4-BE49-F238E27FC236}">
-                <a16:creationId xmlns="" xmlns:a16="http://schemas.microsoft.com/office/drawing/2014/main" id="{A495AF70-8473-45AA-80C8-B98D01FB12D2}"/>
+                <a16:creationId xmlns:a16="http://schemas.microsoft.com/office/drawing/2014/main" id="{A495AF70-8473-45AA-80C8-B98D01FB12D2}"/>
               </a:ext>
             </a:extLst>
           </p:cNvPr>
@@ -5114,7 +5065,7 @@
                 <a14:useLocalDpi xmlns:a14="http://schemas.microsoft.com/office/drawing/2010/main" val="0"/>
               </a:ext>
               <a:ext uri="{96DAC541-7B7A-43D3-8B79-37D633B846F1}">
-                <asvg:svgBlip xmlns="" xmlns:asvg="http://schemas.microsoft.com/office/drawing/2016/SVG/main" r:embed="rId3"/>
+                <asvg:svgBlip xmlns:asvg="http://schemas.microsoft.com/office/drawing/2016/SVG/main" r:embed="rId3"/>
               </a:ext>
             </a:extLst>
           </a:blip>
@@ -5142,13 +5093,6 @@
   <p:clrMapOvr>
     <a:masterClrMapping/>
   </p:clrMapOvr>
-  <p:timing>
-    <p:tnLst>
-      <p:par>
-        <p:cTn id="1" dur="indefinite" restart="never" nodeType="tmRoot"/>
-      </p:par>
-    </p:tnLst>
-  </p:timing>
 </p:sld>
 </file>
 
@@ -5441,7 +5385,7 @@
   <a:extraClrSchemeLst/>
   <a:extLst>
     <a:ext uri="{05A4C25C-085E-4340-85A3-A5531E510DB2}">
-      <thm15:themeFamily xmlns="" xmlns:thm15="http://schemas.microsoft.com/office/thememl/2012/main" name="Office Theme" id="{62F939B6-93AF-4DB8-9C6B-D6C7DFDC589F}" vid="{4A3C46E8-61CC-4603-A589-7422A47A8E4A}"/>
+      <thm15:themeFamily xmlns:thm15="http://schemas.microsoft.com/office/thememl/2012/main" name="Office Theme" id="{62F939B6-93AF-4DB8-9C6B-D6C7DFDC589F}" vid="{4A3C46E8-61CC-4603-A589-7422A47A8E4A}"/>
     </a:ext>
   </a:extLst>
 </a:theme>

</xml_diff>

<commit_message>
Aggiunte news e statistiche a IdeaApp_2.bmpr e verificate use case definition
</commit_message>
<xml_diff>
--- a/docs/analisi/Template use case/Template Use Case - Gestione DB.pptx
+++ b/docs/analisi/Template use case/Template Use Case - Gestione DB.pptx
@@ -427,7 +427,7 @@
           <a:p>
             <a:fld id="{F7D71F90-2C6D-44F6-A1F9-0B80B911F8CA}" type="datetimeFigureOut">
               <a:rPr lang="it-IT" smtClean="0"/>
-              <a:t>19/12/2019</a:t>
+              <a:t>02/01/2020</a:t>
             </a:fld>
             <a:endParaRPr lang="it-IT"/>
           </a:p>
@@ -481,7 +481,7 @@
           <a:p>
             <a:fld id="{055FF49E-80C9-43E6-9ECC-5DC75BE05600}" type="slidenum">
               <a:rPr lang="it-IT" smtClean="0"/>
-              <a:t>‹#›</a:t>
+              <a:t>‹N›</a:t>
             </a:fld>
             <a:endParaRPr lang="it-IT"/>
           </a:p>
@@ -625,7 +625,7 @@
           <a:p>
             <a:fld id="{F7D71F90-2C6D-44F6-A1F9-0B80B911F8CA}" type="datetimeFigureOut">
               <a:rPr lang="it-IT" smtClean="0"/>
-              <a:t>19/12/2019</a:t>
+              <a:t>02/01/2020</a:t>
             </a:fld>
             <a:endParaRPr lang="it-IT"/>
           </a:p>
@@ -679,7 +679,7 @@
           <a:p>
             <a:fld id="{055FF49E-80C9-43E6-9ECC-5DC75BE05600}" type="slidenum">
               <a:rPr lang="it-IT" smtClean="0"/>
-              <a:t>‹#›</a:t>
+              <a:t>‹N›</a:t>
             </a:fld>
             <a:endParaRPr lang="it-IT"/>
           </a:p>
@@ -833,7 +833,7 @@
           <a:p>
             <a:fld id="{F7D71F90-2C6D-44F6-A1F9-0B80B911F8CA}" type="datetimeFigureOut">
               <a:rPr lang="it-IT" smtClean="0"/>
-              <a:t>19/12/2019</a:t>
+              <a:t>02/01/2020</a:t>
             </a:fld>
             <a:endParaRPr lang="it-IT"/>
           </a:p>
@@ -887,7 +887,7 @@
           <a:p>
             <a:fld id="{055FF49E-80C9-43E6-9ECC-5DC75BE05600}" type="slidenum">
               <a:rPr lang="it-IT" smtClean="0"/>
-              <a:t>‹#›</a:t>
+              <a:t>‹N›</a:t>
             </a:fld>
             <a:endParaRPr lang="it-IT"/>
           </a:p>
@@ -1031,7 +1031,7 @@
           <a:p>
             <a:fld id="{F7D71F90-2C6D-44F6-A1F9-0B80B911F8CA}" type="datetimeFigureOut">
               <a:rPr lang="it-IT" smtClean="0"/>
-              <a:t>19/12/2019</a:t>
+              <a:t>02/01/2020</a:t>
             </a:fld>
             <a:endParaRPr lang="it-IT"/>
           </a:p>
@@ -1085,7 +1085,7 @@
           <a:p>
             <a:fld id="{055FF49E-80C9-43E6-9ECC-5DC75BE05600}" type="slidenum">
               <a:rPr lang="it-IT" smtClean="0"/>
-              <a:t>‹#›</a:t>
+              <a:t>‹N›</a:t>
             </a:fld>
             <a:endParaRPr lang="it-IT"/>
           </a:p>
@@ -1306,7 +1306,7 @@
           <a:p>
             <a:fld id="{F7D71F90-2C6D-44F6-A1F9-0B80B911F8CA}" type="datetimeFigureOut">
               <a:rPr lang="it-IT" smtClean="0"/>
-              <a:t>19/12/2019</a:t>
+              <a:t>02/01/2020</a:t>
             </a:fld>
             <a:endParaRPr lang="it-IT"/>
           </a:p>
@@ -1360,7 +1360,7 @@
           <a:p>
             <a:fld id="{055FF49E-80C9-43E6-9ECC-5DC75BE05600}" type="slidenum">
               <a:rPr lang="it-IT" smtClean="0"/>
-              <a:t>‹#›</a:t>
+              <a:t>‹N›</a:t>
             </a:fld>
             <a:endParaRPr lang="it-IT"/>
           </a:p>
@@ -1571,7 +1571,7 @@
           <a:p>
             <a:fld id="{F7D71F90-2C6D-44F6-A1F9-0B80B911F8CA}" type="datetimeFigureOut">
               <a:rPr lang="it-IT" smtClean="0"/>
-              <a:t>19/12/2019</a:t>
+              <a:t>02/01/2020</a:t>
             </a:fld>
             <a:endParaRPr lang="it-IT"/>
           </a:p>
@@ -1625,7 +1625,7 @@
           <a:p>
             <a:fld id="{055FF49E-80C9-43E6-9ECC-5DC75BE05600}" type="slidenum">
               <a:rPr lang="it-IT" smtClean="0"/>
-              <a:t>‹#›</a:t>
+              <a:t>‹N›</a:t>
             </a:fld>
             <a:endParaRPr lang="it-IT"/>
           </a:p>
@@ -1983,7 +1983,7 @@
           <a:p>
             <a:fld id="{F7D71F90-2C6D-44F6-A1F9-0B80B911F8CA}" type="datetimeFigureOut">
               <a:rPr lang="it-IT" smtClean="0"/>
-              <a:t>19/12/2019</a:t>
+              <a:t>02/01/2020</a:t>
             </a:fld>
             <a:endParaRPr lang="it-IT"/>
           </a:p>
@@ -2037,7 +2037,7 @@
           <a:p>
             <a:fld id="{055FF49E-80C9-43E6-9ECC-5DC75BE05600}" type="slidenum">
               <a:rPr lang="it-IT" smtClean="0"/>
-              <a:t>‹#›</a:t>
+              <a:t>‹N›</a:t>
             </a:fld>
             <a:endParaRPr lang="it-IT"/>
           </a:p>
@@ -2124,7 +2124,7 @@
           <a:p>
             <a:fld id="{F7D71F90-2C6D-44F6-A1F9-0B80B911F8CA}" type="datetimeFigureOut">
               <a:rPr lang="it-IT" smtClean="0"/>
-              <a:t>19/12/2019</a:t>
+              <a:t>02/01/2020</a:t>
             </a:fld>
             <a:endParaRPr lang="it-IT"/>
           </a:p>
@@ -2178,7 +2178,7 @@
           <a:p>
             <a:fld id="{055FF49E-80C9-43E6-9ECC-5DC75BE05600}" type="slidenum">
               <a:rPr lang="it-IT" smtClean="0"/>
-              <a:t>‹#›</a:t>
+              <a:t>‹N›</a:t>
             </a:fld>
             <a:endParaRPr lang="it-IT"/>
           </a:p>
@@ -2237,7 +2237,7 @@
           <a:p>
             <a:fld id="{F7D71F90-2C6D-44F6-A1F9-0B80B911F8CA}" type="datetimeFigureOut">
               <a:rPr lang="it-IT" smtClean="0"/>
-              <a:t>19/12/2019</a:t>
+              <a:t>02/01/2020</a:t>
             </a:fld>
             <a:endParaRPr lang="it-IT"/>
           </a:p>
@@ -2291,7 +2291,7 @@
           <a:p>
             <a:fld id="{055FF49E-80C9-43E6-9ECC-5DC75BE05600}" type="slidenum">
               <a:rPr lang="it-IT" smtClean="0"/>
-              <a:t>‹#›</a:t>
+              <a:t>‹N›</a:t>
             </a:fld>
             <a:endParaRPr lang="it-IT"/>
           </a:p>
@@ -2548,7 +2548,7 @@
           <a:p>
             <a:fld id="{F7D71F90-2C6D-44F6-A1F9-0B80B911F8CA}" type="datetimeFigureOut">
               <a:rPr lang="it-IT" smtClean="0"/>
-              <a:t>19/12/2019</a:t>
+              <a:t>02/01/2020</a:t>
             </a:fld>
             <a:endParaRPr lang="it-IT"/>
           </a:p>
@@ -2602,7 +2602,7 @@
           <a:p>
             <a:fld id="{055FF49E-80C9-43E6-9ECC-5DC75BE05600}" type="slidenum">
               <a:rPr lang="it-IT" smtClean="0"/>
-              <a:t>‹#›</a:t>
+              <a:t>‹N›</a:t>
             </a:fld>
             <a:endParaRPr lang="it-IT"/>
           </a:p>
@@ -2836,7 +2836,7 @@
           <a:p>
             <a:fld id="{F7D71F90-2C6D-44F6-A1F9-0B80B911F8CA}" type="datetimeFigureOut">
               <a:rPr lang="it-IT" smtClean="0"/>
-              <a:t>19/12/2019</a:t>
+              <a:t>02/01/2020</a:t>
             </a:fld>
             <a:endParaRPr lang="it-IT"/>
           </a:p>
@@ -2890,7 +2890,7 @@
           <a:p>
             <a:fld id="{055FF49E-80C9-43E6-9ECC-5DC75BE05600}" type="slidenum">
               <a:rPr lang="it-IT" smtClean="0"/>
-              <a:t>‹#›</a:t>
+              <a:t>‹N›</a:t>
             </a:fld>
             <a:endParaRPr lang="it-IT"/>
           </a:p>
@@ -3077,7 +3077,7 @@
           <a:p>
             <a:fld id="{F7D71F90-2C6D-44F6-A1F9-0B80B911F8CA}" type="datetimeFigureOut">
               <a:rPr lang="it-IT" smtClean="0"/>
-              <a:t>19/12/2019</a:t>
+              <a:t>02/01/2020</a:t>
             </a:fld>
             <a:endParaRPr lang="it-IT"/>
           </a:p>
@@ -3167,7 +3167,7 @@
           <a:p>
             <a:fld id="{055FF49E-80C9-43E6-9ECC-5DC75BE05600}" type="slidenum">
               <a:rPr lang="it-IT" smtClean="0"/>
-              <a:t>‹#›</a:t>
+              <a:t>‹N›</a:t>
             </a:fld>
             <a:endParaRPr lang="it-IT"/>
           </a:p>
@@ -3504,10 +3504,10 @@
       </p:grpSpPr>
       <p:sp>
         <p:nvSpPr>
-          <p:cNvPr id="8" name="Rectangle 7">
-            <a:extLst>
-              <a:ext uri="{FF2B5EF4-FFF2-40B4-BE49-F238E27FC236}">
-                <a16:creationId xmlns:a16="http://schemas.microsoft.com/office/drawing/2014/main" id="{23962611-DFD5-4092-AAFD-559E3DFCE2C9}"/>
+          <p:cNvPr id="17" name="Rectangle 16">
+            <a:extLst>
+              <a:ext uri="{FF2B5EF4-FFF2-40B4-BE49-F238E27FC236}">
+                <a16:creationId xmlns:a16="http://schemas.microsoft.com/office/drawing/2014/main" id="{CDA1A2E9-63FE-408D-A803-8E306ECAB4B3}"/>
               </a:ext>
               <a:ext uri="{C183D7F6-B498-43B3-948B-1728B52AA6E4}">
                 <adec:decorative xmlns:adec="http://schemas.microsoft.com/office/drawing/2017/decorative" val="1"/>
@@ -3527,38 +3527,16 @@
         </p:nvSpPr>
         <p:spPr>
           <a:xfrm>
-            <a:off x="475488" y="0"/>
-            <a:ext cx="10910292" cy="6858000"/>
+            <a:off x="462058" y="450221"/>
+            <a:ext cx="8997696" cy="3918123"/>
           </a:xfrm>
           <a:prstGeom prst="rect">
             <a:avLst/>
           </a:prstGeom>
-          <a:gradFill>
-            <a:gsLst>
-              <a:gs pos="0">
-                <a:schemeClr val="accent1">
-                  <a:lumMod val="90000"/>
-                </a:schemeClr>
-              </a:gs>
-              <a:gs pos="25000">
-                <a:schemeClr val="accent1">
-                  <a:lumMod val="90000"/>
-                </a:schemeClr>
-              </a:gs>
-              <a:gs pos="94000">
-                <a:schemeClr val="bg2">
-                  <a:lumMod val="25000"/>
-                </a:schemeClr>
-              </a:gs>
-              <a:gs pos="100000">
-                <a:schemeClr val="bg2">
-                  <a:lumMod val="25000"/>
-                </a:schemeClr>
-              </a:gs>
-            </a:gsLst>
-            <a:lin ang="4200000" scaled="0"/>
-          </a:gradFill>
-          <a:ln>
+          <a:solidFill>
+            <a:srgbClr val="595959"/>
+          </a:solidFill>
+          <a:ln w="25400">
             <a:noFill/>
           </a:ln>
         </p:spPr>
@@ -3582,26 +3560,95 @@
           <a:bodyPr rtlCol="0" anchor="ctr"/>
           <a:lstStyle/>
           <a:p>
-            <a:pPr algn="ctr"/>
-            <a:endParaRPr lang="en-US"/>
-          </a:p>
-        </p:txBody>
-      </p:sp>
-      <p:pic>
-        <p:nvPicPr>
-          <p:cNvPr id="10" name="Picture 9">
-            <a:extLst>
-              <a:ext uri="{FF2B5EF4-FFF2-40B4-BE49-F238E27FC236}">
-                <a16:creationId xmlns:a16="http://schemas.microsoft.com/office/drawing/2014/main" id="{2270F1FA-0425-408F-9861-80BF5AFB276D}"/>
+            <a:pPr marL="0" marR="0" lvl="0" indent="0" algn="ctr" defTabSz="914400" rtl="0" eaLnBrk="1" fontAlgn="auto" latinLnBrk="0" hangingPunct="1">
+              <a:lnSpc>
+                <a:spcPct val="100000"/>
+              </a:lnSpc>
+              <a:spcBef>
+                <a:spcPts val="0"/>
+              </a:spcBef>
+              <a:spcAft>
+                <a:spcPts val="0"/>
+              </a:spcAft>
+              <a:buClrTx/>
+              <a:buSzTx/>
+              <a:buFontTx/>
+              <a:buNone/>
+              <a:tabLst/>
+              <a:defRPr/>
+            </a:pPr>
+            <a:endParaRPr kumimoji="0" lang="en-US" sz="1800" b="0" i="0" u="none" strike="noStrike" kern="1200" cap="none" spc="0" normalizeH="0" baseline="0" noProof="0">
+              <a:ln>
+                <a:noFill/>
+              </a:ln>
+              <a:solidFill>
+                <a:srgbClr val="404040"/>
+              </a:solidFill>
+              <a:effectLst/>
+              <a:uLnTx/>
+              <a:uFillTx/>
+              <a:latin typeface="Calibri" panose="020F0502020204030204"/>
+              <a:ea typeface="+mn-ea"/>
+              <a:cs typeface="+mn-cs"/>
+            </a:endParaRPr>
+          </a:p>
+        </p:txBody>
+      </p:sp>
+      <p:sp>
+        <p:nvSpPr>
+          <p:cNvPr id="2" name="Titolo 1">
+            <a:extLst>
+              <a:ext uri="{FF2B5EF4-FFF2-40B4-BE49-F238E27FC236}">
+                <a16:creationId xmlns:a16="http://schemas.microsoft.com/office/drawing/2014/main" id="{DCBAC149-DB9F-4874-BC24-7F077AA4B78D}"/>
+              </a:ext>
+            </a:extLst>
+          </p:cNvPr>
+          <p:cNvSpPr>
+            <a:spLocks noGrp="1"/>
+          </p:cNvSpPr>
+          <p:nvPr>
+            <p:ph type="ctrTitle"/>
+          </p:nvPr>
+        </p:nvSpPr>
+        <p:spPr>
+          <a:xfrm>
+            <a:off x="1100669" y="1111086"/>
+            <a:ext cx="7690104" cy="2623885"/>
+          </a:xfrm>
+        </p:spPr>
+        <p:txBody>
+          <a:bodyPr anchor="ctr">
+            <a:normAutofit/>
+          </a:bodyPr>
+          <a:lstStyle/>
+          <a:p>
+            <a:pPr algn="l"/>
+            <a:r>
+              <a:rPr lang="it-IT" sz="6600">
+                <a:solidFill>
+                  <a:srgbClr val="FFFFFF"/>
+                </a:solidFill>
+              </a:rPr>
+              <a:t>Gestione DB</a:t>
+            </a:r>
+          </a:p>
+        </p:txBody>
+      </p:sp>
+      <p:sp>
+        <p:nvSpPr>
+          <p:cNvPr id="19" name="Rectangle 18">
+            <a:extLst>
+              <a:ext uri="{FF2B5EF4-FFF2-40B4-BE49-F238E27FC236}">
+                <a16:creationId xmlns:a16="http://schemas.microsoft.com/office/drawing/2014/main" id="{927CAFC9-A675-4314-84EF-236FFA58A3F2}"/>
               </a:ext>
               <a:ext uri="{C183D7F6-B498-43B3-948B-1728B52AA6E4}">
                 <adec:decorative xmlns:adec="http://schemas.microsoft.com/office/drawing/2017/decorative" val="1"/>
               </a:ext>
             </a:extLst>
           </p:cNvPr>
-          <p:cNvPicPr>
-            <a:picLocks noGrp="1" noRot="1" noChangeAspect="1" noMove="1" noResize="1" noEditPoints="1" noAdjustHandles="1" noChangeArrowheads="1" noChangeShapeType="1" noCrop="1"/>
-          </p:cNvPicPr>
+          <p:cNvSpPr>
+            <a:spLocks noGrp="1" noRot="1" noChangeAspect="1" noMove="1" noResize="1" noEditPoints="1" noAdjustHandles="1" noChangeArrowheads="1" noChangeShapeType="1" noTextEdit="1"/>
+          </p:cNvSpPr>
           <p:nvPr>
             <p:extLst>
               <p:ext uri="{386F3935-93C4-4BCD-93E2-E3B085C9AB24}">
@@ -3609,12 +3656,328 @@
               </p:ext>
             </p:extLst>
           </p:nvPr>
+        </p:nvSpPr>
+        <p:spPr>
+          <a:xfrm>
+            <a:off x="9619345" y="2490532"/>
+            <a:ext cx="2110597" cy="1877811"/>
+          </a:xfrm>
+          <a:prstGeom prst="rect">
+            <a:avLst/>
+          </a:prstGeom>
+          <a:solidFill>
+            <a:srgbClr val="7F7F7F">
+              <a:alpha val="20000"/>
+            </a:srgbClr>
+          </a:solidFill>
+          <a:ln w="25400">
+            <a:noFill/>
+          </a:ln>
+        </p:spPr>
+        <p:style>
+          <a:lnRef idx="2">
+            <a:schemeClr val="accent1">
+              <a:shade val="50000"/>
+            </a:schemeClr>
+          </a:lnRef>
+          <a:fillRef idx="1">
+            <a:schemeClr val="accent1"/>
+          </a:fillRef>
+          <a:effectRef idx="0">
+            <a:schemeClr val="accent1"/>
+          </a:effectRef>
+          <a:fontRef idx="minor">
+            <a:schemeClr val="lt1"/>
+          </a:fontRef>
+        </p:style>
+        <p:txBody>
+          <a:bodyPr rtlCol="0" anchor="ctr"/>
+          <a:lstStyle/>
+          <a:p>
+            <a:pPr marL="0" marR="0" lvl="0" indent="0" algn="ctr" defTabSz="914400" rtl="0" eaLnBrk="1" fontAlgn="auto" latinLnBrk="0" hangingPunct="1">
+              <a:lnSpc>
+                <a:spcPct val="100000"/>
+              </a:lnSpc>
+              <a:spcBef>
+                <a:spcPts val="0"/>
+              </a:spcBef>
+              <a:spcAft>
+                <a:spcPts val="0"/>
+              </a:spcAft>
+              <a:buClrTx/>
+              <a:buSzTx/>
+              <a:buFontTx/>
+              <a:buNone/>
+              <a:tabLst/>
+              <a:defRPr/>
+            </a:pPr>
+            <a:endParaRPr kumimoji="0" lang="en-US" sz="1800" b="0" i="0" u="none" strike="noStrike" kern="1200" cap="none" spc="0" normalizeH="0" baseline="0" noProof="0">
+              <a:ln>
+                <a:noFill/>
+              </a:ln>
+              <a:solidFill>
+                <a:srgbClr val="FFFFFF"/>
+              </a:solidFill>
+              <a:effectLst/>
+              <a:uLnTx/>
+              <a:uFillTx/>
+              <a:latin typeface="Calibri" panose="020F0502020204030204"/>
+              <a:ea typeface="+mn-ea"/>
+              <a:cs typeface="+mn-cs"/>
+            </a:endParaRPr>
+          </a:p>
+        </p:txBody>
+      </p:sp>
+      <p:sp>
+        <p:nvSpPr>
+          <p:cNvPr id="21" name="Rectangle 20">
+            <a:extLst>
+              <a:ext uri="{FF2B5EF4-FFF2-40B4-BE49-F238E27FC236}">
+                <a16:creationId xmlns:a16="http://schemas.microsoft.com/office/drawing/2014/main" id="{FBE9F90C-C163-435B-9A68-D15C92D1CF2B}"/>
+              </a:ext>
+              <a:ext uri="{C183D7F6-B498-43B3-948B-1728B52AA6E4}">
+                <adec:decorative xmlns:adec="http://schemas.microsoft.com/office/drawing/2017/decorative" val="1"/>
+              </a:ext>
+            </a:extLst>
+          </p:cNvPr>
+          <p:cNvSpPr>
+            <a:spLocks noGrp="1" noRot="1" noChangeAspect="1" noMove="1" noResize="1" noEditPoints="1" noAdjustHandles="1" noChangeArrowheads="1" noChangeShapeType="1" noTextEdit="1"/>
+          </p:cNvSpPr>
+          <p:nvPr>
+            <p:extLst>
+              <p:ext uri="{386F3935-93C4-4BCD-93E2-E3B085C9AB24}">
+                <p16:designElem xmlns:p16="http://schemas.microsoft.com/office/powerpoint/2015/main" val="1"/>
+              </p:ext>
+            </p:extLst>
+          </p:nvPr>
+        </p:nvSpPr>
+        <p:spPr>
+          <a:xfrm>
+            <a:off x="457200" y="4521269"/>
+            <a:ext cx="11277600" cy="1877811"/>
+          </a:xfrm>
+          <a:prstGeom prst="rect">
+            <a:avLst/>
+          </a:prstGeom>
+          <a:solidFill>
+            <a:srgbClr val="7F7F7F">
+              <a:alpha val="20000"/>
+            </a:srgbClr>
+          </a:solidFill>
+          <a:ln w="25400">
+            <a:noFill/>
+          </a:ln>
+        </p:spPr>
+        <p:style>
+          <a:lnRef idx="2">
+            <a:schemeClr val="accent1">
+              <a:shade val="50000"/>
+            </a:schemeClr>
+          </a:lnRef>
+          <a:fillRef idx="1">
+            <a:schemeClr val="accent1"/>
+          </a:fillRef>
+          <a:effectRef idx="0">
+            <a:schemeClr val="accent1"/>
+          </a:effectRef>
+          <a:fontRef idx="minor">
+            <a:schemeClr val="lt1"/>
+          </a:fontRef>
+        </p:style>
+        <p:txBody>
+          <a:bodyPr rtlCol="0" anchor="ctr"/>
+          <a:lstStyle/>
+          <a:p>
+            <a:pPr marL="0" marR="0" lvl="0" indent="0" algn="ctr" defTabSz="914400" rtl="0" eaLnBrk="1" fontAlgn="auto" latinLnBrk="0" hangingPunct="1">
+              <a:lnSpc>
+                <a:spcPct val="100000"/>
+              </a:lnSpc>
+              <a:spcBef>
+                <a:spcPts val="0"/>
+              </a:spcBef>
+              <a:spcAft>
+                <a:spcPts val="0"/>
+              </a:spcAft>
+              <a:buClrTx/>
+              <a:buSzTx/>
+              <a:buFontTx/>
+              <a:buNone/>
+              <a:tabLst/>
+              <a:defRPr/>
+            </a:pPr>
+            <a:endParaRPr kumimoji="0" lang="en-US" sz="1800" b="0" i="0" u="none" strike="noStrike" kern="1200" cap="none" spc="0" normalizeH="0" baseline="0" noProof="0">
+              <a:ln>
+                <a:noFill/>
+              </a:ln>
+              <a:solidFill>
+                <a:srgbClr val="FFFFFF"/>
+              </a:solidFill>
+              <a:effectLst/>
+              <a:uLnTx/>
+              <a:uFillTx/>
+              <a:latin typeface="Calibri" panose="020F0502020204030204"/>
+              <a:ea typeface="+mn-ea"/>
+              <a:cs typeface="+mn-cs"/>
+            </a:endParaRPr>
+          </a:p>
+        </p:txBody>
+      </p:sp>
+      <p:sp>
+        <p:nvSpPr>
+          <p:cNvPr id="3" name="Sottotitolo 2">
+            <a:extLst>
+              <a:ext uri="{FF2B5EF4-FFF2-40B4-BE49-F238E27FC236}">
+                <a16:creationId xmlns:a16="http://schemas.microsoft.com/office/drawing/2014/main" id="{B9F686C4-B595-4CDD-8233-91A53C48A369}"/>
+              </a:ext>
+            </a:extLst>
+          </p:cNvPr>
+          <p:cNvSpPr>
+            <a:spLocks noGrp="1"/>
+          </p:cNvSpPr>
+          <p:nvPr>
+            <p:ph type="subTitle" idx="1"/>
+          </p:nvPr>
+        </p:nvSpPr>
+        <p:spPr>
+          <a:xfrm>
+            <a:off x="1079499" y="4843002"/>
+            <a:ext cx="10012680" cy="1234345"/>
+          </a:xfrm>
+        </p:spPr>
+        <p:txBody>
+          <a:bodyPr anchor="ctr">
+            <a:normAutofit/>
+          </a:bodyPr>
+          <a:lstStyle/>
+          <a:p>
+            <a:pPr algn="l"/>
+            <a:r>
+              <a:rPr lang="it-IT" sz="2600">
+                <a:solidFill>
+                  <a:srgbClr val="1B1B1B"/>
+                </a:solidFill>
+              </a:rPr>
+              <a:t>Use Cases for Project</a:t>
+            </a:r>
+          </a:p>
+        </p:txBody>
+      </p:sp>
+      <p:sp>
+        <p:nvSpPr>
+          <p:cNvPr id="23" name="Rectangle 22">
+            <a:extLst>
+              <a:ext uri="{FF2B5EF4-FFF2-40B4-BE49-F238E27FC236}">
+                <a16:creationId xmlns:a16="http://schemas.microsoft.com/office/drawing/2014/main" id="{1A882A9F-F4E9-4E23-8F0B-20B5DF42EAA9}"/>
+              </a:ext>
+              <a:ext uri="{C183D7F6-B498-43B3-948B-1728B52AA6E4}">
+                <adec:decorative xmlns:adec="http://schemas.microsoft.com/office/drawing/2017/decorative" val="1"/>
+              </a:ext>
+            </a:extLst>
+          </p:cNvPr>
+          <p:cNvSpPr>
+            <a:spLocks noGrp="1" noRot="1" noChangeAspect="1" noMove="1" noResize="1" noEditPoints="1" noAdjustHandles="1" noChangeArrowheads="1" noChangeShapeType="1" noTextEdit="1"/>
+          </p:cNvSpPr>
+          <p:nvPr>
+            <p:extLst>
+              <p:ext uri="{386F3935-93C4-4BCD-93E2-E3B085C9AB24}">
+                <p16:designElem xmlns:p16="http://schemas.microsoft.com/office/powerpoint/2015/main" val="1"/>
+              </p:ext>
+            </p:extLst>
+          </p:nvPr>
+        </p:nvSpPr>
+        <p:spPr>
+          <a:xfrm>
+            <a:off x="9619345" y="450221"/>
+            <a:ext cx="2115455" cy="1890204"/>
+          </a:xfrm>
+          <a:prstGeom prst="rect">
+            <a:avLst/>
+          </a:prstGeom>
+          <a:solidFill>
+            <a:schemeClr val="accent1">
+              <a:alpha val="95000"/>
+            </a:schemeClr>
+          </a:solidFill>
+          <a:ln w="25400">
+            <a:noFill/>
+          </a:ln>
+        </p:spPr>
+        <p:style>
+          <a:lnRef idx="2">
+            <a:schemeClr val="accent1">
+              <a:shade val="50000"/>
+            </a:schemeClr>
+          </a:lnRef>
+          <a:fillRef idx="1">
+            <a:schemeClr val="accent1"/>
+          </a:fillRef>
+          <a:effectRef idx="0">
+            <a:schemeClr val="accent1"/>
+          </a:effectRef>
+          <a:fontRef idx="minor">
+            <a:schemeClr val="lt1"/>
+          </a:fontRef>
+        </p:style>
+        <p:txBody>
+          <a:bodyPr rtlCol="0" anchor="ctr"/>
+          <a:lstStyle/>
+          <a:p>
+            <a:pPr marL="0" marR="0" lvl="0" indent="0" algn="ctr" defTabSz="914400" rtl="0" eaLnBrk="1" fontAlgn="auto" latinLnBrk="0" hangingPunct="1">
+              <a:lnSpc>
+                <a:spcPct val="100000"/>
+              </a:lnSpc>
+              <a:spcBef>
+                <a:spcPts val="0"/>
+              </a:spcBef>
+              <a:spcAft>
+                <a:spcPts val="0"/>
+              </a:spcAft>
+              <a:buClrTx/>
+              <a:buSzTx/>
+              <a:buFontTx/>
+              <a:buNone/>
+              <a:tabLst/>
+              <a:defRPr/>
+            </a:pPr>
+            <a:endParaRPr kumimoji="0" lang="en-US" sz="1800" b="0" i="0" u="none" strike="noStrike" kern="1200" cap="none" spc="0" normalizeH="0" baseline="0" noProof="0">
+              <a:ln>
+                <a:noFill/>
+              </a:ln>
+              <a:solidFill>
+                <a:srgbClr val="FFFFFF"/>
+              </a:solidFill>
+              <a:effectLst/>
+              <a:uLnTx/>
+              <a:uFillTx/>
+              <a:latin typeface="Calibri" panose="020F0502020204030204"/>
+              <a:ea typeface="+mn-ea"/>
+              <a:cs typeface="+mn-cs"/>
+            </a:endParaRPr>
+          </a:p>
+        </p:txBody>
+      </p:sp>
+      <p:pic>
+        <p:nvPicPr>
+          <p:cNvPr id="14" name="Graphic 13">
+            <a:extLst>
+              <a:ext uri="{FF2B5EF4-FFF2-40B4-BE49-F238E27FC236}">
+                <a16:creationId xmlns:a16="http://schemas.microsoft.com/office/drawing/2014/main" id="{9B8EFA56-2723-45F2-A2E6-46A6F60F1984}"/>
+              </a:ext>
+            </a:extLst>
+          </p:cNvPr>
+          <p:cNvPicPr>
+            <a:picLocks noChangeAspect="1"/>
+          </p:cNvPicPr>
+          <p:nvPr/>
         </p:nvPicPr>
         <p:blipFill>
           <a:blip r:embed="rId2">
             <a:extLst>
               <a:ext uri="{28A0092B-C50C-407E-A947-70E740481C1C}">
                 <a14:useLocalDpi xmlns:a14="http://schemas.microsoft.com/office/drawing/2010/main" val="0"/>
+              </a:ext>
+              <a:ext uri="{96DAC541-7B7A-43D3-8B79-37D633B846F1}">
+                <asvg:svgBlip xmlns:asvg="http://schemas.microsoft.com/office/drawing/2016/SVG/main" r:embed="rId3"/>
               </a:ext>
             </a:extLst>
           </a:blip>
@@ -3624,92 +3987,14 @@
         </p:blipFill>
         <p:spPr>
           <a:xfrm>
-            <a:off x="0" y="0"/>
-            <a:ext cx="12192000" cy="6858000"/>
+            <a:off x="9857725" y="2612676"/>
+            <a:ext cx="1632648" cy="1632648"/>
           </a:xfrm>
           <a:prstGeom prst="rect">
             <a:avLst/>
           </a:prstGeom>
         </p:spPr>
       </p:pic>
-      <p:sp>
-        <p:nvSpPr>
-          <p:cNvPr id="2" name="Titolo 1">
-            <a:extLst>
-              <a:ext uri="{FF2B5EF4-FFF2-40B4-BE49-F238E27FC236}">
-                <a16:creationId xmlns:a16="http://schemas.microsoft.com/office/drawing/2014/main" id="{DCBAC149-DB9F-4874-BC24-7F077AA4B78D}"/>
-              </a:ext>
-            </a:extLst>
-          </p:cNvPr>
-          <p:cNvSpPr>
-            <a:spLocks noGrp="1"/>
-          </p:cNvSpPr>
-          <p:nvPr>
-            <p:ph type="ctrTitle"/>
-          </p:nvPr>
-        </p:nvSpPr>
-        <p:spPr>
-          <a:xfrm>
-            <a:off x="3045368" y="2572719"/>
-            <a:ext cx="6105194" cy="1501999"/>
-          </a:xfrm>
-        </p:spPr>
-        <p:txBody>
-          <a:bodyPr>
-            <a:normAutofit/>
-          </a:bodyPr>
-          <a:lstStyle/>
-          <a:p>
-            <a:r>
-              <a:rPr lang="it-IT" dirty="0">
-                <a:solidFill>
-                  <a:srgbClr val="FFFFFF"/>
-                </a:solidFill>
-              </a:rPr>
-              <a:t>Gestione DB</a:t>
-            </a:r>
-          </a:p>
-        </p:txBody>
-      </p:sp>
-      <p:sp>
-        <p:nvSpPr>
-          <p:cNvPr id="3" name="Sottotitolo 2">
-            <a:extLst>
-              <a:ext uri="{FF2B5EF4-FFF2-40B4-BE49-F238E27FC236}">
-                <a16:creationId xmlns:a16="http://schemas.microsoft.com/office/drawing/2014/main" id="{B9F686C4-B595-4CDD-8233-91A53C48A369}"/>
-              </a:ext>
-            </a:extLst>
-          </p:cNvPr>
-          <p:cNvSpPr>
-            <a:spLocks noGrp="1"/>
-          </p:cNvSpPr>
-          <p:nvPr>
-            <p:ph type="subTitle" idx="1"/>
-          </p:nvPr>
-        </p:nvSpPr>
-        <p:spPr>
-          <a:xfrm>
-            <a:off x="3045368" y="4074718"/>
-            <a:ext cx="6105194" cy="682079"/>
-          </a:xfrm>
-        </p:spPr>
-        <p:txBody>
-          <a:bodyPr>
-            <a:normAutofit/>
-          </a:bodyPr>
-          <a:lstStyle/>
-          <a:p>
-            <a:r>
-              <a:rPr lang="it-IT">
-                <a:solidFill>
-                  <a:srgbClr val="FFFFFF"/>
-                </a:solidFill>
-              </a:rPr>
-              <a:t>Use Cases for Project</a:t>
-            </a:r>
-          </a:p>
-        </p:txBody>
-      </p:sp>
     </p:spTree>
     <p:extLst>
       <p:ext uri="{BB962C8B-B14F-4D97-AF65-F5344CB8AC3E}">
@@ -3789,7 +4074,7 @@
             <p:ph idx="1"/>
             <p:extLst>
               <p:ext uri="{D42A27DB-BD31-4B8C-83A1-F6EECF244321}">
-                <p14:modId xmlns:p14="http://schemas.microsoft.com/office/powerpoint/2010/main" val="3298388647"/>
+                <p14:modId xmlns:p14="http://schemas.microsoft.com/office/powerpoint/2010/main" val="1354309838"/>
               </p:ext>
             </p:extLst>
           </p:nvPr>
@@ -4011,8 +4296,12 @@
                     <a:lstStyle/>
                     <a:p>
                       <a:r>
+                        <a:rPr lang="it-IT" dirty="0" err="1"/>
+                        <a:t>Tsipas</a:t>
+                      </a:r>
+                      <a:r>
                         <a:rPr lang="it-IT" dirty="0"/>
-                        <a:t>Tsipas</a:t>
+                        <a:t>, Sabbatini</a:t>
                       </a:r>
                     </a:p>
                   </a:txBody>

</xml_diff>

<commit_message>
aggiunta cognome (Barzaghi), correzioni.
</commit_message>
<xml_diff>
--- a/docs/analisi/Template use case/Template Use Case - Gestione DB.pptx
+++ b/docs/analisi/Template use case/Template Use Case - Gestione DB.pptx
@@ -109,7 +109,7 @@
   </p:defaultTextStyle>
   <p:extLst>
     <p:ext uri="{EFAFB233-063F-42B5-8137-9DF3F51BA10A}">
-      <p15:sldGuideLst xmlns:p15="http://schemas.microsoft.com/office/powerpoint/2012/main">
+      <p15:sldGuideLst xmlns="" xmlns:p15="http://schemas.microsoft.com/office/powerpoint/2012/main">
         <p15:guide id="1" orient="horz" pos="2160">
           <p15:clr>
             <a:srgbClr val="A4A3A4"/>
@@ -302,7 +302,7 @@
           <p:cNvPr id="2" name="Titolo 1">
             <a:extLst>
               <a:ext uri="{FF2B5EF4-FFF2-40B4-BE49-F238E27FC236}">
-                <a16:creationId xmlns:a16="http://schemas.microsoft.com/office/drawing/2014/main" id="{CFBF2858-9FF9-49F6-9325-A5B5D4185723}"/>
+                <a16:creationId xmlns="" xmlns:a16="http://schemas.microsoft.com/office/drawing/2014/main" id="{CFBF2858-9FF9-49F6-9325-A5B5D4185723}"/>
               </a:ext>
             </a:extLst>
           </p:cNvPr>
@@ -339,7 +339,7 @@
           <p:cNvPr id="3" name="Sottotitolo 2">
             <a:extLst>
               <a:ext uri="{FF2B5EF4-FFF2-40B4-BE49-F238E27FC236}">
-                <a16:creationId xmlns:a16="http://schemas.microsoft.com/office/drawing/2014/main" id="{4B21D84B-ED35-4CD0-B889-7022650B2578}"/>
+                <a16:creationId xmlns="" xmlns:a16="http://schemas.microsoft.com/office/drawing/2014/main" id="{4B21D84B-ED35-4CD0-B889-7022650B2578}"/>
               </a:ext>
             </a:extLst>
           </p:cNvPr>
@@ -409,7 +409,7 @@
           <p:cNvPr id="4" name="Segnaposto data 3">
             <a:extLst>
               <a:ext uri="{FF2B5EF4-FFF2-40B4-BE49-F238E27FC236}">
-                <a16:creationId xmlns:a16="http://schemas.microsoft.com/office/drawing/2014/main" id="{E66C651E-1356-4A58-BA17-ECFD882A1A0D}"/>
+                <a16:creationId xmlns="" xmlns:a16="http://schemas.microsoft.com/office/drawing/2014/main" id="{E66C651E-1356-4A58-BA17-ECFD882A1A0D}"/>
               </a:ext>
             </a:extLst>
           </p:cNvPr>
@@ -427,7 +427,7 @@
           <a:p>
             <a:fld id="{F7D71F90-2C6D-44F6-A1F9-0B80B911F8CA}" type="datetimeFigureOut">
               <a:rPr lang="it-IT" smtClean="0"/>
-              <a:t>02/01/2020</a:t>
+              <a:t>08/01/2020</a:t>
             </a:fld>
             <a:endParaRPr lang="it-IT"/>
           </a:p>
@@ -438,7 +438,7 @@
           <p:cNvPr id="5" name="Segnaposto piè di pagina 4">
             <a:extLst>
               <a:ext uri="{FF2B5EF4-FFF2-40B4-BE49-F238E27FC236}">
-                <a16:creationId xmlns:a16="http://schemas.microsoft.com/office/drawing/2014/main" id="{74328D79-8461-43BC-84DA-249AF43BC14A}"/>
+                <a16:creationId xmlns="" xmlns:a16="http://schemas.microsoft.com/office/drawing/2014/main" id="{74328D79-8461-43BC-84DA-249AF43BC14A}"/>
               </a:ext>
             </a:extLst>
           </p:cNvPr>
@@ -463,7 +463,7 @@
           <p:cNvPr id="6" name="Segnaposto numero diapositiva 5">
             <a:extLst>
               <a:ext uri="{FF2B5EF4-FFF2-40B4-BE49-F238E27FC236}">
-                <a16:creationId xmlns:a16="http://schemas.microsoft.com/office/drawing/2014/main" id="{816387D6-94E6-47FE-871A-C8EF03F29BDB}"/>
+                <a16:creationId xmlns="" xmlns:a16="http://schemas.microsoft.com/office/drawing/2014/main" id="{816387D6-94E6-47FE-871A-C8EF03F29BDB}"/>
               </a:ext>
             </a:extLst>
           </p:cNvPr>
@@ -522,7 +522,7 @@
           <p:cNvPr id="2" name="Titolo 1">
             <a:extLst>
               <a:ext uri="{FF2B5EF4-FFF2-40B4-BE49-F238E27FC236}">
-                <a16:creationId xmlns:a16="http://schemas.microsoft.com/office/drawing/2014/main" id="{F59AC4B1-2C56-4BBF-A05F-D9500F78FEB9}"/>
+                <a16:creationId xmlns="" xmlns:a16="http://schemas.microsoft.com/office/drawing/2014/main" id="{F59AC4B1-2C56-4BBF-A05F-D9500F78FEB9}"/>
               </a:ext>
             </a:extLst>
           </p:cNvPr>
@@ -550,7 +550,7 @@
           <p:cNvPr id="3" name="Segnaposto testo verticale 2">
             <a:extLst>
               <a:ext uri="{FF2B5EF4-FFF2-40B4-BE49-F238E27FC236}">
-                <a16:creationId xmlns:a16="http://schemas.microsoft.com/office/drawing/2014/main" id="{90389E8C-63A3-42AB-93CD-0F8792454FCC}"/>
+                <a16:creationId xmlns="" xmlns:a16="http://schemas.microsoft.com/office/drawing/2014/main" id="{90389E8C-63A3-42AB-93CD-0F8792454FCC}"/>
               </a:ext>
             </a:extLst>
           </p:cNvPr>
@@ -607,7 +607,7 @@
           <p:cNvPr id="4" name="Segnaposto data 3">
             <a:extLst>
               <a:ext uri="{FF2B5EF4-FFF2-40B4-BE49-F238E27FC236}">
-                <a16:creationId xmlns:a16="http://schemas.microsoft.com/office/drawing/2014/main" id="{254FADA6-B05E-4B35-A06A-2022D2DBEC26}"/>
+                <a16:creationId xmlns="" xmlns:a16="http://schemas.microsoft.com/office/drawing/2014/main" id="{254FADA6-B05E-4B35-A06A-2022D2DBEC26}"/>
               </a:ext>
             </a:extLst>
           </p:cNvPr>
@@ -625,7 +625,7 @@
           <a:p>
             <a:fld id="{F7D71F90-2C6D-44F6-A1F9-0B80B911F8CA}" type="datetimeFigureOut">
               <a:rPr lang="it-IT" smtClean="0"/>
-              <a:t>02/01/2020</a:t>
+              <a:t>08/01/2020</a:t>
             </a:fld>
             <a:endParaRPr lang="it-IT"/>
           </a:p>
@@ -636,7 +636,7 @@
           <p:cNvPr id="5" name="Segnaposto piè di pagina 4">
             <a:extLst>
               <a:ext uri="{FF2B5EF4-FFF2-40B4-BE49-F238E27FC236}">
-                <a16:creationId xmlns:a16="http://schemas.microsoft.com/office/drawing/2014/main" id="{0631869E-DF6C-4226-B729-2123308FE398}"/>
+                <a16:creationId xmlns="" xmlns:a16="http://schemas.microsoft.com/office/drawing/2014/main" id="{0631869E-DF6C-4226-B729-2123308FE398}"/>
               </a:ext>
             </a:extLst>
           </p:cNvPr>
@@ -661,7 +661,7 @@
           <p:cNvPr id="6" name="Segnaposto numero diapositiva 5">
             <a:extLst>
               <a:ext uri="{FF2B5EF4-FFF2-40B4-BE49-F238E27FC236}">
-                <a16:creationId xmlns:a16="http://schemas.microsoft.com/office/drawing/2014/main" id="{5EBEEC90-B83C-4DEE-937E-C7EC1D025508}"/>
+                <a16:creationId xmlns="" xmlns:a16="http://schemas.microsoft.com/office/drawing/2014/main" id="{5EBEEC90-B83C-4DEE-937E-C7EC1D025508}"/>
               </a:ext>
             </a:extLst>
           </p:cNvPr>
@@ -720,7 +720,7 @@
           <p:cNvPr id="2" name="Titolo verticale 1">
             <a:extLst>
               <a:ext uri="{FF2B5EF4-FFF2-40B4-BE49-F238E27FC236}">
-                <a16:creationId xmlns:a16="http://schemas.microsoft.com/office/drawing/2014/main" id="{30E33601-4D9B-4E96-B3C3-AB65F0C81F37}"/>
+                <a16:creationId xmlns="" xmlns:a16="http://schemas.microsoft.com/office/drawing/2014/main" id="{30E33601-4D9B-4E96-B3C3-AB65F0C81F37}"/>
               </a:ext>
             </a:extLst>
           </p:cNvPr>
@@ -753,7 +753,7 @@
           <p:cNvPr id="3" name="Segnaposto testo verticale 2">
             <a:extLst>
               <a:ext uri="{FF2B5EF4-FFF2-40B4-BE49-F238E27FC236}">
-                <a16:creationId xmlns:a16="http://schemas.microsoft.com/office/drawing/2014/main" id="{FEDAA464-5CD2-4C93-83F5-E13251F55648}"/>
+                <a16:creationId xmlns="" xmlns:a16="http://schemas.microsoft.com/office/drawing/2014/main" id="{FEDAA464-5CD2-4C93-83F5-E13251F55648}"/>
               </a:ext>
             </a:extLst>
           </p:cNvPr>
@@ -815,7 +815,7 @@
           <p:cNvPr id="4" name="Segnaposto data 3">
             <a:extLst>
               <a:ext uri="{FF2B5EF4-FFF2-40B4-BE49-F238E27FC236}">
-                <a16:creationId xmlns:a16="http://schemas.microsoft.com/office/drawing/2014/main" id="{F61719B4-CD99-4540-BEA4-8B7884B7C59C}"/>
+                <a16:creationId xmlns="" xmlns:a16="http://schemas.microsoft.com/office/drawing/2014/main" id="{F61719B4-CD99-4540-BEA4-8B7884B7C59C}"/>
               </a:ext>
             </a:extLst>
           </p:cNvPr>
@@ -833,7 +833,7 @@
           <a:p>
             <a:fld id="{F7D71F90-2C6D-44F6-A1F9-0B80B911F8CA}" type="datetimeFigureOut">
               <a:rPr lang="it-IT" smtClean="0"/>
-              <a:t>02/01/2020</a:t>
+              <a:t>08/01/2020</a:t>
             </a:fld>
             <a:endParaRPr lang="it-IT"/>
           </a:p>
@@ -844,7 +844,7 @@
           <p:cNvPr id="5" name="Segnaposto piè di pagina 4">
             <a:extLst>
               <a:ext uri="{FF2B5EF4-FFF2-40B4-BE49-F238E27FC236}">
-                <a16:creationId xmlns:a16="http://schemas.microsoft.com/office/drawing/2014/main" id="{30F0B4A5-E6FA-4C78-86A7-F528FA130059}"/>
+                <a16:creationId xmlns="" xmlns:a16="http://schemas.microsoft.com/office/drawing/2014/main" id="{30F0B4A5-E6FA-4C78-86A7-F528FA130059}"/>
               </a:ext>
             </a:extLst>
           </p:cNvPr>
@@ -869,7 +869,7 @@
           <p:cNvPr id="6" name="Segnaposto numero diapositiva 5">
             <a:extLst>
               <a:ext uri="{FF2B5EF4-FFF2-40B4-BE49-F238E27FC236}">
-                <a16:creationId xmlns:a16="http://schemas.microsoft.com/office/drawing/2014/main" id="{442BF533-5946-4F10-92FC-3CD5053CF4D8}"/>
+                <a16:creationId xmlns="" xmlns:a16="http://schemas.microsoft.com/office/drawing/2014/main" id="{442BF533-5946-4F10-92FC-3CD5053CF4D8}"/>
               </a:ext>
             </a:extLst>
           </p:cNvPr>
@@ -928,7 +928,7 @@
           <p:cNvPr id="2" name="Titolo 1">
             <a:extLst>
               <a:ext uri="{FF2B5EF4-FFF2-40B4-BE49-F238E27FC236}">
-                <a16:creationId xmlns:a16="http://schemas.microsoft.com/office/drawing/2014/main" id="{8D324EC4-C5F5-4344-815B-63064E440846}"/>
+                <a16:creationId xmlns="" xmlns:a16="http://schemas.microsoft.com/office/drawing/2014/main" id="{8D324EC4-C5F5-4344-815B-63064E440846}"/>
               </a:ext>
             </a:extLst>
           </p:cNvPr>
@@ -956,7 +956,7 @@
           <p:cNvPr id="3" name="Segnaposto contenuto 2">
             <a:extLst>
               <a:ext uri="{FF2B5EF4-FFF2-40B4-BE49-F238E27FC236}">
-                <a16:creationId xmlns:a16="http://schemas.microsoft.com/office/drawing/2014/main" id="{55775342-FE66-4A01-9E0A-B6DFF50813CF}"/>
+                <a16:creationId xmlns="" xmlns:a16="http://schemas.microsoft.com/office/drawing/2014/main" id="{55775342-FE66-4A01-9E0A-B6DFF50813CF}"/>
               </a:ext>
             </a:extLst>
           </p:cNvPr>
@@ -1013,7 +1013,7 @@
           <p:cNvPr id="4" name="Segnaposto data 3">
             <a:extLst>
               <a:ext uri="{FF2B5EF4-FFF2-40B4-BE49-F238E27FC236}">
-                <a16:creationId xmlns:a16="http://schemas.microsoft.com/office/drawing/2014/main" id="{397A9FE5-70AC-44CE-914B-A1E1953D424A}"/>
+                <a16:creationId xmlns="" xmlns:a16="http://schemas.microsoft.com/office/drawing/2014/main" id="{397A9FE5-70AC-44CE-914B-A1E1953D424A}"/>
               </a:ext>
             </a:extLst>
           </p:cNvPr>
@@ -1031,7 +1031,7 @@
           <a:p>
             <a:fld id="{F7D71F90-2C6D-44F6-A1F9-0B80B911F8CA}" type="datetimeFigureOut">
               <a:rPr lang="it-IT" smtClean="0"/>
-              <a:t>02/01/2020</a:t>
+              <a:t>08/01/2020</a:t>
             </a:fld>
             <a:endParaRPr lang="it-IT"/>
           </a:p>
@@ -1042,7 +1042,7 @@
           <p:cNvPr id="5" name="Segnaposto piè di pagina 4">
             <a:extLst>
               <a:ext uri="{FF2B5EF4-FFF2-40B4-BE49-F238E27FC236}">
-                <a16:creationId xmlns:a16="http://schemas.microsoft.com/office/drawing/2014/main" id="{955E82A6-47E5-4A43-8C14-EB032BC59D50}"/>
+                <a16:creationId xmlns="" xmlns:a16="http://schemas.microsoft.com/office/drawing/2014/main" id="{955E82A6-47E5-4A43-8C14-EB032BC59D50}"/>
               </a:ext>
             </a:extLst>
           </p:cNvPr>
@@ -1067,7 +1067,7 @@
           <p:cNvPr id="6" name="Segnaposto numero diapositiva 5">
             <a:extLst>
               <a:ext uri="{FF2B5EF4-FFF2-40B4-BE49-F238E27FC236}">
-                <a16:creationId xmlns:a16="http://schemas.microsoft.com/office/drawing/2014/main" id="{58E8D349-F894-470A-B25E-2196ABC42040}"/>
+                <a16:creationId xmlns="" xmlns:a16="http://schemas.microsoft.com/office/drawing/2014/main" id="{58E8D349-F894-470A-B25E-2196ABC42040}"/>
               </a:ext>
             </a:extLst>
           </p:cNvPr>
@@ -1126,7 +1126,7 @@
           <p:cNvPr id="2" name="Titolo 1">
             <a:extLst>
               <a:ext uri="{FF2B5EF4-FFF2-40B4-BE49-F238E27FC236}">
-                <a16:creationId xmlns:a16="http://schemas.microsoft.com/office/drawing/2014/main" id="{FF8A343A-BEE9-48C2-8F08-6D02BD514F3F}"/>
+                <a16:creationId xmlns="" xmlns:a16="http://schemas.microsoft.com/office/drawing/2014/main" id="{FF8A343A-BEE9-48C2-8F08-6D02BD514F3F}"/>
               </a:ext>
             </a:extLst>
           </p:cNvPr>
@@ -1163,7 +1163,7 @@
           <p:cNvPr id="3" name="Segnaposto testo 2">
             <a:extLst>
               <a:ext uri="{FF2B5EF4-FFF2-40B4-BE49-F238E27FC236}">
-                <a16:creationId xmlns:a16="http://schemas.microsoft.com/office/drawing/2014/main" id="{0909A412-AD76-4989-B06E-E33E0F00580E}"/>
+                <a16:creationId xmlns="" xmlns:a16="http://schemas.microsoft.com/office/drawing/2014/main" id="{0909A412-AD76-4989-B06E-E33E0F00580E}"/>
               </a:ext>
             </a:extLst>
           </p:cNvPr>
@@ -1288,7 +1288,7 @@
           <p:cNvPr id="4" name="Segnaposto data 3">
             <a:extLst>
               <a:ext uri="{FF2B5EF4-FFF2-40B4-BE49-F238E27FC236}">
-                <a16:creationId xmlns:a16="http://schemas.microsoft.com/office/drawing/2014/main" id="{16318882-43E1-4C25-B100-9FE081333575}"/>
+                <a16:creationId xmlns="" xmlns:a16="http://schemas.microsoft.com/office/drawing/2014/main" id="{16318882-43E1-4C25-B100-9FE081333575}"/>
               </a:ext>
             </a:extLst>
           </p:cNvPr>
@@ -1306,7 +1306,7 @@
           <a:p>
             <a:fld id="{F7D71F90-2C6D-44F6-A1F9-0B80B911F8CA}" type="datetimeFigureOut">
               <a:rPr lang="it-IT" smtClean="0"/>
-              <a:t>02/01/2020</a:t>
+              <a:t>08/01/2020</a:t>
             </a:fld>
             <a:endParaRPr lang="it-IT"/>
           </a:p>
@@ -1317,7 +1317,7 @@
           <p:cNvPr id="5" name="Segnaposto piè di pagina 4">
             <a:extLst>
               <a:ext uri="{FF2B5EF4-FFF2-40B4-BE49-F238E27FC236}">
-                <a16:creationId xmlns:a16="http://schemas.microsoft.com/office/drawing/2014/main" id="{C6C78431-C23D-4359-9F41-506C478EC2A0}"/>
+                <a16:creationId xmlns="" xmlns:a16="http://schemas.microsoft.com/office/drawing/2014/main" id="{C6C78431-C23D-4359-9F41-506C478EC2A0}"/>
               </a:ext>
             </a:extLst>
           </p:cNvPr>
@@ -1342,7 +1342,7 @@
           <p:cNvPr id="6" name="Segnaposto numero diapositiva 5">
             <a:extLst>
               <a:ext uri="{FF2B5EF4-FFF2-40B4-BE49-F238E27FC236}">
-                <a16:creationId xmlns:a16="http://schemas.microsoft.com/office/drawing/2014/main" id="{DCF015C2-4C12-42A4-9944-4B1FE7A7FFB1}"/>
+                <a16:creationId xmlns="" xmlns:a16="http://schemas.microsoft.com/office/drawing/2014/main" id="{DCF015C2-4C12-42A4-9944-4B1FE7A7FFB1}"/>
               </a:ext>
             </a:extLst>
           </p:cNvPr>
@@ -1401,7 +1401,7 @@
           <p:cNvPr id="2" name="Titolo 1">
             <a:extLst>
               <a:ext uri="{FF2B5EF4-FFF2-40B4-BE49-F238E27FC236}">
-                <a16:creationId xmlns:a16="http://schemas.microsoft.com/office/drawing/2014/main" id="{7650FD1C-41AC-4FD0-8AF4-B2BFB5ECBDC7}"/>
+                <a16:creationId xmlns="" xmlns:a16="http://schemas.microsoft.com/office/drawing/2014/main" id="{7650FD1C-41AC-4FD0-8AF4-B2BFB5ECBDC7}"/>
               </a:ext>
             </a:extLst>
           </p:cNvPr>
@@ -1429,7 +1429,7 @@
           <p:cNvPr id="3" name="Segnaposto contenuto 2">
             <a:extLst>
               <a:ext uri="{FF2B5EF4-FFF2-40B4-BE49-F238E27FC236}">
-                <a16:creationId xmlns:a16="http://schemas.microsoft.com/office/drawing/2014/main" id="{DD16E77D-6E44-4E42-B7EA-AA87E0A9DBF9}"/>
+                <a16:creationId xmlns="" xmlns:a16="http://schemas.microsoft.com/office/drawing/2014/main" id="{DD16E77D-6E44-4E42-B7EA-AA87E0A9DBF9}"/>
               </a:ext>
             </a:extLst>
           </p:cNvPr>
@@ -1491,7 +1491,7 @@
           <p:cNvPr id="4" name="Segnaposto contenuto 3">
             <a:extLst>
               <a:ext uri="{FF2B5EF4-FFF2-40B4-BE49-F238E27FC236}">
-                <a16:creationId xmlns:a16="http://schemas.microsoft.com/office/drawing/2014/main" id="{844F8AF1-BDF4-4BB6-AA12-D9E74887B7AA}"/>
+                <a16:creationId xmlns="" xmlns:a16="http://schemas.microsoft.com/office/drawing/2014/main" id="{844F8AF1-BDF4-4BB6-AA12-D9E74887B7AA}"/>
               </a:ext>
             </a:extLst>
           </p:cNvPr>
@@ -1553,7 +1553,7 @@
           <p:cNvPr id="5" name="Segnaposto data 4">
             <a:extLst>
               <a:ext uri="{FF2B5EF4-FFF2-40B4-BE49-F238E27FC236}">
-                <a16:creationId xmlns:a16="http://schemas.microsoft.com/office/drawing/2014/main" id="{64E49264-4D9E-4F69-ADBE-5FCE7E088F87}"/>
+                <a16:creationId xmlns="" xmlns:a16="http://schemas.microsoft.com/office/drawing/2014/main" id="{64E49264-4D9E-4F69-ADBE-5FCE7E088F87}"/>
               </a:ext>
             </a:extLst>
           </p:cNvPr>
@@ -1571,7 +1571,7 @@
           <a:p>
             <a:fld id="{F7D71F90-2C6D-44F6-A1F9-0B80B911F8CA}" type="datetimeFigureOut">
               <a:rPr lang="it-IT" smtClean="0"/>
-              <a:t>02/01/2020</a:t>
+              <a:t>08/01/2020</a:t>
             </a:fld>
             <a:endParaRPr lang="it-IT"/>
           </a:p>
@@ -1582,7 +1582,7 @@
           <p:cNvPr id="6" name="Segnaposto piè di pagina 5">
             <a:extLst>
               <a:ext uri="{FF2B5EF4-FFF2-40B4-BE49-F238E27FC236}">
-                <a16:creationId xmlns:a16="http://schemas.microsoft.com/office/drawing/2014/main" id="{6BD94B07-3F97-448F-A14A-F799F51B318D}"/>
+                <a16:creationId xmlns="" xmlns:a16="http://schemas.microsoft.com/office/drawing/2014/main" id="{6BD94B07-3F97-448F-A14A-F799F51B318D}"/>
               </a:ext>
             </a:extLst>
           </p:cNvPr>
@@ -1607,7 +1607,7 @@
           <p:cNvPr id="7" name="Segnaposto numero diapositiva 6">
             <a:extLst>
               <a:ext uri="{FF2B5EF4-FFF2-40B4-BE49-F238E27FC236}">
-                <a16:creationId xmlns:a16="http://schemas.microsoft.com/office/drawing/2014/main" id="{B0CD1917-F8A2-456F-82E6-C095438948B0}"/>
+                <a16:creationId xmlns="" xmlns:a16="http://schemas.microsoft.com/office/drawing/2014/main" id="{B0CD1917-F8A2-456F-82E6-C095438948B0}"/>
               </a:ext>
             </a:extLst>
           </p:cNvPr>
@@ -1666,7 +1666,7 @@
           <p:cNvPr id="2" name="Titolo 1">
             <a:extLst>
               <a:ext uri="{FF2B5EF4-FFF2-40B4-BE49-F238E27FC236}">
-                <a16:creationId xmlns:a16="http://schemas.microsoft.com/office/drawing/2014/main" id="{B58BF815-104D-4049-9B9F-5BEFA614935C}"/>
+                <a16:creationId xmlns="" xmlns:a16="http://schemas.microsoft.com/office/drawing/2014/main" id="{B58BF815-104D-4049-9B9F-5BEFA614935C}"/>
               </a:ext>
             </a:extLst>
           </p:cNvPr>
@@ -1699,7 +1699,7 @@
           <p:cNvPr id="3" name="Segnaposto testo 2">
             <a:extLst>
               <a:ext uri="{FF2B5EF4-FFF2-40B4-BE49-F238E27FC236}">
-                <a16:creationId xmlns:a16="http://schemas.microsoft.com/office/drawing/2014/main" id="{CAE85FF7-9C0E-4DB9-A6AB-9133F631A4B3}"/>
+                <a16:creationId xmlns="" xmlns:a16="http://schemas.microsoft.com/office/drawing/2014/main" id="{CAE85FF7-9C0E-4DB9-A6AB-9133F631A4B3}"/>
               </a:ext>
             </a:extLst>
           </p:cNvPr>
@@ -1770,7 +1770,7 @@
           <p:cNvPr id="4" name="Segnaposto contenuto 3">
             <a:extLst>
               <a:ext uri="{FF2B5EF4-FFF2-40B4-BE49-F238E27FC236}">
-                <a16:creationId xmlns:a16="http://schemas.microsoft.com/office/drawing/2014/main" id="{31A1FF07-A483-4CBC-B502-D2040A241C59}"/>
+                <a16:creationId xmlns="" xmlns:a16="http://schemas.microsoft.com/office/drawing/2014/main" id="{31A1FF07-A483-4CBC-B502-D2040A241C59}"/>
               </a:ext>
             </a:extLst>
           </p:cNvPr>
@@ -1832,7 +1832,7 @@
           <p:cNvPr id="5" name="Segnaposto testo 4">
             <a:extLst>
               <a:ext uri="{FF2B5EF4-FFF2-40B4-BE49-F238E27FC236}">
-                <a16:creationId xmlns:a16="http://schemas.microsoft.com/office/drawing/2014/main" id="{30D9E67F-0023-4AD8-8149-34BD4C055D4E}"/>
+                <a16:creationId xmlns="" xmlns:a16="http://schemas.microsoft.com/office/drawing/2014/main" id="{30D9E67F-0023-4AD8-8149-34BD4C055D4E}"/>
               </a:ext>
             </a:extLst>
           </p:cNvPr>
@@ -1903,7 +1903,7 @@
           <p:cNvPr id="6" name="Segnaposto contenuto 5">
             <a:extLst>
               <a:ext uri="{FF2B5EF4-FFF2-40B4-BE49-F238E27FC236}">
-                <a16:creationId xmlns:a16="http://schemas.microsoft.com/office/drawing/2014/main" id="{23831668-98C0-4979-87D7-959474A9085E}"/>
+                <a16:creationId xmlns="" xmlns:a16="http://schemas.microsoft.com/office/drawing/2014/main" id="{23831668-98C0-4979-87D7-959474A9085E}"/>
               </a:ext>
             </a:extLst>
           </p:cNvPr>
@@ -1965,7 +1965,7 @@
           <p:cNvPr id="7" name="Segnaposto data 6">
             <a:extLst>
               <a:ext uri="{FF2B5EF4-FFF2-40B4-BE49-F238E27FC236}">
-                <a16:creationId xmlns:a16="http://schemas.microsoft.com/office/drawing/2014/main" id="{91B922F5-7D11-4052-AF29-AA3B75B06734}"/>
+                <a16:creationId xmlns="" xmlns:a16="http://schemas.microsoft.com/office/drawing/2014/main" id="{91B922F5-7D11-4052-AF29-AA3B75B06734}"/>
               </a:ext>
             </a:extLst>
           </p:cNvPr>
@@ -1983,7 +1983,7 @@
           <a:p>
             <a:fld id="{F7D71F90-2C6D-44F6-A1F9-0B80B911F8CA}" type="datetimeFigureOut">
               <a:rPr lang="it-IT" smtClean="0"/>
-              <a:t>02/01/2020</a:t>
+              <a:t>08/01/2020</a:t>
             </a:fld>
             <a:endParaRPr lang="it-IT"/>
           </a:p>
@@ -1994,7 +1994,7 @@
           <p:cNvPr id="8" name="Segnaposto piè di pagina 7">
             <a:extLst>
               <a:ext uri="{FF2B5EF4-FFF2-40B4-BE49-F238E27FC236}">
-                <a16:creationId xmlns:a16="http://schemas.microsoft.com/office/drawing/2014/main" id="{6EA02A2F-7388-4F42-A4C6-2A7660ED38E4}"/>
+                <a16:creationId xmlns="" xmlns:a16="http://schemas.microsoft.com/office/drawing/2014/main" id="{6EA02A2F-7388-4F42-A4C6-2A7660ED38E4}"/>
               </a:ext>
             </a:extLst>
           </p:cNvPr>
@@ -2019,7 +2019,7 @@
           <p:cNvPr id="9" name="Segnaposto numero diapositiva 8">
             <a:extLst>
               <a:ext uri="{FF2B5EF4-FFF2-40B4-BE49-F238E27FC236}">
-                <a16:creationId xmlns:a16="http://schemas.microsoft.com/office/drawing/2014/main" id="{CB48DB9B-4650-4AD2-89EF-29E9A37B5E48}"/>
+                <a16:creationId xmlns="" xmlns:a16="http://schemas.microsoft.com/office/drawing/2014/main" id="{CB48DB9B-4650-4AD2-89EF-29E9A37B5E48}"/>
               </a:ext>
             </a:extLst>
           </p:cNvPr>
@@ -2078,7 +2078,7 @@
           <p:cNvPr id="2" name="Titolo 1">
             <a:extLst>
               <a:ext uri="{FF2B5EF4-FFF2-40B4-BE49-F238E27FC236}">
-                <a16:creationId xmlns:a16="http://schemas.microsoft.com/office/drawing/2014/main" id="{7FEFC453-E380-4034-875E-863F49914714}"/>
+                <a16:creationId xmlns="" xmlns:a16="http://schemas.microsoft.com/office/drawing/2014/main" id="{7FEFC453-E380-4034-875E-863F49914714}"/>
               </a:ext>
             </a:extLst>
           </p:cNvPr>
@@ -2106,7 +2106,7 @@
           <p:cNvPr id="3" name="Segnaposto data 2">
             <a:extLst>
               <a:ext uri="{FF2B5EF4-FFF2-40B4-BE49-F238E27FC236}">
-                <a16:creationId xmlns:a16="http://schemas.microsoft.com/office/drawing/2014/main" id="{5BC16F08-373A-43EF-8FBC-2D846E43D6B9}"/>
+                <a16:creationId xmlns="" xmlns:a16="http://schemas.microsoft.com/office/drawing/2014/main" id="{5BC16F08-373A-43EF-8FBC-2D846E43D6B9}"/>
               </a:ext>
             </a:extLst>
           </p:cNvPr>
@@ -2124,7 +2124,7 @@
           <a:p>
             <a:fld id="{F7D71F90-2C6D-44F6-A1F9-0B80B911F8CA}" type="datetimeFigureOut">
               <a:rPr lang="it-IT" smtClean="0"/>
-              <a:t>02/01/2020</a:t>
+              <a:t>08/01/2020</a:t>
             </a:fld>
             <a:endParaRPr lang="it-IT"/>
           </a:p>
@@ -2135,7 +2135,7 @@
           <p:cNvPr id="4" name="Segnaposto piè di pagina 3">
             <a:extLst>
               <a:ext uri="{FF2B5EF4-FFF2-40B4-BE49-F238E27FC236}">
-                <a16:creationId xmlns:a16="http://schemas.microsoft.com/office/drawing/2014/main" id="{2A78CDAE-3535-434E-BF92-560FEDD6C387}"/>
+                <a16:creationId xmlns="" xmlns:a16="http://schemas.microsoft.com/office/drawing/2014/main" id="{2A78CDAE-3535-434E-BF92-560FEDD6C387}"/>
               </a:ext>
             </a:extLst>
           </p:cNvPr>
@@ -2160,7 +2160,7 @@
           <p:cNvPr id="5" name="Segnaposto numero diapositiva 4">
             <a:extLst>
               <a:ext uri="{FF2B5EF4-FFF2-40B4-BE49-F238E27FC236}">
-                <a16:creationId xmlns:a16="http://schemas.microsoft.com/office/drawing/2014/main" id="{FAD2588D-B079-4FE5-B454-629CF3E310A3}"/>
+                <a16:creationId xmlns="" xmlns:a16="http://schemas.microsoft.com/office/drawing/2014/main" id="{FAD2588D-B079-4FE5-B454-629CF3E310A3}"/>
               </a:ext>
             </a:extLst>
           </p:cNvPr>
@@ -2219,7 +2219,7 @@
           <p:cNvPr id="2" name="Segnaposto data 1">
             <a:extLst>
               <a:ext uri="{FF2B5EF4-FFF2-40B4-BE49-F238E27FC236}">
-                <a16:creationId xmlns:a16="http://schemas.microsoft.com/office/drawing/2014/main" id="{D9E26DD7-8914-4A23-85B9-0C03B3ACA40C}"/>
+                <a16:creationId xmlns="" xmlns:a16="http://schemas.microsoft.com/office/drawing/2014/main" id="{D9E26DD7-8914-4A23-85B9-0C03B3ACA40C}"/>
               </a:ext>
             </a:extLst>
           </p:cNvPr>
@@ -2237,7 +2237,7 @@
           <a:p>
             <a:fld id="{F7D71F90-2C6D-44F6-A1F9-0B80B911F8CA}" type="datetimeFigureOut">
               <a:rPr lang="it-IT" smtClean="0"/>
-              <a:t>02/01/2020</a:t>
+              <a:t>08/01/2020</a:t>
             </a:fld>
             <a:endParaRPr lang="it-IT"/>
           </a:p>
@@ -2248,7 +2248,7 @@
           <p:cNvPr id="3" name="Segnaposto piè di pagina 2">
             <a:extLst>
               <a:ext uri="{FF2B5EF4-FFF2-40B4-BE49-F238E27FC236}">
-                <a16:creationId xmlns:a16="http://schemas.microsoft.com/office/drawing/2014/main" id="{992E87C0-E01E-4B5D-B829-69CEB0DB0D77}"/>
+                <a16:creationId xmlns="" xmlns:a16="http://schemas.microsoft.com/office/drawing/2014/main" id="{992E87C0-E01E-4B5D-B829-69CEB0DB0D77}"/>
               </a:ext>
             </a:extLst>
           </p:cNvPr>
@@ -2273,7 +2273,7 @@
           <p:cNvPr id="4" name="Segnaposto numero diapositiva 3">
             <a:extLst>
               <a:ext uri="{FF2B5EF4-FFF2-40B4-BE49-F238E27FC236}">
-                <a16:creationId xmlns:a16="http://schemas.microsoft.com/office/drawing/2014/main" id="{F7867DD9-A762-457F-A406-B864D98AA788}"/>
+                <a16:creationId xmlns="" xmlns:a16="http://schemas.microsoft.com/office/drawing/2014/main" id="{F7867DD9-A762-457F-A406-B864D98AA788}"/>
               </a:ext>
             </a:extLst>
           </p:cNvPr>
@@ -2332,7 +2332,7 @@
           <p:cNvPr id="2" name="Titolo 1">
             <a:extLst>
               <a:ext uri="{FF2B5EF4-FFF2-40B4-BE49-F238E27FC236}">
-                <a16:creationId xmlns:a16="http://schemas.microsoft.com/office/drawing/2014/main" id="{76124E57-2EC1-4A69-8B20-E15B6D22940F}"/>
+                <a16:creationId xmlns="" xmlns:a16="http://schemas.microsoft.com/office/drawing/2014/main" id="{76124E57-2EC1-4A69-8B20-E15B6D22940F}"/>
               </a:ext>
             </a:extLst>
           </p:cNvPr>
@@ -2369,7 +2369,7 @@
           <p:cNvPr id="3" name="Segnaposto contenuto 2">
             <a:extLst>
               <a:ext uri="{FF2B5EF4-FFF2-40B4-BE49-F238E27FC236}">
-                <a16:creationId xmlns:a16="http://schemas.microsoft.com/office/drawing/2014/main" id="{734D8066-1E08-4CE8-983F-9BBA87274CC7}"/>
+                <a16:creationId xmlns="" xmlns:a16="http://schemas.microsoft.com/office/drawing/2014/main" id="{734D8066-1E08-4CE8-983F-9BBA87274CC7}"/>
               </a:ext>
             </a:extLst>
           </p:cNvPr>
@@ -2459,7 +2459,7 @@
           <p:cNvPr id="4" name="Segnaposto testo 3">
             <a:extLst>
               <a:ext uri="{FF2B5EF4-FFF2-40B4-BE49-F238E27FC236}">
-                <a16:creationId xmlns:a16="http://schemas.microsoft.com/office/drawing/2014/main" id="{F3FA6396-D906-40C8-AE24-510E2F78C7FE}"/>
+                <a16:creationId xmlns="" xmlns:a16="http://schemas.microsoft.com/office/drawing/2014/main" id="{F3FA6396-D906-40C8-AE24-510E2F78C7FE}"/>
               </a:ext>
             </a:extLst>
           </p:cNvPr>
@@ -2530,7 +2530,7 @@
           <p:cNvPr id="5" name="Segnaposto data 4">
             <a:extLst>
               <a:ext uri="{FF2B5EF4-FFF2-40B4-BE49-F238E27FC236}">
-                <a16:creationId xmlns:a16="http://schemas.microsoft.com/office/drawing/2014/main" id="{BAA5942A-3BCE-4482-8A5C-CD97772E8976}"/>
+                <a16:creationId xmlns="" xmlns:a16="http://schemas.microsoft.com/office/drawing/2014/main" id="{BAA5942A-3BCE-4482-8A5C-CD97772E8976}"/>
               </a:ext>
             </a:extLst>
           </p:cNvPr>
@@ -2548,7 +2548,7 @@
           <a:p>
             <a:fld id="{F7D71F90-2C6D-44F6-A1F9-0B80B911F8CA}" type="datetimeFigureOut">
               <a:rPr lang="it-IT" smtClean="0"/>
-              <a:t>02/01/2020</a:t>
+              <a:t>08/01/2020</a:t>
             </a:fld>
             <a:endParaRPr lang="it-IT"/>
           </a:p>
@@ -2559,7 +2559,7 @@
           <p:cNvPr id="6" name="Segnaposto piè di pagina 5">
             <a:extLst>
               <a:ext uri="{FF2B5EF4-FFF2-40B4-BE49-F238E27FC236}">
-                <a16:creationId xmlns:a16="http://schemas.microsoft.com/office/drawing/2014/main" id="{99420126-9AFA-4777-BFF5-366C09F8B32E}"/>
+                <a16:creationId xmlns="" xmlns:a16="http://schemas.microsoft.com/office/drawing/2014/main" id="{99420126-9AFA-4777-BFF5-366C09F8B32E}"/>
               </a:ext>
             </a:extLst>
           </p:cNvPr>
@@ -2584,7 +2584,7 @@
           <p:cNvPr id="7" name="Segnaposto numero diapositiva 6">
             <a:extLst>
               <a:ext uri="{FF2B5EF4-FFF2-40B4-BE49-F238E27FC236}">
-                <a16:creationId xmlns:a16="http://schemas.microsoft.com/office/drawing/2014/main" id="{87996299-B8B2-4606-A686-94BC7B31D834}"/>
+                <a16:creationId xmlns="" xmlns:a16="http://schemas.microsoft.com/office/drawing/2014/main" id="{87996299-B8B2-4606-A686-94BC7B31D834}"/>
               </a:ext>
             </a:extLst>
           </p:cNvPr>
@@ -2643,7 +2643,7 @@
           <p:cNvPr id="2" name="Titolo 1">
             <a:extLst>
               <a:ext uri="{FF2B5EF4-FFF2-40B4-BE49-F238E27FC236}">
-                <a16:creationId xmlns:a16="http://schemas.microsoft.com/office/drawing/2014/main" id="{B966293D-979C-4064-9F2B-6124C51E68FE}"/>
+                <a16:creationId xmlns="" xmlns:a16="http://schemas.microsoft.com/office/drawing/2014/main" id="{B966293D-979C-4064-9F2B-6124C51E68FE}"/>
               </a:ext>
             </a:extLst>
           </p:cNvPr>
@@ -2680,7 +2680,7 @@
           <p:cNvPr id="3" name="Segnaposto immagine 2">
             <a:extLst>
               <a:ext uri="{FF2B5EF4-FFF2-40B4-BE49-F238E27FC236}">
-                <a16:creationId xmlns:a16="http://schemas.microsoft.com/office/drawing/2014/main" id="{6A8C2EA0-142A-454E-BAAB-7C4485D60299}"/>
+                <a16:creationId xmlns="" xmlns:a16="http://schemas.microsoft.com/office/drawing/2014/main" id="{6A8C2EA0-142A-454E-BAAB-7C4485D60299}"/>
               </a:ext>
             </a:extLst>
           </p:cNvPr>
@@ -2747,7 +2747,7 @@
           <p:cNvPr id="4" name="Segnaposto testo 3">
             <a:extLst>
               <a:ext uri="{FF2B5EF4-FFF2-40B4-BE49-F238E27FC236}">
-                <a16:creationId xmlns:a16="http://schemas.microsoft.com/office/drawing/2014/main" id="{41AB84A7-19D9-44FE-8513-77CAF35AA7C2}"/>
+                <a16:creationId xmlns="" xmlns:a16="http://schemas.microsoft.com/office/drawing/2014/main" id="{41AB84A7-19D9-44FE-8513-77CAF35AA7C2}"/>
               </a:ext>
             </a:extLst>
           </p:cNvPr>
@@ -2818,7 +2818,7 @@
           <p:cNvPr id="5" name="Segnaposto data 4">
             <a:extLst>
               <a:ext uri="{FF2B5EF4-FFF2-40B4-BE49-F238E27FC236}">
-                <a16:creationId xmlns:a16="http://schemas.microsoft.com/office/drawing/2014/main" id="{8BE837FD-91EA-47CC-A6A0-F23A450D108C}"/>
+                <a16:creationId xmlns="" xmlns:a16="http://schemas.microsoft.com/office/drawing/2014/main" id="{8BE837FD-91EA-47CC-A6A0-F23A450D108C}"/>
               </a:ext>
             </a:extLst>
           </p:cNvPr>
@@ -2836,7 +2836,7 @@
           <a:p>
             <a:fld id="{F7D71F90-2C6D-44F6-A1F9-0B80B911F8CA}" type="datetimeFigureOut">
               <a:rPr lang="it-IT" smtClean="0"/>
-              <a:t>02/01/2020</a:t>
+              <a:t>08/01/2020</a:t>
             </a:fld>
             <a:endParaRPr lang="it-IT"/>
           </a:p>
@@ -2847,7 +2847,7 @@
           <p:cNvPr id="6" name="Segnaposto piè di pagina 5">
             <a:extLst>
               <a:ext uri="{FF2B5EF4-FFF2-40B4-BE49-F238E27FC236}">
-                <a16:creationId xmlns:a16="http://schemas.microsoft.com/office/drawing/2014/main" id="{81B3C88D-C08B-4A45-BF0D-04C3264EB32A}"/>
+                <a16:creationId xmlns="" xmlns:a16="http://schemas.microsoft.com/office/drawing/2014/main" id="{81B3C88D-C08B-4A45-BF0D-04C3264EB32A}"/>
               </a:ext>
             </a:extLst>
           </p:cNvPr>
@@ -2872,7 +2872,7 @@
           <p:cNvPr id="7" name="Segnaposto numero diapositiva 6">
             <a:extLst>
               <a:ext uri="{FF2B5EF4-FFF2-40B4-BE49-F238E27FC236}">
-                <a16:creationId xmlns:a16="http://schemas.microsoft.com/office/drawing/2014/main" id="{C35DA505-C2B5-4A20-A0ED-32D6B7B4CE44}"/>
+                <a16:creationId xmlns="" xmlns:a16="http://schemas.microsoft.com/office/drawing/2014/main" id="{C35DA505-C2B5-4A20-A0ED-32D6B7B4CE44}"/>
               </a:ext>
             </a:extLst>
           </p:cNvPr>
@@ -2936,7 +2936,7 @@
           <p:cNvPr id="2" name="Segnaposto titolo 1">
             <a:extLst>
               <a:ext uri="{FF2B5EF4-FFF2-40B4-BE49-F238E27FC236}">
-                <a16:creationId xmlns:a16="http://schemas.microsoft.com/office/drawing/2014/main" id="{4B1D921F-2C48-4285-A8BD-792591D929C6}"/>
+                <a16:creationId xmlns="" xmlns:a16="http://schemas.microsoft.com/office/drawing/2014/main" id="{4B1D921F-2C48-4285-A8BD-792591D929C6}"/>
               </a:ext>
             </a:extLst>
           </p:cNvPr>
@@ -2974,7 +2974,7 @@
           <p:cNvPr id="3" name="Segnaposto testo 2">
             <a:extLst>
               <a:ext uri="{FF2B5EF4-FFF2-40B4-BE49-F238E27FC236}">
-                <a16:creationId xmlns:a16="http://schemas.microsoft.com/office/drawing/2014/main" id="{518CFD04-AD80-4442-9D20-77C3C390CCFF}"/>
+                <a16:creationId xmlns="" xmlns:a16="http://schemas.microsoft.com/office/drawing/2014/main" id="{518CFD04-AD80-4442-9D20-77C3C390CCFF}"/>
               </a:ext>
             </a:extLst>
           </p:cNvPr>
@@ -3041,7 +3041,7 @@
           <p:cNvPr id="4" name="Segnaposto data 3">
             <a:extLst>
               <a:ext uri="{FF2B5EF4-FFF2-40B4-BE49-F238E27FC236}">
-                <a16:creationId xmlns:a16="http://schemas.microsoft.com/office/drawing/2014/main" id="{2D1ACE57-994B-471D-A0C5-61CE109C7E59}"/>
+                <a16:creationId xmlns="" xmlns:a16="http://schemas.microsoft.com/office/drawing/2014/main" id="{2D1ACE57-994B-471D-A0C5-61CE109C7E59}"/>
               </a:ext>
             </a:extLst>
           </p:cNvPr>
@@ -3077,7 +3077,7 @@
           <a:p>
             <a:fld id="{F7D71F90-2C6D-44F6-A1F9-0B80B911F8CA}" type="datetimeFigureOut">
               <a:rPr lang="it-IT" smtClean="0"/>
-              <a:t>02/01/2020</a:t>
+              <a:t>08/01/2020</a:t>
             </a:fld>
             <a:endParaRPr lang="it-IT"/>
           </a:p>
@@ -3088,7 +3088,7 @@
           <p:cNvPr id="5" name="Segnaposto piè di pagina 4">
             <a:extLst>
               <a:ext uri="{FF2B5EF4-FFF2-40B4-BE49-F238E27FC236}">
-                <a16:creationId xmlns:a16="http://schemas.microsoft.com/office/drawing/2014/main" id="{311C4A1E-1E5A-4141-9735-E37F71E2C7B0}"/>
+                <a16:creationId xmlns="" xmlns:a16="http://schemas.microsoft.com/office/drawing/2014/main" id="{311C4A1E-1E5A-4141-9735-E37F71E2C7B0}"/>
               </a:ext>
             </a:extLst>
           </p:cNvPr>
@@ -3131,7 +3131,7 @@
           <p:cNvPr id="6" name="Segnaposto numero diapositiva 5">
             <a:extLst>
               <a:ext uri="{FF2B5EF4-FFF2-40B4-BE49-F238E27FC236}">
-                <a16:creationId xmlns:a16="http://schemas.microsoft.com/office/drawing/2014/main" id="{5C64D511-420E-43E5-BCD4-81BC958B8929}"/>
+                <a16:creationId xmlns="" xmlns:a16="http://schemas.microsoft.com/office/drawing/2014/main" id="{5C64D511-420E-43E5-BCD4-81BC958B8929}"/>
               </a:ext>
             </a:extLst>
           </p:cNvPr>
@@ -3507,10 +3507,10 @@
           <p:cNvPr id="17" name="Rectangle 16">
             <a:extLst>
               <a:ext uri="{FF2B5EF4-FFF2-40B4-BE49-F238E27FC236}">
-                <a16:creationId xmlns:a16="http://schemas.microsoft.com/office/drawing/2014/main" id="{CDA1A2E9-63FE-408D-A803-8E306ECAB4B3}"/>
+                <a16:creationId xmlns="" xmlns:a16="http://schemas.microsoft.com/office/drawing/2014/main" id="{CDA1A2E9-63FE-408D-A803-8E306ECAB4B3}"/>
               </a:ext>
               <a:ext uri="{C183D7F6-B498-43B3-948B-1728B52AA6E4}">
-                <adec:decorative xmlns:adec="http://schemas.microsoft.com/office/drawing/2017/decorative" val="1"/>
+                <adec:decorative xmlns="" xmlns:adec="http://schemas.microsoft.com/office/drawing/2017/decorative" val="1"/>
               </a:ext>
             </a:extLst>
           </p:cNvPr>
@@ -3520,7 +3520,7 @@
           <p:nvPr>
             <p:extLst>
               <p:ext uri="{386F3935-93C4-4BCD-93E2-E3B085C9AB24}">
-                <p16:designElem xmlns:p16="http://schemas.microsoft.com/office/powerpoint/2015/main" val="1"/>
+                <p16:designElem xmlns="" xmlns:p16="http://schemas.microsoft.com/office/powerpoint/2015/main" val="1"/>
               </p:ext>
             </p:extLst>
           </p:nvPr>
@@ -3599,7 +3599,7 @@
           <p:cNvPr id="2" name="Titolo 1">
             <a:extLst>
               <a:ext uri="{FF2B5EF4-FFF2-40B4-BE49-F238E27FC236}">
-                <a16:creationId xmlns:a16="http://schemas.microsoft.com/office/drawing/2014/main" id="{DCBAC149-DB9F-4874-BC24-7F077AA4B78D}"/>
+                <a16:creationId xmlns="" xmlns:a16="http://schemas.microsoft.com/office/drawing/2014/main" id="{DCBAC149-DB9F-4874-BC24-7F077AA4B78D}"/>
               </a:ext>
             </a:extLst>
           </p:cNvPr>
@@ -3639,10 +3639,10 @@
           <p:cNvPr id="19" name="Rectangle 18">
             <a:extLst>
               <a:ext uri="{FF2B5EF4-FFF2-40B4-BE49-F238E27FC236}">
-                <a16:creationId xmlns:a16="http://schemas.microsoft.com/office/drawing/2014/main" id="{927CAFC9-A675-4314-84EF-236FFA58A3F2}"/>
+                <a16:creationId xmlns="" xmlns:a16="http://schemas.microsoft.com/office/drawing/2014/main" id="{927CAFC9-A675-4314-84EF-236FFA58A3F2}"/>
               </a:ext>
               <a:ext uri="{C183D7F6-B498-43B3-948B-1728B52AA6E4}">
-                <adec:decorative xmlns:adec="http://schemas.microsoft.com/office/drawing/2017/decorative" val="1"/>
+                <adec:decorative xmlns="" xmlns:adec="http://schemas.microsoft.com/office/drawing/2017/decorative" val="1"/>
               </a:ext>
             </a:extLst>
           </p:cNvPr>
@@ -3652,7 +3652,7 @@
           <p:nvPr>
             <p:extLst>
               <p:ext uri="{386F3935-93C4-4BCD-93E2-E3B085C9AB24}">
-                <p16:designElem xmlns:p16="http://schemas.microsoft.com/office/powerpoint/2015/main" val="1"/>
+                <p16:designElem xmlns="" xmlns:p16="http://schemas.microsoft.com/office/powerpoint/2015/main" val="1"/>
               </p:ext>
             </p:extLst>
           </p:nvPr>
@@ -3733,10 +3733,10 @@
           <p:cNvPr id="21" name="Rectangle 20">
             <a:extLst>
               <a:ext uri="{FF2B5EF4-FFF2-40B4-BE49-F238E27FC236}">
-                <a16:creationId xmlns:a16="http://schemas.microsoft.com/office/drawing/2014/main" id="{FBE9F90C-C163-435B-9A68-D15C92D1CF2B}"/>
+                <a16:creationId xmlns="" xmlns:a16="http://schemas.microsoft.com/office/drawing/2014/main" id="{FBE9F90C-C163-435B-9A68-D15C92D1CF2B}"/>
               </a:ext>
               <a:ext uri="{C183D7F6-B498-43B3-948B-1728B52AA6E4}">
-                <adec:decorative xmlns:adec="http://schemas.microsoft.com/office/drawing/2017/decorative" val="1"/>
+                <adec:decorative xmlns="" xmlns:adec="http://schemas.microsoft.com/office/drawing/2017/decorative" val="1"/>
               </a:ext>
             </a:extLst>
           </p:cNvPr>
@@ -3746,7 +3746,7 @@
           <p:nvPr>
             <p:extLst>
               <p:ext uri="{386F3935-93C4-4BCD-93E2-E3B085C9AB24}">
-                <p16:designElem xmlns:p16="http://schemas.microsoft.com/office/powerpoint/2015/main" val="1"/>
+                <p16:designElem xmlns="" xmlns:p16="http://schemas.microsoft.com/office/powerpoint/2015/main" val="1"/>
               </p:ext>
             </p:extLst>
           </p:nvPr>
@@ -3827,7 +3827,7 @@
           <p:cNvPr id="3" name="Sottotitolo 2">
             <a:extLst>
               <a:ext uri="{FF2B5EF4-FFF2-40B4-BE49-F238E27FC236}">
-                <a16:creationId xmlns:a16="http://schemas.microsoft.com/office/drawing/2014/main" id="{B9F686C4-B595-4CDD-8233-91A53C48A369}"/>
+                <a16:creationId xmlns="" xmlns:a16="http://schemas.microsoft.com/office/drawing/2014/main" id="{B9F686C4-B595-4CDD-8233-91A53C48A369}"/>
               </a:ext>
             </a:extLst>
           </p:cNvPr>
@@ -3867,10 +3867,10 @@
           <p:cNvPr id="23" name="Rectangle 22">
             <a:extLst>
               <a:ext uri="{FF2B5EF4-FFF2-40B4-BE49-F238E27FC236}">
-                <a16:creationId xmlns:a16="http://schemas.microsoft.com/office/drawing/2014/main" id="{1A882A9F-F4E9-4E23-8F0B-20B5DF42EAA9}"/>
+                <a16:creationId xmlns="" xmlns:a16="http://schemas.microsoft.com/office/drawing/2014/main" id="{1A882A9F-F4E9-4E23-8F0B-20B5DF42EAA9}"/>
               </a:ext>
               <a:ext uri="{C183D7F6-B498-43B3-948B-1728B52AA6E4}">
-                <adec:decorative xmlns:adec="http://schemas.microsoft.com/office/drawing/2017/decorative" val="1"/>
+                <adec:decorative xmlns="" xmlns:adec="http://schemas.microsoft.com/office/drawing/2017/decorative" val="1"/>
               </a:ext>
             </a:extLst>
           </p:cNvPr>
@@ -3880,7 +3880,7 @@
           <p:nvPr>
             <p:extLst>
               <p:ext uri="{386F3935-93C4-4BCD-93E2-E3B085C9AB24}">
-                <p16:designElem xmlns:p16="http://schemas.microsoft.com/office/powerpoint/2015/main" val="1"/>
+                <p16:designElem xmlns="" xmlns:p16="http://schemas.microsoft.com/office/powerpoint/2015/main" val="1"/>
               </p:ext>
             </p:extLst>
           </p:nvPr>
@@ -3961,7 +3961,7 @@
           <p:cNvPr id="14" name="Graphic 13">
             <a:extLst>
               <a:ext uri="{FF2B5EF4-FFF2-40B4-BE49-F238E27FC236}">
-                <a16:creationId xmlns:a16="http://schemas.microsoft.com/office/drawing/2014/main" id="{9B8EFA56-2723-45F2-A2E6-46A6F60F1984}"/>
+                <a16:creationId xmlns="" xmlns:a16="http://schemas.microsoft.com/office/drawing/2014/main" id="{9B8EFA56-2723-45F2-A2E6-46A6F60F1984}"/>
               </a:ext>
             </a:extLst>
           </p:cNvPr>
@@ -3977,7 +3977,7 @@
                 <a14:useLocalDpi xmlns:a14="http://schemas.microsoft.com/office/drawing/2010/main" val="0"/>
               </a:ext>
               <a:ext uri="{96DAC541-7B7A-43D3-8B79-37D633B846F1}">
-                <asvg:svgBlip xmlns:asvg="http://schemas.microsoft.com/office/drawing/2016/SVG/main" r:embed="rId3"/>
+                <asvg:svgBlip xmlns="" xmlns:asvg="http://schemas.microsoft.com/office/drawing/2016/SVG/main" r:embed="rId3"/>
               </a:ext>
             </a:extLst>
           </a:blip>
@@ -4030,7 +4030,7 @@
           <p:cNvPr id="2" name="Titolo 1">
             <a:extLst>
               <a:ext uri="{FF2B5EF4-FFF2-40B4-BE49-F238E27FC236}">
-                <a16:creationId xmlns:a16="http://schemas.microsoft.com/office/drawing/2014/main" id="{B7EC37DD-9E0C-4C6E-A811-00302AD6EACB}"/>
+                <a16:creationId xmlns="" xmlns:a16="http://schemas.microsoft.com/office/drawing/2014/main" id="{B7EC37DD-9E0C-4C6E-A811-00302AD6EACB}"/>
               </a:ext>
             </a:extLst>
           </p:cNvPr>
@@ -4063,7 +4063,7 @@
           <p:cNvPr id="4" name="Tabella 4">
             <a:extLst>
               <a:ext uri="{FF2B5EF4-FFF2-40B4-BE49-F238E27FC236}">
-                <a16:creationId xmlns:a16="http://schemas.microsoft.com/office/drawing/2014/main" id="{043F75E0-1B48-4C2E-8ADF-C8441714A81A}"/>
+                <a16:creationId xmlns="" xmlns:a16="http://schemas.microsoft.com/office/drawing/2014/main" id="{043F75E0-1B48-4C2E-8ADF-C8441714A81A}"/>
               </a:ext>
             </a:extLst>
           </p:cNvPr>
@@ -4074,7 +4074,7 @@
             <p:ph idx="1"/>
             <p:extLst>
               <p:ext uri="{D42A27DB-BD31-4B8C-83A1-F6EECF244321}">
-                <p14:modId xmlns:p14="http://schemas.microsoft.com/office/powerpoint/2010/main" val="1354309838"/>
+                <p14:modId xmlns:p14="http://schemas.microsoft.com/office/powerpoint/2010/main" val="1843994675"/>
               </p:ext>
             </p:extLst>
           </p:nvPr>
@@ -4093,14 +4093,14 @@
                 <a:gridCol w="2483498">
                   <a:extLst>
                     <a:ext uri="{9D8B030D-6E8A-4147-A177-3AD203B41FA5}">
-                      <a16:colId xmlns:a16="http://schemas.microsoft.com/office/drawing/2014/main" val="414173828"/>
+                      <a16:colId xmlns="" xmlns:a16="http://schemas.microsoft.com/office/drawing/2014/main" val="414173828"/>
                     </a:ext>
                   </a:extLst>
                 </a:gridCol>
                 <a:gridCol w="8032102">
                   <a:extLst>
                     <a:ext uri="{9D8B030D-6E8A-4147-A177-3AD203B41FA5}">
-                      <a16:colId xmlns:a16="http://schemas.microsoft.com/office/drawing/2014/main" val="418542194"/>
+                      <a16:colId xmlns="" xmlns:a16="http://schemas.microsoft.com/office/drawing/2014/main" val="418542194"/>
                     </a:ext>
                   </a:extLst>
                 </a:gridCol>
@@ -4134,7 +4134,7 @@
                 </a:tc>
                 <a:extLst>
                   <a:ext uri="{0D108BD9-81ED-4DB2-BD59-A6C34878D82A}">
-                    <a16:rowId xmlns:a16="http://schemas.microsoft.com/office/drawing/2014/main" val="246340804"/>
+                    <a16:rowId xmlns="" xmlns:a16="http://schemas.microsoft.com/office/drawing/2014/main" val="246340804"/>
                   </a:ext>
                 </a:extLst>
               </a:tr>
@@ -4168,7 +4168,7 @@
                 </a:tc>
                 <a:extLst>
                   <a:ext uri="{0D108BD9-81ED-4DB2-BD59-A6C34878D82A}">
-                    <a16:rowId xmlns:a16="http://schemas.microsoft.com/office/drawing/2014/main" val="2368987764"/>
+                    <a16:rowId xmlns="" xmlns:a16="http://schemas.microsoft.com/office/drawing/2014/main" val="2368987764"/>
                   </a:ext>
                 </a:extLst>
               </a:tr>
@@ -4201,7 +4201,7 @@
                 </a:tc>
                 <a:extLst>
                   <a:ext uri="{0D108BD9-81ED-4DB2-BD59-A6C34878D82A}">
-                    <a16:rowId xmlns:a16="http://schemas.microsoft.com/office/drawing/2014/main" val="301388857"/>
+                    <a16:rowId xmlns="" xmlns:a16="http://schemas.microsoft.com/office/drawing/2014/main" val="301388857"/>
                   </a:ext>
                 </a:extLst>
               </a:tr>
@@ -4239,7 +4239,7 @@
                 </a:tc>
                 <a:extLst>
                   <a:ext uri="{0D108BD9-81ED-4DB2-BD59-A6C34878D82A}">
-                    <a16:rowId xmlns:a16="http://schemas.microsoft.com/office/drawing/2014/main" val="2333084500"/>
+                    <a16:rowId xmlns="" xmlns:a16="http://schemas.microsoft.com/office/drawing/2014/main" val="2333084500"/>
                   </a:ext>
                 </a:extLst>
               </a:tr>
@@ -4263,16 +4263,17 @@
                     <a:lstStyle/>
                     <a:p>
                       <a:r>
-                        <a:rPr lang="it-IT" dirty="0"/>
-                        <a:t>19/12/2019</a:t>
-                      </a:r>
+                        <a:rPr lang="it-IT" dirty="0" smtClean="0"/>
+                        <a:t>08/01/2020</a:t>
+                      </a:r>
+                      <a:endParaRPr lang="it-IT" dirty="0"/>
                     </a:p>
                   </a:txBody>
                   <a:tcPr/>
                 </a:tc>
                 <a:extLst>
                   <a:ext uri="{0D108BD9-81ED-4DB2-BD59-A6C34878D82A}">
-                    <a16:rowId xmlns:a16="http://schemas.microsoft.com/office/drawing/2014/main" val="2773735045"/>
+                    <a16:rowId xmlns="" xmlns:a16="http://schemas.microsoft.com/office/drawing/2014/main" val="2773735045"/>
                   </a:ext>
                 </a:extLst>
               </a:tr>
@@ -4301,15 +4302,28 @@
                       </a:r>
                       <a:r>
                         <a:rPr lang="it-IT" dirty="0"/>
-                        <a:t>, Sabbatini</a:t>
-                      </a:r>
+                        <a:t>, </a:t>
+                      </a:r>
+                      <a:r>
+                        <a:rPr lang="it-IT" dirty="0" smtClean="0"/>
+                        <a:t>Sabbatini</a:t>
+                      </a:r>
+                      <a:r>
+                        <a:rPr lang="it-IT" dirty="0" smtClean="0"/>
+                        <a:t>, </a:t>
+                      </a:r>
+                      <a:r>
+                        <a:rPr lang="it-IT" dirty="0" err="1" smtClean="0"/>
+                        <a:t>Barzaghi</a:t>
+                      </a:r>
+                      <a:endParaRPr lang="it-IT" dirty="0"/>
                     </a:p>
                   </a:txBody>
                   <a:tcPr/>
                 </a:tc>
                 <a:extLst>
                   <a:ext uri="{0D108BD9-81ED-4DB2-BD59-A6C34878D82A}">
-                    <a16:rowId xmlns:a16="http://schemas.microsoft.com/office/drawing/2014/main" val="3315426333"/>
+                    <a16:rowId xmlns="" xmlns:a16="http://schemas.microsoft.com/office/drawing/2014/main" val="3315426333"/>
                   </a:ext>
                 </a:extLst>
               </a:tr>
@@ -4343,7 +4357,7 @@
                 </a:tc>
                 <a:extLst>
                   <a:ext uri="{0D108BD9-81ED-4DB2-BD59-A6C34878D82A}">
-                    <a16:rowId xmlns:a16="http://schemas.microsoft.com/office/drawing/2014/main" val="833276135"/>
+                    <a16:rowId xmlns="" xmlns:a16="http://schemas.microsoft.com/office/drawing/2014/main" val="833276135"/>
                   </a:ext>
                 </a:extLst>
               </a:tr>
@@ -4376,7 +4390,7 @@
                 </a:tc>
                 <a:extLst>
                   <a:ext uri="{0D108BD9-81ED-4DB2-BD59-A6C34878D82A}">
-                    <a16:rowId xmlns:a16="http://schemas.microsoft.com/office/drawing/2014/main" val="1615278520"/>
+                    <a16:rowId xmlns="" xmlns:a16="http://schemas.microsoft.com/office/drawing/2014/main" val="1615278520"/>
                   </a:ext>
                 </a:extLst>
               </a:tr>
@@ -4389,7 +4403,7 @@
           <p:cNvPr id="7" name="Elemento grafico 6" descr="Informazioni">
             <a:extLst>
               <a:ext uri="{FF2B5EF4-FFF2-40B4-BE49-F238E27FC236}">
-                <a16:creationId xmlns:a16="http://schemas.microsoft.com/office/drawing/2014/main" id="{53D936C3-6DDC-4194-987E-7AE9EFD9723F}"/>
+                <a16:creationId xmlns="" xmlns:a16="http://schemas.microsoft.com/office/drawing/2014/main" id="{53D936C3-6DDC-4194-987E-7AE9EFD9723F}"/>
               </a:ext>
             </a:extLst>
           </p:cNvPr>
@@ -4405,7 +4419,7 @@
                 <a14:useLocalDpi xmlns:a14="http://schemas.microsoft.com/office/drawing/2010/main" val="0"/>
               </a:ext>
               <a:ext uri="{96DAC541-7B7A-43D3-8B79-37D633B846F1}">
-                <asvg:svgBlip xmlns:asvg="http://schemas.microsoft.com/office/drawing/2016/SVG/main" r:embed="rId3"/>
+                <asvg:svgBlip xmlns="" xmlns:asvg="http://schemas.microsoft.com/office/drawing/2016/SVG/main" r:embed="rId3"/>
               </a:ext>
             </a:extLst>
           </a:blip>
@@ -4458,7 +4472,7 @@
           <p:cNvPr id="2" name="Titolo 1">
             <a:extLst>
               <a:ext uri="{FF2B5EF4-FFF2-40B4-BE49-F238E27FC236}">
-                <a16:creationId xmlns:a16="http://schemas.microsoft.com/office/drawing/2014/main" id="{FF61BD71-50E0-44C1-A558-965A7ABC70AD}"/>
+                <a16:creationId xmlns="" xmlns:a16="http://schemas.microsoft.com/office/drawing/2014/main" id="{FF61BD71-50E0-44C1-A558-965A7ABC70AD}"/>
               </a:ext>
             </a:extLst>
           </p:cNvPr>
@@ -4486,7 +4500,7 @@
           <p:cNvPr id="4" name="Tabella 4">
             <a:extLst>
               <a:ext uri="{FF2B5EF4-FFF2-40B4-BE49-F238E27FC236}">
-                <a16:creationId xmlns:a16="http://schemas.microsoft.com/office/drawing/2014/main" id="{0BC89AA1-366F-4BE5-824E-0153DB6DF5C3}"/>
+                <a16:creationId xmlns="" xmlns:a16="http://schemas.microsoft.com/office/drawing/2014/main" id="{0BC89AA1-366F-4BE5-824E-0153DB6DF5C3}"/>
               </a:ext>
             </a:extLst>
           </p:cNvPr>
@@ -4516,14 +4530,14 @@
                 <a:gridCol w="2866053">
                   <a:extLst>
                     <a:ext uri="{9D8B030D-6E8A-4147-A177-3AD203B41FA5}">
-                      <a16:colId xmlns:a16="http://schemas.microsoft.com/office/drawing/2014/main" val="3900888184"/>
+                      <a16:colId xmlns="" xmlns:a16="http://schemas.microsoft.com/office/drawing/2014/main" val="3900888184"/>
                     </a:ext>
                   </a:extLst>
                 </a:gridCol>
                 <a:gridCol w="7649547">
                   <a:extLst>
                     <a:ext uri="{9D8B030D-6E8A-4147-A177-3AD203B41FA5}">
-                      <a16:colId xmlns:a16="http://schemas.microsoft.com/office/drawing/2014/main" val="2392364571"/>
+                      <a16:colId xmlns="" xmlns:a16="http://schemas.microsoft.com/office/drawing/2014/main" val="2392364571"/>
                     </a:ext>
                   </a:extLst>
                 </a:gridCol>
@@ -4570,7 +4584,7 @@
                 </a:tc>
                 <a:extLst>
                   <a:ext uri="{0D108BD9-81ED-4DB2-BD59-A6C34878D82A}">
-                    <a16:rowId xmlns:a16="http://schemas.microsoft.com/office/drawing/2014/main" val="2750207453"/>
+                    <a16:rowId xmlns="" xmlns:a16="http://schemas.microsoft.com/office/drawing/2014/main" val="2750207453"/>
                   </a:ext>
                 </a:extLst>
               </a:tr>
@@ -4603,7 +4617,7 @@
                 </a:tc>
                 <a:extLst>
                   <a:ext uri="{0D108BD9-81ED-4DB2-BD59-A6C34878D82A}">
-                    <a16:rowId xmlns:a16="http://schemas.microsoft.com/office/drawing/2014/main" val="43365482"/>
+                    <a16:rowId xmlns="" xmlns:a16="http://schemas.microsoft.com/office/drawing/2014/main" val="43365482"/>
                   </a:ext>
                 </a:extLst>
               </a:tr>
@@ -4641,7 +4655,7 @@
                 </a:tc>
                 <a:extLst>
                   <a:ext uri="{0D108BD9-81ED-4DB2-BD59-A6C34878D82A}">
-                    <a16:rowId xmlns:a16="http://schemas.microsoft.com/office/drawing/2014/main" val="1813106428"/>
+                    <a16:rowId xmlns="" xmlns:a16="http://schemas.microsoft.com/office/drawing/2014/main" val="1813106428"/>
                   </a:ext>
                 </a:extLst>
               </a:tr>
@@ -4675,7 +4689,7 @@
                 </a:tc>
                 <a:extLst>
                   <a:ext uri="{0D108BD9-81ED-4DB2-BD59-A6C34878D82A}">
-                    <a16:rowId xmlns:a16="http://schemas.microsoft.com/office/drawing/2014/main" val="4265491522"/>
+                    <a16:rowId xmlns="" xmlns:a16="http://schemas.microsoft.com/office/drawing/2014/main" val="4265491522"/>
                   </a:ext>
                 </a:extLst>
               </a:tr>
@@ -4708,7 +4722,7 @@
                 </a:tc>
                 <a:extLst>
                   <a:ext uri="{0D108BD9-81ED-4DB2-BD59-A6C34878D82A}">
-                    <a16:rowId xmlns:a16="http://schemas.microsoft.com/office/drawing/2014/main" val="1759204447"/>
+                    <a16:rowId xmlns="" xmlns:a16="http://schemas.microsoft.com/office/drawing/2014/main" val="1759204447"/>
                   </a:ext>
                 </a:extLst>
               </a:tr>
@@ -4750,7 +4764,7 @@
                 </a:tc>
                 <a:extLst>
                   <a:ext uri="{0D108BD9-81ED-4DB2-BD59-A6C34878D82A}">
-                    <a16:rowId xmlns:a16="http://schemas.microsoft.com/office/drawing/2014/main" val="4176074482"/>
+                    <a16:rowId xmlns="" xmlns:a16="http://schemas.microsoft.com/office/drawing/2014/main" val="4176074482"/>
                   </a:ext>
                 </a:extLst>
               </a:tr>
@@ -4788,7 +4802,7 @@
                 </a:tc>
                 <a:extLst>
                   <a:ext uri="{0D108BD9-81ED-4DB2-BD59-A6C34878D82A}">
-                    <a16:rowId xmlns:a16="http://schemas.microsoft.com/office/drawing/2014/main" val="2176725863"/>
+                    <a16:rowId xmlns="" xmlns:a16="http://schemas.microsoft.com/office/drawing/2014/main" val="2176725863"/>
                   </a:ext>
                 </a:extLst>
               </a:tr>
@@ -4801,7 +4815,7 @@
           <p:cNvPr id="7" name="Elemento grafico 6" descr="Alta tensione">
             <a:extLst>
               <a:ext uri="{FF2B5EF4-FFF2-40B4-BE49-F238E27FC236}">
-                <a16:creationId xmlns:a16="http://schemas.microsoft.com/office/drawing/2014/main" id="{4BC6B4F9-BBF9-493A-8CEC-E6BC93390131}"/>
+                <a16:creationId xmlns="" xmlns:a16="http://schemas.microsoft.com/office/drawing/2014/main" id="{4BC6B4F9-BBF9-493A-8CEC-E6BC93390131}"/>
               </a:ext>
             </a:extLst>
           </p:cNvPr>
@@ -4817,7 +4831,7 @@
                 <a14:useLocalDpi xmlns:a14="http://schemas.microsoft.com/office/drawing/2010/main" val="0"/>
               </a:ext>
               <a:ext uri="{96DAC541-7B7A-43D3-8B79-37D633B846F1}">
-                <asvg:svgBlip xmlns:asvg="http://schemas.microsoft.com/office/drawing/2016/SVG/main" r:embed="rId3"/>
+                <asvg:svgBlip xmlns="" xmlns:asvg="http://schemas.microsoft.com/office/drawing/2016/SVG/main" r:embed="rId3"/>
               </a:ext>
             </a:extLst>
           </a:blip>
@@ -4870,7 +4884,7 @@
           <p:cNvPr id="2" name="Titolo 1">
             <a:extLst>
               <a:ext uri="{FF2B5EF4-FFF2-40B4-BE49-F238E27FC236}">
-                <a16:creationId xmlns:a16="http://schemas.microsoft.com/office/drawing/2014/main" id="{A8B055A1-B3E5-4E97-BAF3-4C33FEAE38D5}"/>
+                <a16:creationId xmlns="" xmlns:a16="http://schemas.microsoft.com/office/drawing/2014/main" id="{A8B055A1-B3E5-4E97-BAF3-4C33FEAE38D5}"/>
               </a:ext>
             </a:extLst>
           </p:cNvPr>
@@ -4904,7 +4918,7 @@
           <p:cNvPr id="4" name="Tabella 4">
             <a:extLst>
               <a:ext uri="{FF2B5EF4-FFF2-40B4-BE49-F238E27FC236}">
-                <a16:creationId xmlns:a16="http://schemas.microsoft.com/office/drawing/2014/main" id="{67C1CEAA-13A3-482D-AA09-BF3FC903FFE5}"/>
+                <a16:creationId xmlns="" xmlns:a16="http://schemas.microsoft.com/office/drawing/2014/main" id="{67C1CEAA-13A3-482D-AA09-BF3FC903FFE5}"/>
               </a:ext>
             </a:extLst>
           </p:cNvPr>
@@ -4915,7 +4929,7 @@
             <p:ph idx="1"/>
             <p:extLst>
               <p:ext uri="{D42A27DB-BD31-4B8C-83A1-F6EECF244321}">
-                <p14:modId xmlns:p14="http://schemas.microsoft.com/office/powerpoint/2010/main" val="262474154"/>
+                <p14:modId xmlns:p14="http://schemas.microsoft.com/office/powerpoint/2010/main" val="91430585"/>
               </p:ext>
             </p:extLst>
           </p:nvPr>
@@ -4934,14 +4948,14 @@
                 <a:gridCol w="2688771">
                   <a:extLst>
                     <a:ext uri="{9D8B030D-6E8A-4147-A177-3AD203B41FA5}">
-                      <a16:colId xmlns:a16="http://schemas.microsoft.com/office/drawing/2014/main" val="634955233"/>
+                      <a16:colId xmlns="" xmlns:a16="http://schemas.microsoft.com/office/drawing/2014/main" val="634955233"/>
                     </a:ext>
                   </a:extLst>
                 </a:gridCol>
                 <a:gridCol w="7826829">
                   <a:extLst>
                     <a:ext uri="{9D8B030D-6E8A-4147-A177-3AD203B41FA5}">
-                      <a16:colId xmlns:a16="http://schemas.microsoft.com/office/drawing/2014/main" val="1784330953"/>
+                      <a16:colId xmlns="" xmlns:a16="http://schemas.microsoft.com/office/drawing/2014/main" val="1784330953"/>
                     </a:ext>
                   </a:extLst>
                 </a:gridCol>
@@ -5012,7 +5026,7 @@
                 </a:tc>
                 <a:extLst>
                   <a:ext uri="{0D108BD9-81ED-4DB2-BD59-A6C34878D82A}">
-                    <a16:rowId xmlns:a16="http://schemas.microsoft.com/office/drawing/2014/main" val="400559187"/>
+                    <a16:rowId xmlns="" xmlns:a16="http://schemas.microsoft.com/office/drawing/2014/main" val="400559187"/>
                   </a:ext>
                 </a:extLst>
               </a:tr>
@@ -5048,12 +5062,12 @@
                         <a:t> accede </a:t>
                       </a:r>
                       <a:r>
-                        <a:rPr lang="it-IT" baseline="0" dirty="0" err="1"/>
-                        <a:t>all</a:t>
+                        <a:rPr lang="it-IT" baseline="0" dirty="0" smtClean="0"/>
+                        <a:t>alla </a:t>
                       </a:r>
                       <a:r>
                         <a:rPr lang="it-IT" baseline="0" dirty="0"/>
-                        <a:t> Web </a:t>
+                        <a:t>Web </a:t>
                       </a:r>
                       <a:r>
                         <a:rPr lang="it-IT" baseline="0" dirty="0" err="1"/>
@@ -5108,7 +5122,7 @@
                 </a:tc>
                 <a:extLst>
                   <a:ext uri="{0D108BD9-81ED-4DB2-BD59-A6C34878D82A}">
-                    <a16:rowId xmlns:a16="http://schemas.microsoft.com/office/drawing/2014/main" val="286916072"/>
+                    <a16:rowId xmlns="" xmlns:a16="http://schemas.microsoft.com/office/drawing/2014/main" val="286916072"/>
                   </a:ext>
                 </a:extLst>
               </a:tr>
@@ -5162,12 +5176,12 @@
                         <a:t> accede </a:t>
                       </a:r>
                       <a:r>
-                        <a:rPr lang="it-IT" baseline="0" dirty="0" err="1"/>
-                        <a:t>all</a:t>
+                        <a:rPr lang="it-IT" baseline="0" dirty="0" smtClean="0"/>
+                        <a:t>alla </a:t>
                       </a:r>
                       <a:r>
                         <a:rPr lang="it-IT" baseline="0" dirty="0"/>
-                        <a:t> Web </a:t>
+                        <a:t>Web </a:t>
                       </a:r>
                       <a:r>
                         <a:rPr lang="it-IT" baseline="0" dirty="0" err="1"/>
@@ -5222,7 +5236,7 @@
                 </a:tc>
                 <a:extLst>
                   <a:ext uri="{0D108BD9-81ED-4DB2-BD59-A6C34878D82A}">
-                    <a16:rowId xmlns:a16="http://schemas.microsoft.com/office/drawing/2014/main" val="1276537878"/>
+                    <a16:rowId xmlns="" xmlns:a16="http://schemas.microsoft.com/office/drawing/2014/main" val="1276537878"/>
                   </a:ext>
                 </a:extLst>
               </a:tr>
@@ -5274,12 +5288,12 @@
                         <a:t> accede </a:t>
                       </a:r>
                       <a:r>
-                        <a:rPr lang="it-IT" baseline="0" dirty="0" err="1"/>
-                        <a:t>all</a:t>
+                        <a:rPr lang="it-IT" baseline="0" dirty="0" smtClean="0"/>
+                        <a:t>alla </a:t>
                       </a:r>
                       <a:r>
                         <a:rPr lang="it-IT" baseline="0" dirty="0"/>
-                        <a:t> Web </a:t>
+                        <a:t>Web </a:t>
                       </a:r>
                       <a:r>
                         <a:rPr lang="it-IT" baseline="0" dirty="0" err="1"/>
@@ -5325,7 +5339,7 @@
                 </a:tc>
                 <a:extLst>
                   <a:ext uri="{0D108BD9-81ED-4DB2-BD59-A6C34878D82A}">
-                    <a16:rowId xmlns:a16="http://schemas.microsoft.com/office/drawing/2014/main" val="10003"/>
+                    <a16:rowId xmlns="" xmlns:a16="http://schemas.microsoft.com/office/drawing/2014/main" val="10003"/>
                   </a:ext>
                 </a:extLst>
               </a:tr>
@@ -5338,7 +5352,7 @@
           <p:cNvPr id="8" name="Elemento grafico 7" descr="Flusso di lavoro">
             <a:extLst>
               <a:ext uri="{FF2B5EF4-FFF2-40B4-BE49-F238E27FC236}">
-                <a16:creationId xmlns:a16="http://schemas.microsoft.com/office/drawing/2014/main" id="{A495AF70-8473-45AA-80C8-B98D01FB12D2}"/>
+                <a16:creationId xmlns="" xmlns:a16="http://schemas.microsoft.com/office/drawing/2014/main" id="{A495AF70-8473-45AA-80C8-B98D01FB12D2}"/>
               </a:ext>
             </a:extLst>
           </p:cNvPr>
@@ -5354,7 +5368,7 @@
                 <a14:useLocalDpi xmlns:a14="http://schemas.microsoft.com/office/drawing/2010/main" val="0"/>
               </a:ext>
               <a:ext uri="{96DAC541-7B7A-43D3-8B79-37D633B846F1}">
-                <asvg:svgBlip xmlns:asvg="http://schemas.microsoft.com/office/drawing/2016/SVG/main" r:embed="rId3"/>
+                <asvg:svgBlip xmlns="" xmlns:asvg="http://schemas.microsoft.com/office/drawing/2016/SVG/main" r:embed="rId3"/>
               </a:ext>
             </a:extLst>
           </a:blip>
@@ -5674,7 +5688,7 @@
   <a:extraClrSchemeLst/>
   <a:extLst>
     <a:ext uri="{05A4C25C-085E-4340-85A3-A5531E510DB2}">
-      <thm15:themeFamily xmlns:thm15="http://schemas.microsoft.com/office/thememl/2012/main" name="Office Theme" id="{62F939B6-93AF-4DB8-9C6B-D6C7DFDC589F}" vid="{4A3C46E8-61CC-4603-A589-7422A47A8E4A}"/>
+      <thm15:themeFamily xmlns="" xmlns:thm15="http://schemas.microsoft.com/office/thememl/2012/main" name="Office Theme" id="{62F939B6-93AF-4DB8-9C6B-D6C7DFDC589F}" vid="{4A3C46E8-61CC-4603-A589-7422A47A8E4A}"/>
     </a:ext>
   </a:extLst>
 </a:theme>

</xml_diff>